<commit_message>
Pre-Projeto : Slides revisados e comentados  modified:   pre-projeto/apresentacao.pptx
</commit_message>
<xml_diff>
--- a/pre-projeto/apresentacao.pptx
+++ b/pre-projeto/apresentacao.pptx
@@ -4,21 +4,25 @@
   <p:sldMasterIdLst>
     <p:sldMasterId id="2147483648" r:id="rId1"/>
   </p:sldMasterIdLst>
+  <p:notesMasterIdLst>
+    <p:notesMasterId r:id="rId17"/>
+  </p:notesMasterIdLst>
   <p:sldIdLst>
     <p:sldId id="256" r:id="rId2"/>
-    <p:sldId id="257" r:id="rId3"/>
-    <p:sldId id="266" r:id="rId4"/>
-    <p:sldId id="258" r:id="rId5"/>
-    <p:sldId id="259" r:id="rId6"/>
-    <p:sldId id="267" r:id="rId7"/>
-    <p:sldId id="260" r:id="rId8"/>
-    <p:sldId id="261" r:id="rId9"/>
-    <p:sldId id="265" r:id="rId10"/>
-    <p:sldId id="262" r:id="rId11"/>
+    <p:sldId id="271" r:id="rId3"/>
+    <p:sldId id="272" r:id="rId4"/>
+    <p:sldId id="257" r:id="rId5"/>
+    <p:sldId id="266" r:id="rId6"/>
+    <p:sldId id="258" r:id="rId7"/>
+    <p:sldId id="259" r:id="rId8"/>
+    <p:sldId id="273" r:id="rId9"/>
+    <p:sldId id="261" r:id="rId10"/>
+    <p:sldId id="265" r:id="rId11"/>
     <p:sldId id="270" r:id="rId12"/>
     <p:sldId id="263" r:id="rId13"/>
-    <p:sldId id="264" r:id="rId14"/>
-    <p:sldId id="269" r:id="rId15"/>
+    <p:sldId id="274" r:id="rId14"/>
+    <p:sldId id="275" r:id="rId15"/>
+    <p:sldId id="264" r:id="rId16"/>
   </p:sldIdLst>
   <p:sldSz cx="9144000" cy="6858000" type="screen4x3"/>
   <p:notesSz cx="6858000" cy="9144000"/>
@@ -120,6 +124,1266 @@
 </p:presentation>
 </file>
 
+<file path=ppt/notesMasters/notesMaster1.xml><?xml version="1.0" encoding="utf-8"?>
+<p:notesMaster xmlns:a="http://schemas.openxmlformats.org/drawingml/2006/main" xmlns:r="http://schemas.openxmlformats.org/officeDocument/2006/relationships" xmlns:p="http://schemas.openxmlformats.org/presentationml/2006/main">
+  <p:cSld>
+    <p:bg>
+      <p:bgRef idx="1001">
+        <a:schemeClr val="bg1"/>
+      </p:bgRef>
+    </p:bg>
+    <p:spTree>
+      <p:nvGrpSpPr>
+        <p:cNvPr id="1" name=""/>
+        <p:cNvGrpSpPr/>
+        <p:nvPr/>
+      </p:nvGrpSpPr>
+      <p:grpSpPr>
+        <a:xfrm>
+          <a:off x="0" y="0"/>
+          <a:ext cx="0" cy="0"/>
+          <a:chOff x="0" y="0"/>
+          <a:chExt cx="0" cy="0"/>
+        </a:xfrm>
+      </p:grpSpPr>
+      <p:sp>
+        <p:nvSpPr>
+          <p:cNvPr id="2" name="Header Placeholder 1"/>
+          <p:cNvSpPr>
+            <a:spLocks noGrp="1"/>
+          </p:cNvSpPr>
+          <p:nvPr>
+            <p:ph type="hdr" sz="quarter"/>
+          </p:nvPr>
+        </p:nvSpPr>
+        <p:spPr>
+          <a:xfrm>
+            <a:off x="0" y="0"/>
+            <a:ext cx="2971800" cy="457200"/>
+          </a:xfrm>
+          <a:prstGeom prst="rect">
+            <a:avLst/>
+          </a:prstGeom>
+        </p:spPr>
+        <p:txBody>
+          <a:bodyPr vert="horz" lIns="91440" tIns="45720" rIns="91440" bIns="45720" rtlCol="0"/>
+          <a:lstStyle>
+            <a:lvl1pPr algn="l">
+              <a:defRPr sz="1200"/>
+            </a:lvl1pPr>
+          </a:lstStyle>
+          <a:p>
+            <a:endParaRPr lang="en-US"/>
+          </a:p>
+        </p:txBody>
+      </p:sp>
+      <p:sp>
+        <p:nvSpPr>
+          <p:cNvPr id="3" name="Date Placeholder 2"/>
+          <p:cNvSpPr>
+            <a:spLocks noGrp="1"/>
+          </p:cNvSpPr>
+          <p:nvPr>
+            <p:ph type="dt" idx="1"/>
+          </p:nvPr>
+        </p:nvSpPr>
+        <p:spPr>
+          <a:xfrm>
+            <a:off x="3884613" y="0"/>
+            <a:ext cx="2971800" cy="457200"/>
+          </a:xfrm>
+          <a:prstGeom prst="rect">
+            <a:avLst/>
+          </a:prstGeom>
+        </p:spPr>
+        <p:txBody>
+          <a:bodyPr vert="horz" lIns="91440" tIns="45720" rIns="91440" bIns="45720" rtlCol="0"/>
+          <a:lstStyle>
+            <a:lvl1pPr algn="r">
+              <a:defRPr sz="1200"/>
+            </a:lvl1pPr>
+          </a:lstStyle>
+          <a:p>
+            <a:fld id="{3B3DC091-544D-4B42-9938-9A362E2AC839}" type="datetimeFigureOut">
+              <a:rPr lang="en-US" smtClean="0"/>
+              <a:t>26/11/13</a:t>
+            </a:fld>
+            <a:endParaRPr lang="en-US"/>
+          </a:p>
+        </p:txBody>
+      </p:sp>
+      <p:sp>
+        <p:nvSpPr>
+          <p:cNvPr id="4" name="Slide Image Placeholder 3"/>
+          <p:cNvSpPr>
+            <a:spLocks noGrp="1" noRot="1" noChangeAspect="1"/>
+          </p:cNvSpPr>
+          <p:nvPr>
+            <p:ph type="sldImg" idx="2"/>
+          </p:nvPr>
+        </p:nvSpPr>
+        <p:spPr>
+          <a:xfrm>
+            <a:off x="1143000" y="685800"/>
+            <a:ext cx="4572000" cy="3429000"/>
+          </a:xfrm>
+          <a:prstGeom prst="rect">
+            <a:avLst/>
+          </a:prstGeom>
+          <a:noFill/>
+          <a:ln w="12700">
+            <a:solidFill>
+              <a:prstClr val="black"/>
+            </a:solidFill>
+          </a:ln>
+        </p:spPr>
+        <p:txBody>
+          <a:bodyPr vert="horz" lIns="91440" tIns="45720" rIns="91440" bIns="45720" rtlCol="0" anchor="ctr"/>
+          <a:lstStyle/>
+          <a:p>
+            <a:endParaRPr lang="en-US"/>
+          </a:p>
+        </p:txBody>
+      </p:sp>
+      <p:sp>
+        <p:nvSpPr>
+          <p:cNvPr id="5" name="Notes Placeholder 4"/>
+          <p:cNvSpPr>
+            <a:spLocks noGrp="1"/>
+          </p:cNvSpPr>
+          <p:nvPr>
+            <p:ph type="body" sz="quarter" idx="3"/>
+          </p:nvPr>
+        </p:nvSpPr>
+        <p:spPr>
+          <a:xfrm>
+            <a:off x="685800" y="4343400"/>
+            <a:ext cx="5486400" cy="4114800"/>
+          </a:xfrm>
+          <a:prstGeom prst="rect">
+            <a:avLst/>
+          </a:prstGeom>
+        </p:spPr>
+        <p:txBody>
+          <a:bodyPr vert="horz" lIns="91440" tIns="45720" rIns="91440" bIns="45720" rtlCol="0"/>
+          <a:lstStyle/>
+          <a:p>
+            <a:pPr lvl="0"/>
+            <a:r>
+              <a:rPr lang="x-none" smtClean="0"/>
+              <a:t>Click to edit Master text styles</a:t>
+            </a:r>
+          </a:p>
+          <a:p>
+            <a:pPr lvl="1"/>
+            <a:r>
+              <a:rPr lang="x-none" smtClean="0"/>
+              <a:t>Second level</a:t>
+            </a:r>
+          </a:p>
+          <a:p>
+            <a:pPr lvl="2"/>
+            <a:r>
+              <a:rPr lang="x-none" smtClean="0"/>
+              <a:t>Third level</a:t>
+            </a:r>
+          </a:p>
+          <a:p>
+            <a:pPr lvl="3"/>
+            <a:r>
+              <a:rPr lang="x-none" smtClean="0"/>
+              <a:t>Fourth level</a:t>
+            </a:r>
+          </a:p>
+          <a:p>
+            <a:pPr lvl="4"/>
+            <a:r>
+              <a:rPr lang="x-none" smtClean="0"/>
+              <a:t>Fifth level</a:t>
+            </a:r>
+            <a:endParaRPr lang="en-US"/>
+          </a:p>
+        </p:txBody>
+      </p:sp>
+      <p:sp>
+        <p:nvSpPr>
+          <p:cNvPr id="6" name="Footer Placeholder 5"/>
+          <p:cNvSpPr>
+            <a:spLocks noGrp="1"/>
+          </p:cNvSpPr>
+          <p:nvPr>
+            <p:ph type="ftr" sz="quarter" idx="4"/>
+          </p:nvPr>
+        </p:nvSpPr>
+        <p:spPr>
+          <a:xfrm>
+            <a:off x="0" y="8685213"/>
+            <a:ext cx="2971800" cy="457200"/>
+          </a:xfrm>
+          <a:prstGeom prst="rect">
+            <a:avLst/>
+          </a:prstGeom>
+        </p:spPr>
+        <p:txBody>
+          <a:bodyPr vert="horz" lIns="91440" tIns="45720" rIns="91440" bIns="45720" rtlCol="0" anchor="b"/>
+          <a:lstStyle>
+            <a:lvl1pPr algn="l">
+              <a:defRPr sz="1200"/>
+            </a:lvl1pPr>
+          </a:lstStyle>
+          <a:p>
+            <a:endParaRPr lang="en-US"/>
+          </a:p>
+        </p:txBody>
+      </p:sp>
+      <p:sp>
+        <p:nvSpPr>
+          <p:cNvPr id="7" name="Slide Number Placeholder 6"/>
+          <p:cNvSpPr>
+            <a:spLocks noGrp="1"/>
+          </p:cNvSpPr>
+          <p:nvPr>
+            <p:ph type="sldNum" sz="quarter" idx="5"/>
+          </p:nvPr>
+        </p:nvSpPr>
+        <p:spPr>
+          <a:xfrm>
+            <a:off x="3884613" y="8685213"/>
+            <a:ext cx="2971800" cy="457200"/>
+          </a:xfrm>
+          <a:prstGeom prst="rect">
+            <a:avLst/>
+          </a:prstGeom>
+        </p:spPr>
+        <p:txBody>
+          <a:bodyPr vert="horz" lIns="91440" tIns="45720" rIns="91440" bIns="45720" rtlCol="0" anchor="b"/>
+          <a:lstStyle>
+            <a:lvl1pPr algn="r">
+              <a:defRPr sz="1200"/>
+            </a:lvl1pPr>
+          </a:lstStyle>
+          <a:p>
+            <a:fld id="{76AF9A99-7F04-5641-8AF4-E3ACF999B5EC}" type="slidenum">
+              <a:rPr lang="en-US" smtClean="0"/>
+              <a:t>‹#›</a:t>
+            </a:fld>
+            <a:endParaRPr lang="en-US"/>
+          </a:p>
+        </p:txBody>
+      </p:sp>
+    </p:spTree>
+    <p:extLst>
+      <p:ext uri="{BB962C8B-B14F-4D97-AF65-F5344CB8AC3E}">
+        <p14:creationId xmlns:p14="http://schemas.microsoft.com/office/powerpoint/2010/main" val="3628367355"/>
+      </p:ext>
+    </p:extLst>
+  </p:cSld>
+  <p:clrMap bg1="lt1" tx1="dk1" bg2="lt2" tx2="dk2" accent1="accent1" accent2="accent2" accent3="accent3" accent4="accent4" accent5="accent5" accent6="accent6" hlink="hlink" folHlink="folHlink"/>
+  <p:notesStyle>
+    <a:lvl1pPr marL="0" algn="l" defTabSz="457200" rtl="0" eaLnBrk="1" latinLnBrk="0" hangingPunct="1">
+      <a:defRPr sz="1200" kern="1200">
+        <a:solidFill>
+          <a:schemeClr val="tx1"/>
+        </a:solidFill>
+        <a:latin typeface="+mn-lt"/>
+        <a:ea typeface="+mn-ea"/>
+        <a:cs typeface="+mn-cs"/>
+      </a:defRPr>
+    </a:lvl1pPr>
+    <a:lvl2pPr marL="457200" algn="l" defTabSz="457200" rtl="0" eaLnBrk="1" latinLnBrk="0" hangingPunct="1">
+      <a:defRPr sz="1200" kern="1200">
+        <a:solidFill>
+          <a:schemeClr val="tx1"/>
+        </a:solidFill>
+        <a:latin typeface="+mn-lt"/>
+        <a:ea typeface="+mn-ea"/>
+        <a:cs typeface="+mn-cs"/>
+      </a:defRPr>
+    </a:lvl2pPr>
+    <a:lvl3pPr marL="914400" algn="l" defTabSz="457200" rtl="0" eaLnBrk="1" latinLnBrk="0" hangingPunct="1">
+      <a:defRPr sz="1200" kern="1200">
+        <a:solidFill>
+          <a:schemeClr val="tx1"/>
+        </a:solidFill>
+        <a:latin typeface="+mn-lt"/>
+        <a:ea typeface="+mn-ea"/>
+        <a:cs typeface="+mn-cs"/>
+      </a:defRPr>
+    </a:lvl3pPr>
+    <a:lvl4pPr marL="1371600" algn="l" defTabSz="457200" rtl="0" eaLnBrk="1" latinLnBrk="0" hangingPunct="1">
+      <a:defRPr sz="1200" kern="1200">
+        <a:solidFill>
+          <a:schemeClr val="tx1"/>
+        </a:solidFill>
+        <a:latin typeface="+mn-lt"/>
+        <a:ea typeface="+mn-ea"/>
+        <a:cs typeface="+mn-cs"/>
+      </a:defRPr>
+    </a:lvl4pPr>
+    <a:lvl5pPr marL="1828800" algn="l" defTabSz="457200" rtl="0" eaLnBrk="1" latinLnBrk="0" hangingPunct="1">
+      <a:defRPr sz="1200" kern="1200">
+        <a:solidFill>
+          <a:schemeClr val="tx1"/>
+        </a:solidFill>
+        <a:latin typeface="+mn-lt"/>
+        <a:ea typeface="+mn-ea"/>
+        <a:cs typeface="+mn-cs"/>
+      </a:defRPr>
+    </a:lvl5pPr>
+    <a:lvl6pPr marL="2286000" algn="l" defTabSz="457200" rtl="0" eaLnBrk="1" latinLnBrk="0" hangingPunct="1">
+      <a:defRPr sz="1200" kern="1200">
+        <a:solidFill>
+          <a:schemeClr val="tx1"/>
+        </a:solidFill>
+        <a:latin typeface="+mn-lt"/>
+        <a:ea typeface="+mn-ea"/>
+        <a:cs typeface="+mn-cs"/>
+      </a:defRPr>
+    </a:lvl6pPr>
+    <a:lvl7pPr marL="2743200" algn="l" defTabSz="457200" rtl="0" eaLnBrk="1" latinLnBrk="0" hangingPunct="1">
+      <a:defRPr sz="1200" kern="1200">
+        <a:solidFill>
+          <a:schemeClr val="tx1"/>
+        </a:solidFill>
+        <a:latin typeface="+mn-lt"/>
+        <a:ea typeface="+mn-ea"/>
+        <a:cs typeface="+mn-cs"/>
+      </a:defRPr>
+    </a:lvl7pPr>
+    <a:lvl8pPr marL="3200400" algn="l" defTabSz="457200" rtl="0" eaLnBrk="1" latinLnBrk="0" hangingPunct="1">
+      <a:defRPr sz="1200" kern="1200">
+        <a:solidFill>
+          <a:schemeClr val="tx1"/>
+        </a:solidFill>
+        <a:latin typeface="+mn-lt"/>
+        <a:ea typeface="+mn-ea"/>
+        <a:cs typeface="+mn-cs"/>
+      </a:defRPr>
+    </a:lvl8pPr>
+    <a:lvl9pPr marL="3657600" algn="l" defTabSz="457200" rtl="0" eaLnBrk="1" latinLnBrk="0" hangingPunct="1">
+      <a:defRPr sz="1200" kern="1200">
+        <a:solidFill>
+          <a:schemeClr val="tx1"/>
+        </a:solidFill>
+        <a:latin typeface="+mn-lt"/>
+        <a:ea typeface="+mn-ea"/>
+        <a:cs typeface="+mn-cs"/>
+      </a:defRPr>
+    </a:lvl9pPr>
+  </p:notesStyle>
+</p:notesMaster>
+</file>
+
+<file path=ppt/notesSlides/notesSlide1.xml><?xml version="1.0" encoding="utf-8"?>
+<p:notes xmlns:a="http://schemas.openxmlformats.org/drawingml/2006/main" xmlns:r="http://schemas.openxmlformats.org/officeDocument/2006/relationships" xmlns:p="http://schemas.openxmlformats.org/presentationml/2006/main">
+  <p:cSld>
+    <p:spTree>
+      <p:nvGrpSpPr>
+        <p:cNvPr id="1" name=""/>
+        <p:cNvGrpSpPr/>
+        <p:nvPr/>
+      </p:nvGrpSpPr>
+      <p:grpSpPr>
+        <a:xfrm>
+          <a:off x="0" y="0"/>
+          <a:ext cx="0" cy="0"/>
+          <a:chOff x="0" y="0"/>
+          <a:chExt cx="0" cy="0"/>
+        </a:xfrm>
+      </p:grpSpPr>
+      <p:sp>
+        <p:nvSpPr>
+          <p:cNvPr id="2" name="Slide Image Placeholder 1"/>
+          <p:cNvSpPr>
+            <a:spLocks noGrp="1" noRot="1" noChangeAspect="1"/>
+          </p:cNvSpPr>
+          <p:nvPr>
+            <p:ph type="sldImg"/>
+          </p:nvPr>
+        </p:nvSpPr>
+        <p:spPr/>
+      </p:sp>
+      <p:sp>
+        <p:nvSpPr>
+          <p:cNvPr id="3" name="Notes Placeholder 2"/>
+          <p:cNvSpPr>
+            <a:spLocks noGrp="1"/>
+          </p:cNvSpPr>
+          <p:nvPr>
+            <p:ph type="body" idx="1"/>
+          </p:nvPr>
+        </p:nvSpPr>
+        <p:spPr/>
+        <p:txBody>
+          <a:bodyPr/>
+          <a:lstStyle/>
+          <a:p>
+            <a:pPr>
+              <a:buFont typeface="Wingdings" panose="05000000000000000000" pitchFamily="2" charset="2"/>
+              <a:buNone/>
+            </a:pPr>
+            <a:r>
+              <a:rPr lang="pt-BR" dirty="0" smtClean="0">
+                <a:solidFill>
+                  <a:schemeClr val="bg1"/>
+                </a:solidFill>
+              </a:rPr>
+              <a:t>Isso </a:t>
+            </a:r>
+            <a:r>
+              <a:rPr lang="pt-BR" dirty="0" smtClean="0">
+                <a:solidFill>
+                  <a:schemeClr val="bg1"/>
+                </a:solidFill>
+              </a:rPr>
+              <a:t>é justificativa para abrir</a:t>
+            </a:r>
+            <a:r>
+              <a:rPr lang="pt-BR" baseline="0" dirty="0" smtClean="0">
+                <a:solidFill>
+                  <a:schemeClr val="bg1"/>
+                </a:solidFill>
+              </a:rPr>
+              <a:t> uma empresa, não para desenvolver o jogo!!</a:t>
+            </a:r>
+          </a:p>
+          <a:p>
+            <a:pPr>
+              <a:buFont typeface="Wingdings" panose="05000000000000000000" pitchFamily="2" charset="2"/>
+              <a:buNone/>
+            </a:pPr>
+            <a:endParaRPr lang="pt-BR" dirty="0" smtClean="0">
+              <a:solidFill>
+                <a:schemeClr val="bg1"/>
+              </a:solidFill>
+            </a:endParaRPr>
+          </a:p>
+          <a:p>
+            <a:pPr>
+              <a:buFont typeface="Wingdings" panose="05000000000000000000" pitchFamily="2" charset="2"/>
+              <a:buChar char="Ø"/>
+            </a:pPr>
+            <a:r>
+              <a:rPr lang="pt-BR" dirty="0" smtClean="0">
+                <a:solidFill>
+                  <a:schemeClr val="bg1"/>
+                </a:solidFill>
+              </a:rPr>
+              <a:t>A indústria de desenvolvimento de jogos tem apresentado um crescimento bastante acentuado nas últimas décadas.</a:t>
+            </a:r>
+          </a:p>
+          <a:p>
+            <a:pPr>
+              <a:buFont typeface="Wingdings" panose="05000000000000000000" pitchFamily="2" charset="2"/>
+              <a:buChar char="Ø"/>
+            </a:pPr>
+            <a:r>
+              <a:rPr lang="pt-BR" dirty="0" smtClean="0">
+                <a:solidFill>
+                  <a:schemeClr val="bg1"/>
+                </a:solidFill>
+              </a:rPr>
+              <a:t>Indústria de jogos tem influenciado uma ampla e variada gama de perfis de usuários, tornando-se parte importante da vida cotidiana da maioria das pessoas, sem restrição de faixa etária.</a:t>
+            </a:r>
+          </a:p>
+          <a:p>
+            <a:pPr>
+              <a:buFont typeface="Wingdings" panose="05000000000000000000" pitchFamily="2" charset="2"/>
+              <a:buNone/>
+            </a:pPr>
+            <a:endParaRPr lang="pt-BR" dirty="0" smtClean="0">
+              <a:solidFill>
+                <a:schemeClr val="bg1"/>
+              </a:solidFill>
+            </a:endParaRPr>
+          </a:p>
+          <a:p>
+            <a:pPr>
+              <a:buFont typeface="Wingdings" panose="05000000000000000000" pitchFamily="2" charset="2"/>
+              <a:buNone/>
+            </a:pPr>
+            <a:r>
+              <a:rPr lang="pt-BR" dirty="0" smtClean="0">
+                <a:solidFill>
+                  <a:schemeClr val="bg1"/>
+                </a:solidFill>
+              </a:rPr>
+              <a:t>Separe o que </a:t>
+            </a:r>
+            <a:r>
+              <a:rPr lang="pt-BR" dirty="0" smtClean="0">
+                <a:solidFill>
+                  <a:schemeClr val="bg1"/>
+                </a:solidFill>
+              </a:rPr>
+              <a:t>é objetivo</a:t>
+            </a:r>
+            <a:r>
+              <a:rPr lang="pt-BR" baseline="0" dirty="0" smtClean="0">
+                <a:solidFill>
+                  <a:schemeClr val="bg1"/>
+                </a:solidFill>
+              </a:rPr>
+              <a:t> seu de TCC do que é objetivo da empresa.</a:t>
+            </a:r>
+          </a:p>
+          <a:p>
+            <a:pPr>
+              <a:buFont typeface="Wingdings" panose="05000000000000000000" pitchFamily="2" charset="2"/>
+              <a:buNone/>
+            </a:pPr>
+            <a:endParaRPr lang="pt-BR" baseline="0" dirty="0" smtClean="0">
+              <a:solidFill>
+                <a:schemeClr val="bg1"/>
+              </a:solidFill>
+            </a:endParaRPr>
+          </a:p>
+          <a:p>
+            <a:pPr>
+              <a:buFont typeface="Wingdings" panose="05000000000000000000" pitchFamily="2" charset="2"/>
+              <a:buNone/>
+            </a:pPr>
+            <a:r>
+              <a:rPr lang="pt-BR" baseline="0" dirty="0" smtClean="0">
+                <a:solidFill>
+                  <a:schemeClr val="bg1"/>
+                </a:solidFill>
+              </a:rPr>
+              <a:t>Falta colocar as justificativas para os objetivos específicos!!!</a:t>
+            </a:r>
+            <a:endParaRPr lang="pt-BR" dirty="0" smtClean="0">
+              <a:solidFill>
+                <a:schemeClr val="bg1"/>
+              </a:solidFill>
+            </a:endParaRPr>
+          </a:p>
+          <a:p>
+            <a:endParaRPr lang="en-US" dirty="0"/>
+          </a:p>
+        </p:txBody>
+      </p:sp>
+      <p:sp>
+        <p:nvSpPr>
+          <p:cNvPr id="4" name="Slide Number Placeholder 3"/>
+          <p:cNvSpPr>
+            <a:spLocks noGrp="1"/>
+          </p:cNvSpPr>
+          <p:nvPr>
+            <p:ph type="sldNum" sz="quarter" idx="10"/>
+          </p:nvPr>
+        </p:nvSpPr>
+        <p:spPr/>
+        <p:txBody>
+          <a:bodyPr/>
+          <a:lstStyle/>
+          <a:p>
+            <a:fld id="{76AF9A99-7F04-5641-8AF4-E3ACF999B5EC}" type="slidenum">
+              <a:rPr lang="en-US" smtClean="0"/>
+              <a:t>7</a:t>
+            </a:fld>
+            <a:endParaRPr lang="en-US"/>
+          </a:p>
+        </p:txBody>
+      </p:sp>
+    </p:spTree>
+    <p:extLst>
+      <p:ext uri="{BB962C8B-B14F-4D97-AF65-F5344CB8AC3E}">
+        <p14:creationId xmlns:p14="http://schemas.microsoft.com/office/powerpoint/2010/main" val="2195918950"/>
+      </p:ext>
+    </p:extLst>
+  </p:cSld>
+  <p:clrMapOvr>
+    <a:masterClrMapping/>
+  </p:clrMapOvr>
+</p:notes>
+</file>
+
+<file path=ppt/notesSlides/notesSlide2.xml><?xml version="1.0" encoding="utf-8"?>
+<p:notes xmlns:a="http://schemas.openxmlformats.org/drawingml/2006/main" xmlns:r="http://schemas.openxmlformats.org/officeDocument/2006/relationships" xmlns:p="http://schemas.openxmlformats.org/presentationml/2006/main">
+  <p:cSld>
+    <p:spTree>
+      <p:nvGrpSpPr>
+        <p:cNvPr id="1" name=""/>
+        <p:cNvGrpSpPr/>
+        <p:nvPr/>
+      </p:nvGrpSpPr>
+      <p:grpSpPr>
+        <a:xfrm>
+          <a:off x="0" y="0"/>
+          <a:ext cx="0" cy="0"/>
+          <a:chOff x="0" y="0"/>
+          <a:chExt cx="0" cy="0"/>
+        </a:xfrm>
+      </p:grpSpPr>
+      <p:sp>
+        <p:nvSpPr>
+          <p:cNvPr id="2" name="Slide Image Placeholder 1"/>
+          <p:cNvSpPr>
+            <a:spLocks noGrp="1" noRot="1" noChangeAspect="1"/>
+          </p:cNvSpPr>
+          <p:nvPr>
+            <p:ph type="sldImg"/>
+          </p:nvPr>
+        </p:nvSpPr>
+        <p:spPr/>
+      </p:sp>
+      <p:sp>
+        <p:nvSpPr>
+          <p:cNvPr id="3" name="Notes Placeholder 2"/>
+          <p:cNvSpPr>
+            <a:spLocks noGrp="1"/>
+          </p:cNvSpPr>
+          <p:nvPr>
+            <p:ph type="body" idx="1"/>
+          </p:nvPr>
+        </p:nvSpPr>
+        <p:spPr/>
+        <p:txBody>
+          <a:bodyPr/>
+          <a:lstStyle/>
+          <a:p>
+            <a:pPr>
+              <a:buFont typeface="Wingdings" panose="05000000000000000000" pitchFamily="2" charset="2"/>
+              <a:buNone/>
+            </a:pPr>
+            <a:r>
+              <a:rPr lang="pt-BR" dirty="0" smtClean="0">
+                <a:solidFill>
+                  <a:schemeClr val="bg1"/>
+                </a:solidFill>
+              </a:rPr>
+              <a:t>Lembrar que a p</a:t>
+            </a:r>
+            <a:r>
+              <a:rPr lang="pt-BR" dirty="0" smtClean="0">
+                <a:solidFill>
+                  <a:schemeClr val="bg1"/>
+                </a:solidFill>
+              </a:rPr>
+              <a:t>ós-produção será da empresa para acabamento</a:t>
+            </a:r>
+            <a:r>
+              <a:rPr lang="pt-BR" baseline="0" dirty="0" smtClean="0">
+                <a:solidFill>
+                  <a:schemeClr val="bg1"/>
+                </a:solidFill>
+              </a:rPr>
+              <a:t> final e comercialização.</a:t>
+            </a:r>
+            <a:endParaRPr lang="pt-BR" dirty="0" smtClean="0">
+              <a:solidFill>
+                <a:schemeClr val="bg1"/>
+              </a:solidFill>
+            </a:endParaRPr>
+          </a:p>
+          <a:p>
+            <a:endParaRPr lang="en-US" dirty="0"/>
+          </a:p>
+        </p:txBody>
+      </p:sp>
+      <p:sp>
+        <p:nvSpPr>
+          <p:cNvPr id="4" name="Slide Number Placeholder 3"/>
+          <p:cNvSpPr>
+            <a:spLocks noGrp="1"/>
+          </p:cNvSpPr>
+          <p:nvPr>
+            <p:ph type="sldNum" sz="quarter" idx="10"/>
+          </p:nvPr>
+        </p:nvSpPr>
+        <p:spPr/>
+        <p:txBody>
+          <a:bodyPr/>
+          <a:lstStyle/>
+          <a:p>
+            <a:fld id="{76AF9A99-7F04-5641-8AF4-E3ACF999B5EC}" type="slidenum">
+              <a:rPr lang="en-US" smtClean="0"/>
+              <a:t>8</a:t>
+            </a:fld>
+            <a:endParaRPr lang="en-US"/>
+          </a:p>
+        </p:txBody>
+      </p:sp>
+    </p:spTree>
+    <p:extLst>
+      <p:ext uri="{BB962C8B-B14F-4D97-AF65-F5344CB8AC3E}">
+        <p14:creationId xmlns:p14="http://schemas.microsoft.com/office/powerpoint/2010/main" val="2195918950"/>
+      </p:ext>
+    </p:extLst>
+  </p:cSld>
+  <p:clrMapOvr>
+    <a:masterClrMapping/>
+  </p:clrMapOvr>
+</p:notes>
+</file>
+
+<file path=ppt/notesSlides/notesSlide3.xml><?xml version="1.0" encoding="utf-8"?>
+<p:notes xmlns:a="http://schemas.openxmlformats.org/drawingml/2006/main" xmlns:r="http://schemas.openxmlformats.org/officeDocument/2006/relationships" xmlns:p="http://schemas.openxmlformats.org/presentationml/2006/main">
+  <p:cSld>
+    <p:spTree>
+      <p:nvGrpSpPr>
+        <p:cNvPr id="1" name=""/>
+        <p:cNvGrpSpPr/>
+        <p:nvPr/>
+      </p:nvGrpSpPr>
+      <p:grpSpPr>
+        <a:xfrm>
+          <a:off x="0" y="0"/>
+          <a:ext cx="0" cy="0"/>
+          <a:chOff x="0" y="0"/>
+          <a:chExt cx="0" cy="0"/>
+        </a:xfrm>
+      </p:grpSpPr>
+      <p:sp>
+        <p:nvSpPr>
+          <p:cNvPr id="2" name="Slide Image Placeholder 1"/>
+          <p:cNvSpPr>
+            <a:spLocks noGrp="1" noRot="1" noChangeAspect="1"/>
+          </p:cNvSpPr>
+          <p:nvPr>
+            <p:ph type="sldImg"/>
+          </p:nvPr>
+        </p:nvSpPr>
+        <p:spPr/>
+      </p:sp>
+      <p:sp>
+        <p:nvSpPr>
+          <p:cNvPr id="3" name="Notes Placeholder 2"/>
+          <p:cNvSpPr>
+            <a:spLocks noGrp="1"/>
+          </p:cNvSpPr>
+          <p:nvPr>
+            <p:ph type="body" idx="1"/>
+          </p:nvPr>
+        </p:nvSpPr>
+        <p:spPr/>
+        <p:txBody>
+          <a:bodyPr/>
+          <a:lstStyle/>
+          <a:p>
+            <a:r>
+              <a:rPr lang="en-US" dirty="0" err="1" smtClean="0"/>
+              <a:t>Colocar</a:t>
+            </a:r>
+            <a:r>
+              <a:rPr lang="en-US" baseline="0" dirty="0" smtClean="0"/>
+              <a:t> </a:t>
+            </a:r>
+            <a:r>
+              <a:rPr lang="en-US" baseline="0" dirty="0" err="1" smtClean="0"/>
+              <a:t>os</a:t>
+            </a:r>
+            <a:r>
+              <a:rPr lang="en-US" baseline="0" dirty="0" smtClean="0"/>
+              <a:t> (</a:t>
+            </a:r>
+            <a:r>
+              <a:rPr lang="en-US" baseline="0" dirty="0" err="1" smtClean="0"/>
+              <a:t>i</a:t>
+            </a:r>
+            <a:r>
+              <a:rPr lang="en-US" baseline="0" dirty="0" smtClean="0"/>
+              <a:t>) </a:t>
+            </a:r>
+            <a:r>
+              <a:rPr lang="en-US" baseline="0" dirty="0" err="1" smtClean="0"/>
+              <a:t>tipos</a:t>
+            </a:r>
+            <a:r>
+              <a:rPr lang="en-US" baseline="0" dirty="0" smtClean="0"/>
+              <a:t> de </a:t>
+            </a:r>
+            <a:r>
+              <a:rPr lang="en-US" baseline="0" dirty="0" err="1" smtClean="0"/>
+              <a:t>jogos</a:t>
+            </a:r>
+            <a:r>
+              <a:rPr lang="en-US" baseline="0" dirty="0" smtClean="0"/>
+              <a:t> de </a:t>
+            </a:r>
+            <a:r>
+              <a:rPr lang="en-US" baseline="0" dirty="0" err="1" smtClean="0"/>
+              <a:t>computadores</a:t>
+            </a:r>
+            <a:r>
+              <a:rPr lang="en-US" baseline="0" dirty="0" smtClean="0"/>
+              <a:t> e (ii) </a:t>
+            </a:r>
+            <a:r>
+              <a:rPr lang="en-US" baseline="0" dirty="0" err="1" smtClean="0"/>
+              <a:t>abordar</a:t>
+            </a:r>
+            <a:r>
+              <a:rPr lang="en-US" baseline="0" dirty="0" smtClean="0"/>
+              <a:t> o </a:t>
+            </a:r>
+            <a:r>
+              <a:rPr lang="en-US" baseline="0" dirty="0" err="1" smtClean="0"/>
+              <a:t>processo</a:t>
+            </a:r>
+            <a:r>
+              <a:rPr lang="en-US" baseline="0" dirty="0" smtClean="0"/>
+              <a:t> de </a:t>
+            </a:r>
+            <a:r>
+              <a:rPr lang="en-US" baseline="0" dirty="0" err="1" smtClean="0"/>
+              <a:t>desenvolvimento</a:t>
+            </a:r>
+            <a:r>
+              <a:rPr lang="en-US" baseline="0" dirty="0" smtClean="0"/>
+              <a:t> de </a:t>
+            </a:r>
+            <a:r>
+              <a:rPr lang="en-US" baseline="0" dirty="0" err="1" smtClean="0"/>
+              <a:t>jogos</a:t>
+            </a:r>
+            <a:r>
+              <a:rPr lang="en-US" baseline="0" dirty="0" smtClean="0"/>
+              <a:t>.</a:t>
+            </a:r>
+          </a:p>
+          <a:p>
+            <a:endParaRPr lang="en-US" dirty="0" smtClean="0"/>
+          </a:p>
+          <a:p>
+            <a:pPr marL="285750" indent="-285750">
+              <a:buAutoNum type="romanLcParenBoth"/>
+            </a:pPr>
+            <a:r>
+              <a:rPr lang="en-US" dirty="0" err="1" smtClean="0"/>
+              <a:t>tabuleiro</a:t>
+            </a:r>
+            <a:r>
+              <a:rPr lang="en-US" dirty="0" smtClean="0"/>
+              <a:t>,</a:t>
+            </a:r>
+            <a:r>
+              <a:rPr lang="en-US" baseline="0" dirty="0" smtClean="0"/>
+              <a:t> </a:t>
+            </a:r>
+            <a:r>
+              <a:rPr lang="en-US" baseline="0" dirty="0" err="1" smtClean="0"/>
+              <a:t>carta</a:t>
+            </a:r>
+            <a:r>
+              <a:rPr lang="en-US" baseline="0" dirty="0" smtClean="0"/>
+              <a:t>, </a:t>
+            </a:r>
+            <a:r>
+              <a:rPr lang="en-US" baseline="0" dirty="0" err="1" smtClean="0"/>
+              <a:t>turno</a:t>
+            </a:r>
+            <a:r>
+              <a:rPr lang="en-US" baseline="0" dirty="0" smtClean="0"/>
+              <a:t>, </a:t>
+            </a:r>
+            <a:r>
+              <a:rPr lang="en-US" baseline="0" dirty="0" err="1" smtClean="0"/>
+              <a:t>mma</a:t>
+            </a:r>
+            <a:r>
+              <a:rPr lang="en-US" baseline="0" dirty="0" smtClean="0"/>
+              <a:t>…</a:t>
+            </a:r>
+          </a:p>
+          <a:p>
+            <a:pPr marL="285750" indent="-285750">
+              <a:buAutoNum type="romanLcParenBoth"/>
+            </a:pPr>
+            <a:r>
+              <a:rPr lang="en-US" dirty="0" err="1" smtClean="0"/>
+              <a:t>Pr</a:t>
+            </a:r>
+            <a:r>
+              <a:rPr lang="en-US" dirty="0" err="1" smtClean="0"/>
+              <a:t>é-produção</a:t>
+            </a:r>
+            <a:r>
+              <a:rPr lang="en-US" dirty="0" smtClean="0"/>
+              <a:t>,</a:t>
+            </a:r>
+            <a:r>
+              <a:rPr lang="en-US" baseline="0" dirty="0" smtClean="0"/>
+              <a:t> </a:t>
+            </a:r>
+            <a:r>
+              <a:rPr lang="en-US" baseline="0" dirty="0" err="1" smtClean="0"/>
+              <a:t>produção</a:t>
+            </a:r>
+            <a:r>
+              <a:rPr lang="en-US" baseline="0" dirty="0" smtClean="0"/>
+              <a:t> (</a:t>
+            </a:r>
+            <a:r>
+              <a:rPr lang="en-US" baseline="0" dirty="0" err="1" smtClean="0"/>
+              <a:t>processo</a:t>
+            </a:r>
+            <a:r>
+              <a:rPr lang="en-US" baseline="0" dirty="0" smtClean="0"/>
+              <a:t> de </a:t>
+            </a:r>
+            <a:r>
+              <a:rPr lang="en-US" baseline="0" dirty="0" err="1" smtClean="0"/>
+              <a:t>desenvolvimento</a:t>
+            </a:r>
+            <a:r>
+              <a:rPr lang="en-US" baseline="0" dirty="0" smtClean="0"/>
+              <a:t> de software, </a:t>
+            </a:r>
+            <a:r>
+              <a:rPr lang="en-US" baseline="0" dirty="0" err="1" smtClean="0"/>
+              <a:t>usualmente</a:t>
+            </a:r>
+            <a:r>
+              <a:rPr lang="en-US" baseline="0" dirty="0" smtClean="0"/>
+              <a:t> um </a:t>
+            </a:r>
+            <a:r>
+              <a:rPr lang="en-US" baseline="0" dirty="0" err="1" smtClean="0"/>
+              <a:t>processo</a:t>
+            </a:r>
+            <a:r>
+              <a:rPr lang="en-US" baseline="0" dirty="0" smtClean="0"/>
+              <a:t> </a:t>
+            </a:r>
+            <a:r>
+              <a:rPr lang="en-US" baseline="0" dirty="0" err="1" smtClean="0"/>
+              <a:t>ágil</a:t>
+            </a:r>
+            <a:r>
+              <a:rPr lang="en-US" baseline="0" dirty="0" smtClean="0"/>
+              <a:t>) e </a:t>
+            </a:r>
+            <a:r>
+              <a:rPr lang="en-US" baseline="0" dirty="0" err="1" smtClean="0"/>
+              <a:t>pós-produção</a:t>
+            </a:r>
+            <a:endParaRPr lang="en-US" dirty="0"/>
+          </a:p>
+        </p:txBody>
+      </p:sp>
+      <p:sp>
+        <p:nvSpPr>
+          <p:cNvPr id="4" name="Slide Number Placeholder 3"/>
+          <p:cNvSpPr>
+            <a:spLocks noGrp="1"/>
+          </p:cNvSpPr>
+          <p:nvPr>
+            <p:ph type="sldNum" sz="quarter" idx="10"/>
+          </p:nvPr>
+        </p:nvSpPr>
+        <p:spPr/>
+        <p:txBody>
+          <a:bodyPr/>
+          <a:lstStyle/>
+          <a:p>
+            <a:fld id="{76AF9A99-7F04-5641-8AF4-E3ACF999B5EC}" type="slidenum">
+              <a:rPr lang="en-US" smtClean="0"/>
+              <a:t>10</a:t>
+            </a:fld>
+            <a:endParaRPr lang="en-US"/>
+          </a:p>
+        </p:txBody>
+      </p:sp>
+    </p:spTree>
+    <p:extLst>
+      <p:ext uri="{BB962C8B-B14F-4D97-AF65-F5344CB8AC3E}">
+        <p14:creationId xmlns:p14="http://schemas.microsoft.com/office/powerpoint/2010/main" val="915187527"/>
+      </p:ext>
+    </p:extLst>
+  </p:cSld>
+  <p:clrMapOvr>
+    <a:masterClrMapping/>
+  </p:clrMapOvr>
+</p:notes>
+</file>
+
+<file path=ppt/notesSlides/notesSlide4.xml><?xml version="1.0" encoding="utf-8"?>
+<p:notes xmlns:a="http://schemas.openxmlformats.org/drawingml/2006/main" xmlns:r="http://schemas.openxmlformats.org/officeDocument/2006/relationships" xmlns:p="http://schemas.openxmlformats.org/presentationml/2006/main">
+  <p:cSld>
+    <p:spTree>
+      <p:nvGrpSpPr>
+        <p:cNvPr id="1" name=""/>
+        <p:cNvGrpSpPr/>
+        <p:nvPr/>
+      </p:nvGrpSpPr>
+      <p:grpSpPr>
+        <a:xfrm>
+          <a:off x="0" y="0"/>
+          <a:ext cx="0" cy="0"/>
+          <a:chOff x="0" y="0"/>
+          <a:chExt cx="0" cy="0"/>
+        </a:xfrm>
+      </p:grpSpPr>
+      <p:sp>
+        <p:nvSpPr>
+          <p:cNvPr id="2" name="Slide Image Placeholder 1"/>
+          <p:cNvSpPr>
+            <a:spLocks noGrp="1" noRot="1" noChangeAspect="1"/>
+          </p:cNvSpPr>
+          <p:nvPr>
+            <p:ph type="sldImg"/>
+          </p:nvPr>
+        </p:nvSpPr>
+        <p:spPr/>
+      </p:sp>
+      <p:sp>
+        <p:nvSpPr>
+          <p:cNvPr id="3" name="Notes Placeholder 2"/>
+          <p:cNvSpPr>
+            <a:spLocks noGrp="1"/>
+          </p:cNvSpPr>
+          <p:nvPr>
+            <p:ph type="body" idx="1"/>
+          </p:nvPr>
+        </p:nvSpPr>
+        <p:spPr/>
+        <p:txBody>
+          <a:bodyPr/>
+          <a:lstStyle/>
+          <a:p>
+            <a:pPr marL="228600" indent="-228600">
+              <a:buAutoNum type="arabicPeriod"/>
+            </a:pPr>
+            <a:r>
+              <a:rPr lang="en-US" dirty="0" err="1" smtClean="0"/>
+              <a:t>Quais</a:t>
+            </a:r>
+            <a:r>
+              <a:rPr lang="en-US" baseline="0" dirty="0" smtClean="0"/>
+              <a:t> as </a:t>
+            </a:r>
+            <a:r>
+              <a:rPr lang="en-US" baseline="0" dirty="0" err="1" smtClean="0"/>
+              <a:t>formas</a:t>
+            </a:r>
+            <a:r>
+              <a:rPr lang="en-US" baseline="0" dirty="0" smtClean="0"/>
+              <a:t> de </a:t>
+            </a:r>
+            <a:r>
+              <a:rPr lang="en-US" baseline="0" dirty="0" err="1" smtClean="0"/>
+              <a:t>distribuiç</a:t>
+            </a:r>
+            <a:r>
+              <a:rPr lang="en-US" baseline="0" dirty="0" err="1" smtClean="0"/>
+              <a:t>ão</a:t>
+            </a:r>
+            <a:r>
+              <a:rPr lang="en-US" baseline="0" dirty="0" smtClean="0"/>
+              <a:t> (</a:t>
+            </a:r>
+            <a:r>
+              <a:rPr lang="en-US" baseline="0" dirty="0" err="1" smtClean="0"/>
+              <a:t>gratuita</a:t>
+            </a:r>
+            <a:r>
+              <a:rPr lang="en-US" baseline="0" dirty="0" smtClean="0"/>
+              <a:t> e </a:t>
+            </a:r>
+            <a:r>
+              <a:rPr lang="en-US" baseline="0" dirty="0" err="1" smtClean="0"/>
+              <a:t>paga</a:t>
+            </a:r>
+            <a:r>
+              <a:rPr lang="en-US" baseline="0" dirty="0" smtClean="0"/>
+              <a:t>) e o </a:t>
+            </a:r>
+            <a:r>
+              <a:rPr lang="en-US" baseline="0" dirty="0" err="1" smtClean="0"/>
+              <a:t>que</a:t>
+            </a:r>
+            <a:r>
+              <a:rPr lang="en-US" baseline="0" dirty="0" smtClean="0"/>
+              <a:t> </a:t>
+            </a:r>
+            <a:r>
+              <a:rPr lang="en-US" baseline="0" dirty="0" err="1" smtClean="0"/>
+              <a:t>cada</a:t>
+            </a:r>
+            <a:r>
+              <a:rPr lang="en-US" baseline="0" dirty="0" smtClean="0"/>
+              <a:t> </a:t>
+            </a:r>
+            <a:r>
+              <a:rPr lang="en-US" baseline="0" dirty="0" err="1" smtClean="0"/>
+              <a:t>uma</a:t>
+            </a:r>
+            <a:r>
+              <a:rPr lang="en-US" baseline="0" dirty="0" smtClean="0"/>
+              <a:t> </a:t>
+            </a:r>
+            <a:r>
+              <a:rPr lang="en-US" baseline="0" dirty="0" err="1" smtClean="0"/>
+              <a:t>dela</a:t>
+            </a:r>
+            <a:r>
+              <a:rPr lang="en-US" baseline="0" dirty="0" smtClean="0"/>
+              <a:t> </a:t>
+            </a:r>
+            <a:r>
+              <a:rPr lang="en-US" baseline="0" dirty="0" err="1" smtClean="0"/>
+              <a:t>fornece</a:t>
+            </a:r>
+            <a:r>
+              <a:rPr lang="en-US" baseline="0" dirty="0" smtClean="0"/>
+              <a:t>/</a:t>
+            </a:r>
+            <a:r>
+              <a:rPr lang="en-US" baseline="0" dirty="0" err="1" smtClean="0"/>
+              <a:t>permite</a:t>
+            </a:r>
+            <a:r>
+              <a:rPr lang="en-US" baseline="0" dirty="0" smtClean="0"/>
+              <a:t>.</a:t>
+            </a:r>
+          </a:p>
+          <a:p>
+            <a:pPr marL="228600" indent="-228600">
+              <a:buAutoNum type="arabicPeriod"/>
+            </a:pPr>
+            <a:r>
+              <a:rPr lang="en-US" baseline="0" dirty="0" err="1" smtClean="0"/>
+              <a:t>Quais</a:t>
+            </a:r>
+            <a:r>
+              <a:rPr lang="en-US" baseline="0" dirty="0" smtClean="0"/>
+              <a:t> as </a:t>
+            </a:r>
+            <a:r>
+              <a:rPr lang="en-US" baseline="0" dirty="0" err="1" smtClean="0"/>
+              <a:t>plataformas</a:t>
+            </a:r>
+            <a:r>
+              <a:rPr lang="en-US" baseline="0" dirty="0" smtClean="0"/>
+              <a:t> </a:t>
+            </a:r>
+            <a:r>
+              <a:rPr lang="en-US" baseline="0" dirty="0" err="1" smtClean="0"/>
+              <a:t>alvo</a:t>
+            </a:r>
+            <a:r>
+              <a:rPr lang="en-US" baseline="0" dirty="0" smtClean="0"/>
+              <a:t> (SO e </a:t>
+            </a:r>
+            <a:r>
+              <a:rPr lang="en-US" baseline="0" dirty="0" err="1" smtClean="0"/>
+              <a:t>linguagens</a:t>
+            </a:r>
+            <a:r>
+              <a:rPr lang="en-US" baseline="0" dirty="0" smtClean="0"/>
+              <a:t>)</a:t>
+            </a:r>
+          </a:p>
+          <a:p>
+            <a:pPr marL="228600" indent="-228600">
+              <a:buAutoNum type="arabicPeriod"/>
+            </a:pPr>
+            <a:r>
+              <a:rPr lang="en-US" baseline="0" dirty="0" err="1" smtClean="0"/>
+              <a:t>Quais</a:t>
+            </a:r>
+            <a:r>
+              <a:rPr lang="en-US" baseline="0" dirty="0" smtClean="0"/>
+              <a:t> as </a:t>
+            </a:r>
+            <a:r>
+              <a:rPr lang="en-US" baseline="0" dirty="0" err="1" smtClean="0"/>
+              <a:t>empresas</a:t>
+            </a:r>
+            <a:r>
+              <a:rPr lang="en-US" baseline="0" dirty="0" smtClean="0"/>
+              <a:t> </a:t>
+            </a:r>
+            <a:r>
+              <a:rPr lang="en-US" baseline="0" dirty="0" err="1" smtClean="0"/>
+              <a:t>que</a:t>
+            </a:r>
+            <a:r>
+              <a:rPr lang="en-US" baseline="0" dirty="0" smtClean="0"/>
+              <a:t> </a:t>
+            </a:r>
+            <a:r>
+              <a:rPr lang="en-US" baseline="0" dirty="0" err="1" smtClean="0"/>
+              <a:t>usam</a:t>
+            </a:r>
+            <a:endParaRPr lang="en-US" baseline="0" dirty="0" smtClean="0"/>
+          </a:p>
+          <a:p>
+            <a:pPr marL="228600" indent="-228600">
+              <a:buAutoNum type="arabicPeriod"/>
+            </a:pPr>
+            <a:r>
+              <a:rPr lang="en-US" baseline="0" dirty="0" err="1" smtClean="0"/>
+              <a:t>Materiais</a:t>
+            </a:r>
+            <a:r>
+              <a:rPr lang="en-US" baseline="0" dirty="0" smtClean="0"/>
+              <a:t> </a:t>
+            </a:r>
+            <a:r>
+              <a:rPr lang="en-US" baseline="0" dirty="0" err="1" smtClean="0"/>
+              <a:t>disponíveis</a:t>
+            </a:r>
+            <a:r>
+              <a:rPr lang="en-US" baseline="0" dirty="0" smtClean="0"/>
+              <a:t> (online, </a:t>
+            </a:r>
+            <a:r>
+              <a:rPr lang="en-US" baseline="0" dirty="0" err="1" smtClean="0"/>
+              <a:t>livros</a:t>
+            </a:r>
+            <a:r>
+              <a:rPr lang="en-US" baseline="0" dirty="0" smtClean="0"/>
+              <a:t>, </a:t>
+            </a:r>
+            <a:r>
+              <a:rPr lang="en-US" baseline="0" dirty="0" err="1" smtClean="0"/>
+              <a:t>cursos</a:t>
+            </a:r>
+            <a:r>
+              <a:rPr lang="en-US" baseline="0" dirty="0" smtClean="0"/>
+              <a:t>…)</a:t>
+            </a:r>
+          </a:p>
+        </p:txBody>
+      </p:sp>
+      <p:sp>
+        <p:nvSpPr>
+          <p:cNvPr id="4" name="Slide Number Placeholder 3"/>
+          <p:cNvSpPr>
+            <a:spLocks noGrp="1"/>
+          </p:cNvSpPr>
+          <p:nvPr>
+            <p:ph type="sldNum" sz="quarter" idx="10"/>
+          </p:nvPr>
+        </p:nvSpPr>
+        <p:spPr/>
+        <p:txBody>
+          <a:bodyPr/>
+          <a:lstStyle/>
+          <a:p>
+            <a:fld id="{76AF9A99-7F04-5641-8AF4-E3ACF999B5EC}" type="slidenum">
+              <a:rPr lang="en-US" smtClean="0"/>
+              <a:t>11</a:t>
+            </a:fld>
+            <a:endParaRPr lang="en-US"/>
+          </a:p>
+        </p:txBody>
+      </p:sp>
+    </p:spTree>
+    <p:extLst>
+      <p:ext uri="{BB962C8B-B14F-4D97-AF65-F5344CB8AC3E}">
+        <p14:creationId xmlns:p14="http://schemas.microsoft.com/office/powerpoint/2010/main" val="3482875803"/>
+      </p:ext>
+    </p:extLst>
+  </p:cSld>
+  <p:clrMapOvr>
+    <a:masterClrMapping/>
+  </p:clrMapOvr>
+</p:notes>
+</file>
+
 <file path=ppt/slideLayouts/slideLayout1.xml><?xml version="1.0" encoding="utf-8"?>
 <p:sldLayout xmlns:a="http://schemas.openxmlformats.org/drawingml/2006/main" xmlns:r="http://schemas.openxmlformats.org/officeDocument/2006/relationships" xmlns:p="http://schemas.openxmlformats.org/presentationml/2006/main" type="title" preserve="1">
   <p:cSld name="Slide de título">
@@ -302,7 +1566,7 @@
             <a:fld id="{69FAF774-2C22-4986-A8EB-521CC8256BA2}" type="datetimeFigureOut">
               <a:rPr lang="pt-BR" smtClean="0"/>
               <a:pPr/>
-              <a:t>25/11/2013</a:t>
+              <a:t>26/11/13</a:t>
             </a:fld>
             <a:endParaRPr lang="pt-BR"/>
           </a:p>
@@ -345,7 +1609,7 @@
             <a:fld id="{AEBE9E91-1164-48B5-9DD9-0906DC7D818B}" type="slidenum">
               <a:rPr lang="pt-BR" smtClean="0"/>
               <a:pPr/>
-              <a:t>‹nº›</a:t>
+              <a:t>‹#›</a:t>
             </a:fld>
             <a:endParaRPr lang="pt-BR"/>
           </a:p>
@@ -469,7 +1733,7 @@
             <a:fld id="{69FAF774-2C22-4986-A8EB-521CC8256BA2}" type="datetimeFigureOut">
               <a:rPr lang="pt-BR" smtClean="0"/>
               <a:pPr/>
-              <a:t>25/11/2013</a:t>
+              <a:t>26/11/13</a:t>
             </a:fld>
             <a:endParaRPr lang="pt-BR"/>
           </a:p>
@@ -512,7 +1776,7 @@
             <a:fld id="{AEBE9E91-1164-48B5-9DD9-0906DC7D818B}" type="slidenum">
               <a:rPr lang="pt-BR" smtClean="0"/>
               <a:pPr/>
-              <a:t>‹nº›</a:t>
+              <a:t>‹#›</a:t>
             </a:fld>
             <a:endParaRPr lang="pt-BR"/>
           </a:p>
@@ -646,7 +1910,7 @@
             <a:fld id="{69FAF774-2C22-4986-A8EB-521CC8256BA2}" type="datetimeFigureOut">
               <a:rPr lang="pt-BR" smtClean="0"/>
               <a:pPr/>
-              <a:t>25/11/2013</a:t>
+              <a:t>26/11/13</a:t>
             </a:fld>
             <a:endParaRPr lang="pt-BR"/>
           </a:p>
@@ -689,7 +1953,7 @@
             <a:fld id="{AEBE9E91-1164-48B5-9DD9-0906DC7D818B}" type="slidenum">
               <a:rPr lang="pt-BR" smtClean="0"/>
               <a:pPr/>
-              <a:t>‹nº›</a:t>
+              <a:t>‹#›</a:t>
             </a:fld>
             <a:endParaRPr lang="pt-BR"/>
           </a:p>
@@ -813,7 +2077,7 @@
             <a:fld id="{69FAF774-2C22-4986-A8EB-521CC8256BA2}" type="datetimeFigureOut">
               <a:rPr lang="pt-BR" smtClean="0"/>
               <a:pPr/>
-              <a:t>25/11/2013</a:t>
+              <a:t>26/11/13</a:t>
             </a:fld>
             <a:endParaRPr lang="pt-BR"/>
           </a:p>
@@ -856,7 +2120,7 @@
             <a:fld id="{AEBE9E91-1164-48B5-9DD9-0906DC7D818B}" type="slidenum">
               <a:rPr lang="pt-BR" smtClean="0"/>
               <a:pPr/>
-              <a:t>‹nº›</a:t>
+              <a:t>‹#›</a:t>
             </a:fld>
             <a:endParaRPr lang="pt-BR"/>
           </a:p>
@@ -1056,7 +2320,7 @@
             <a:fld id="{69FAF774-2C22-4986-A8EB-521CC8256BA2}" type="datetimeFigureOut">
               <a:rPr lang="pt-BR" smtClean="0"/>
               <a:pPr/>
-              <a:t>25/11/2013</a:t>
+              <a:t>26/11/13</a:t>
             </a:fld>
             <a:endParaRPr lang="pt-BR"/>
           </a:p>
@@ -1099,7 +2363,7 @@
             <a:fld id="{AEBE9E91-1164-48B5-9DD9-0906DC7D818B}" type="slidenum">
               <a:rPr lang="pt-BR" smtClean="0"/>
               <a:pPr/>
-              <a:t>‹nº›</a:t>
+              <a:t>‹#›</a:t>
             </a:fld>
             <a:endParaRPr lang="pt-BR"/>
           </a:p>
@@ -1341,7 +2605,7 @@
             <a:fld id="{69FAF774-2C22-4986-A8EB-521CC8256BA2}" type="datetimeFigureOut">
               <a:rPr lang="pt-BR" smtClean="0"/>
               <a:pPr/>
-              <a:t>25/11/2013</a:t>
+              <a:t>26/11/13</a:t>
             </a:fld>
             <a:endParaRPr lang="pt-BR"/>
           </a:p>
@@ -1384,7 +2648,7 @@
             <a:fld id="{AEBE9E91-1164-48B5-9DD9-0906DC7D818B}" type="slidenum">
               <a:rPr lang="pt-BR" smtClean="0"/>
               <a:pPr/>
-              <a:t>‹nº›</a:t>
+              <a:t>‹#›</a:t>
             </a:fld>
             <a:endParaRPr lang="pt-BR"/>
           </a:p>
@@ -1760,7 +3024,7 @@
             <a:fld id="{69FAF774-2C22-4986-A8EB-521CC8256BA2}" type="datetimeFigureOut">
               <a:rPr lang="pt-BR" smtClean="0"/>
               <a:pPr/>
-              <a:t>25/11/2013</a:t>
+              <a:t>26/11/13</a:t>
             </a:fld>
             <a:endParaRPr lang="pt-BR"/>
           </a:p>
@@ -1803,7 +3067,7 @@
             <a:fld id="{AEBE9E91-1164-48B5-9DD9-0906DC7D818B}" type="slidenum">
               <a:rPr lang="pt-BR" smtClean="0"/>
               <a:pPr/>
-              <a:t>‹nº›</a:t>
+              <a:t>‹#›</a:t>
             </a:fld>
             <a:endParaRPr lang="pt-BR"/>
           </a:p>
@@ -1875,7 +3139,7 @@
             <a:fld id="{69FAF774-2C22-4986-A8EB-521CC8256BA2}" type="datetimeFigureOut">
               <a:rPr lang="pt-BR" smtClean="0"/>
               <a:pPr/>
-              <a:t>25/11/2013</a:t>
+              <a:t>26/11/13</a:t>
             </a:fld>
             <a:endParaRPr lang="pt-BR"/>
           </a:p>
@@ -1918,7 +3182,7 @@
             <a:fld id="{AEBE9E91-1164-48B5-9DD9-0906DC7D818B}" type="slidenum">
               <a:rPr lang="pt-BR" smtClean="0"/>
               <a:pPr/>
-              <a:t>‹nº›</a:t>
+              <a:t>‹#›</a:t>
             </a:fld>
             <a:endParaRPr lang="pt-BR"/>
           </a:p>
@@ -1967,7 +3231,7 @@
             <a:fld id="{69FAF774-2C22-4986-A8EB-521CC8256BA2}" type="datetimeFigureOut">
               <a:rPr lang="pt-BR" smtClean="0"/>
               <a:pPr/>
-              <a:t>25/11/2013</a:t>
+              <a:t>26/11/13</a:t>
             </a:fld>
             <a:endParaRPr lang="pt-BR"/>
           </a:p>
@@ -2010,7 +3274,7 @@
             <a:fld id="{AEBE9E91-1164-48B5-9DD9-0906DC7D818B}" type="slidenum">
               <a:rPr lang="pt-BR" smtClean="0"/>
               <a:pPr/>
-              <a:t>‹nº›</a:t>
+              <a:t>‹#›</a:t>
             </a:fld>
             <a:endParaRPr lang="pt-BR"/>
           </a:p>
@@ -2241,7 +3505,7 @@
             <a:fld id="{69FAF774-2C22-4986-A8EB-521CC8256BA2}" type="datetimeFigureOut">
               <a:rPr lang="pt-BR" smtClean="0"/>
               <a:pPr/>
-              <a:t>25/11/2013</a:t>
+              <a:t>26/11/13</a:t>
             </a:fld>
             <a:endParaRPr lang="pt-BR"/>
           </a:p>
@@ -2284,7 +3548,7 @@
             <a:fld id="{AEBE9E91-1164-48B5-9DD9-0906DC7D818B}" type="slidenum">
               <a:rPr lang="pt-BR" smtClean="0"/>
               <a:pPr/>
-              <a:t>‹nº›</a:t>
+              <a:t>‹#›</a:t>
             </a:fld>
             <a:endParaRPr lang="pt-BR"/>
           </a:p>
@@ -2491,7 +3755,7 @@
             <a:fld id="{69FAF774-2C22-4986-A8EB-521CC8256BA2}" type="datetimeFigureOut">
               <a:rPr lang="pt-BR" smtClean="0"/>
               <a:pPr/>
-              <a:t>25/11/2013</a:t>
+              <a:t>26/11/13</a:t>
             </a:fld>
             <a:endParaRPr lang="pt-BR"/>
           </a:p>
@@ -2534,7 +3798,7 @@
             <a:fld id="{AEBE9E91-1164-48B5-9DD9-0906DC7D818B}" type="slidenum">
               <a:rPr lang="pt-BR" smtClean="0"/>
               <a:pPr/>
-              <a:t>‹nº›</a:t>
+              <a:t>‹#›</a:t>
             </a:fld>
             <a:endParaRPr lang="pt-BR"/>
           </a:p>
@@ -2704,7 +3968,7 @@
             <a:fld id="{69FAF774-2C22-4986-A8EB-521CC8256BA2}" type="datetimeFigureOut">
               <a:rPr lang="pt-BR" smtClean="0"/>
               <a:pPr/>
-              <a:t>25/11/2013</a:t>
+              <a:t>26/11/13</a:t>
             </a:fld>
             <a:endParaRPr lang="pt-BR"/>
           </a:p>
@@ -2783,7 +4047,7 @@
             <a:fld id="{AEBE9E91-1164-48B5-9DD9-0906DC7D818B}" type="slidenum">
               <a:rPr lang="pt-BR" smtClean="0"/>
               <a:pPr/>
-              <a:t>‹nº›</a:t>
+              <a:t>‹#›</a:t>
             </a:fld>
             <a:endParaRPr lang="pt-BR"/>
           </a:p>
@@ -3126,70 +4390,52 @@
         </p:nvSpPr>
         <p:spPr>
           <a:xfrm>
-            <a:off x="1371600" y="3886200"/>
+            <a:off x="1403648" y="4077072"/>
             <a:ext cx="6400800" cy="2135088"/>
           </a:xfrm>
         </p:spPr>
         <p:txBody>
           <a:bodyPr>
-            <a:normAutofit fontScale="92500" lnSpcReduction="10000"/>
+            <a:normAutofit/>
           </a:bodyPr>
           <a:lstStyle/>
           <a:p>
             <a:r>
-              <a:rPr lang="pt-BR" dirty="0" smtClean="0">
+              <a:rPr lang="pt-BR" sz="2800" dirty="0" smtClean="0">
                 <a:solidFill>
                   <a:schemeClr val="bg1"/>
                 </a:solidFill>
               </a:rPr>
               <a:t>Rafael Oliveira de Moura</a:t>
             </a:r>
-            <a:endParaRPr lang="pt-BR" dirty="0" smtClean="0">
+          </a:p>
+          <a:p>
+            <a:endParaRPr lang="pt-BR" sz="2800" dirty="0">
               <a:solidFill>
                 <a:schemeClr val="bg1"/>
               </a:solidFill>
             </a:endParaRPr>
           </a:p>
           <a:p>
-            <a:endParaRPr lang="pt-BR" dirty="0">
-              <a:solidFill>
-                <a:schemeClr val="bg1"/>
-              </a:solidFill>
-            </a:endParaRPr>
-          </a:p>
-          <a:p>
-            <a:r>
-              <a:rPr lang="pt-BR" dirty="0" smtClean="0">
-                <a:solidFill>
-                  <a:schemeClr val="bg1"/>
-                </a:solidFill>
-              </a:rPr>
-              <a:t>Orientador: </a:t>
-            </a:r>
-            <a:r>
-              <a:rPr lang="pt-BR" dirty="0" smtClean="0">
-                <a:solidFill>
-                  <a:schemeClr val="bg1"/>
-                </a:solidFill>
-              </a:rPr>
-              <a:t>Leonardo Minora</a:t>
-            </a:r>
-            <a:endParaRPr lang="pt-BR" dirty="0" smtClean="0">
-              <a:solidFill>
-                <a:schemeClr val="bg1"/>
-              </a:solidFill>
-            </a:endParaRPr>
-          </a:p>
-          <a:p>
-            <a:r>
-              <a:rPr lang="pt-BR" dirty="0" smtClean="0">
+            <a:r>
+              <a:rPr lang="pt-BR" sz="2800" dirty="0" smtClean="0">
+                <a:solidFill>
+                  <a:schemeClr val="bg1"/>
+                </a:solidFill>
+              </a:rPr>
+              <a:t>Orientador: Leonardo Minora</a:t>
+            </a:r>
+          </a:p>
+          <a:p>
+            <a:r>
+              <a:rPr lang="pt-BR" sz="2800" dirty="0" smtClean="0">
                 <a:solidFill>
                   <a:schemeClr val="bg1"/>
                 </a:solidFill>
               </a:rPr>
               <a:t>2013.2</a:t>
             </a:r>
-            <a:endParaRPr lang="pt-BR" dirty="0">
+            <a:endParaRPr lang="pt-BR" sz="2800" dirty="0">
               <a:solidFill>
                 <a:schemeClr val="bg1"/>
               </a:solidFill>
@@ -3243,32 +4489,8 @@
                   <a:schemeClr val="bg1"/>
                 </a:solidFill>
               </a:rPr>
-              <a:t>IFRN</a:t>
-            </a:r>
-            <a:endParaRPr lang="pt-BR" sz="2400" dirty="0" smtClean="0">
-              <a:solidFill>
-                <a:schemeClr val="bg1"/>
-              </a:solidFill>
-            </a:endParaRPr>
-          </a:p>
-          <a:p>
-            <a:pPr marL="0" marR="0" lvl="0" indent="0" algn="ctr" defTabSz="914400" rtl="0" eaLnBrk="1" fontAlgn="auto" latinLnBrk="0" hangingPunct="1">
-              <a:lnSpc>
-                <a:spcPct val="100000"/>
-              </a:lnSpc>
-              <a:spcBef>
-                <a:spcPct val="20000"/>
-              </a:spcBef>
-              <a:spcAft>
-                <a:spcPts val="0"/>
-              </a:spcAft>
-              <a:buClrTx/>
-              <a:buSzTx/>
-              <a:buFont typeface="Arial" pitchFamily="34" charset="0"/>
-              <a:buNone/>
-              <a:tabLst/>
-              <a:defRPr/>
-            </a:pPr>
+              <a:t>IFRN-</a:t>
+            </a:r>
             <a:r>
               <a:rPr kumimoji="0" lang="pt-BR" sz="2400" b="0" i="0" u="none" strike="noStrike" kern="1200" cap="none" spc="0" normalizeH="0" baseline="0" noProof="0" dirty="0" smtClean="0">
                 <a:ln>
@@ -3284,48 +4506,15 @@
                 <a:ea typeface="+mn-ea"/>
                 <a:cs typeface="+mn-cs"/>
               </a:rPr>
-              <a:t>CNAT</a:t>
-            </a:r>
-            <a:endParaRPr kumimoji="0" lang="pt-BR" sz="2400" b="0" i="0" u="none" strike="noStrike" kern="1200" cap="none" spc="0" normalizeH="0" baseline="0" noProof="0" dirty="0" smtClean="0">
-              <a:ln>
-                <a:noFill/>
-              </a:ln>
-              <a:solidFill>
-                <a:schemeClr val="bg1"/>
-              </a:solidFill>
-              <a:effectLst/>
-              <a:uLnTx/>
-              <a:uFillTx/>
-              <a:latin typeface="+mn-lt"/>
-              <a:ea typeface="+mn-ea"/>
-              <a:cs typeface="+mn-cs"/>
-            </a:endParaRPr>
-          </a:p>
-          <a:p>
-            <a:pPr marL="0" marR="0" lvl="0" indent="0" algn="ctr" defTabSz="914400" rtl="0" eaLnBrk="1" fontAlgn="auto" latinLnBrk="0" hangingPunct="1">
-              <a:lnSpc>
-                <a:spcPct val="100000"/>
-              </a:lnSpc>
-              <a:spcBef>
-                <a:spcPct val="20000"/>
-              </a:spcBef>
-              <a:spcAft>
-                <a:spcPts val="0"/>
-              </a:spcAft>
-              <a:buClrTx/>
-              <a:buSzTx/>
-              <a:buFont typeface="Arial" pitchFamily="34" charset="0"/>
-              <a:buNone/>
-              <a:tabLst/>
-              <a:defRPr/>
-            </a:pPr>
+              <a:t>CNAT-</a:t>
+            </a:r>
             <a:r>
               <a:rPr lang="pt-BR" sz="2400" dirty="0" smtClean="0">
                 <a:solidFill>
                   <a:schemeClr val="bg1"/>
                 </a:solidFill>
               </a:rPr>
-              <a:t>DIETINF</a:t>
+              <a:t>DIATINF</a:t>
             </a:r>
             <a:endParaRPr lang="pt-BR" sz="2400" dirty="0" smtClean="0">
               <a:solidFill>
@@ -3400,7 +4589,7 @@
       </p:grpSpPr>
       <p:sp>
         <p:nvSpPr>
-          <p:cNvPr id="4" name="Título 3"/>
+          <p:cNvPr id="6" name="Título 5"/>
           <p:cNvSpPr>
             <a:spLocks noGrp="1"/>
           </p:cNvSpPr>
@@ -3414,19 +4603,24 @@
           <a:lstStyle/>
           <a:p>
             <a:r>
-              <a:rPr lang="pt-BR" dirty="0">
-                <a:solidFill>
-                  <a:schemeClr val="bg1"/>
-                </a:solidFill>
-              </a:rPr>
-              <a:t>Desenvolvimento de jogos</a:t>
-            </a:r>
-          </a:p>
-        </p:txBody>
-      </p:sp>
-      <p:sp>
-        <p:nvSpPr>
-          <p:cNvPr id="5" name="Espaço Reservado para Conteúdo 4"/>
+              <a:rPr lang="pt-BR" dirty="0" smtClean="0">
+                <a:solidFill>
+                  <a:schemeClr val="bg1"/>
+                </a:solidFill>
+              </a:rPr>
+              <a:t>Jogos computacionais</a:t>
+            </a:r>
+            <a:endParaRPr lang="pt-BR" dirty="0">
+              <a:solidFill>
+                <a:schemeClr val="bg1"/>
+              </a:solidFill>
+            </a:endParaRPr>
+          </a:p>
+        </p:txBody>
+      </p:sp>
+      <p:sp>
+        <p:nvSpPr>
+          <p:cNvPr id="7" name="Espaço Reservado para Conteúdo 6"/>
           <p:cNvSpPr>
             <a:spLocks noGrp="1"/>
           </p:cNvSpPr>
@@ -3449,7 +4643,7 @@
                   <a:schemeClr val="bg1"/>
                 </a:solidFill>
               </a:rPr>
-              <a:t>Pré-produção</a:t>
+              <a:t>Jogos computacionais</a:t>
             </a:r>
           </a:p>
           <a:p>
@@ -3463,36 +4657,13 @@
                   <a:schemeClr val="bg1"/>
                 </a:solidFill>
               </a:rPr>
-              <a:t>Produção</a:t>
-            </a:r>
-          </a:p>
-          <a:p>
-            <a:pPr>
-              <a:buFont typeface="Wingdings" panose="05000000000000000000" pitchFamily="2" charset="2"/>
-              <a:buChar char="Ø"/>
-            </a:pPr>
-            <a:r>
-              <a:rPr lang="pt-BR" dirty="0" err="1">
-                <a:solidFill>
-                  <a:schemeClr val="bg1"/>
-                </a:solidFill>
-              </a:rPr>
-              <a:t>Milestones</a:t>
-            </a:r>
-            <a:r>
-              <a:rPr lang="pt-BR" dirty="0">
-                <a:solidFill>
-                  <a:schemeClr val="bg1"/>
-                </a:solidFill>
-              </a:rPr>
-              <a:t> (marcos)</a:t>
-            </a:r>
-          </a:p>
-          <a:p>
-            <a:pPr marL="0" indent="0">
-              <a:buNone/>
-            </a:pPr>
-            <a:endParaRPr lang="pt-BR" dirty="0"/>
+              <a:t>Processo de desenvolvimento de jogos</a:t>
+            </a:r>
+            <a:endParaRPr lang="pt-BR" dirty="0">
+              <a:solidFill>
+                <a:schemeClr val="bg1"/>
+              </a:solidFill>
+            </a:endParaRPr>
           </a:p>
         </p:txBody>
       </p:sp>
@@ -3501,13 +4672,6 @@
   <p:clrMapOvr>
     <a:masterClrMapping/>
   </p:clrMapOvr>
-  <p:timing>
-    <p:tnLst>
-      <p:par>
-        <p:cTn id="1" dur="indefinite" restart="never" nodeType="tmRoot"/>
-      </p:par>
-    </p:tnLst>
-  </p:timing>
 </p:sld>
 </file>
 
@@ -3633,7 +4797,7 @@
           <p:nvPr/>
         </p:nvPicPr>
         <p:blipFill>
-          <a:blip r:embed="rId2">
+          <a:blip r:embed="rId3">
             <a:extLst>
               <a:ext uri="{28A0092B-C50C-407E-A947-70E740481C1C}">
                 <a14:useLocalDpi xmlns:a14="http://schemas.microsoft.com/office/drawing/2010/main" val="0"/>
@@ -3663,7 +4827,7 @@
           <p:nvPr/>
         </p:nvPicPr>
         <p:blipFill>
-          <a:blip r:embed="rId3">
+          <a:blip r:embed="rId4">
             <a:extLst>
               <a:ext uri="{28A0092B-C50C-407E-A947-70E740481C1C}">
                 <a14:useLocalDpi xmlns:a14="http://schemas.microsoft.com/office/drawing/2010/main" val="0"/>
@@ -3735,7 +4899,7 @@
                   <a:schemeClr val="bg1"/>
                 </a:solidFill>
               </a:rPr>
-              <a:t>Referencial bibliográfico fundamental</a:t>
+              <a:t>cronograma</a:t>
             </a:r>
             <a:endParaRPr lang="pt-BR" dirty="0">
               <a:solidFill>
@@ -3772,7 +4936,7 @@
   <p:timing>
     <p:tnLst>
       <p:par>
-        <p:cTn id="1" dur="indefinite" restart="never" nodeType="tmRoot"/>
+        <p:cTn xmlns:p14="http://schemas.microsoft.com/office/powerpoint/2010/main" id="1" dur="indefinite" restart="never" nodeType="tmRoot"/>
       </p:par>
     </p:tnLst>
   </p:timing>
@@ -3798,7 +4962,7 @@
       </p:grpSpPr>
       <p:sp>
         <p:nvSpPr>
-          <p:cNvPr id="2" name="Título 1"/>
+          <p:cNvPr id="4" name="Title 3"/>
           <p:cNvSpPr>
             <a:spLocks noGrp="1"/>
           </p:cNvSpPr>
@@ -3812,204 +4976,266 @@
           <a:lstStyle/>
           <a:p>
             <a:r>
-              <a:rPr lang="pt-BR" altLang="pt-BR" dirty="0">
-                <a:solidFill>
-                  <a:schemeClr val="bg1"/>
-                </a:solidFill>
-              </a:rPr>
-              <a:t>Bibliografia</a:t>
-            </a:r>
-            <a:endParaRPr lang="pt-BR" dirty="0">
+              <a:rPr lang="en-US" dirty="0" err="1" smtClean="0">
+                <a:solidFill>
+                  <a:srgbClr val="FFFFFF"/>
+                </a:solidFill>
+              </a:rPr>
+              <a:t>Cronograma</a:t>
+            </a:r>
+            <a:r>
+              <a:rPr lang="en-US" dirty="0" smtClean="0">
+                <a:solidFill>
+                  <a:srgbClr val="FFFFFF"/>
+                </a:solidFill>
+              </a:rPr>
+              <a:t> - Jogo</a:t>
+            </a:r>
+            <a:endParaRPr lang="en-US" dirty="0">
               <a:solidFill>
-                <a:schemeClr val="bg1"/>
+                <a:srgbClr val="FFFFFF"/>
               </a:solidFill>
             </a:endParaRPr>
           </a:p>
         </p:txBody>
       </p:sp>
-      <p:sp>
-        <p:nvSpPr>
-          <p:cNvPr id="3" name="Espaço Reservado para Conteúdo 2"/>
-          <p:cNvSpPr>
-            <a:spLocks noGrp="1"/>
-          </p:cNvSpPr>
+      <p:graphicFrame>
+        <p:nvGraphicFramePr>
+          <p:cNvPr id="6" name="Content Placeholder 5"/>
+          <p:cNvGraphicFramePr>
+            <a:graphicFrameLocks noGrp="1"/>
+          </p:cNvGraphicFramePr>
           <p:nvPr>
             <p:ph idx="1"/>
-          </p:nvPr>
-        </p:nvSpPr>
-        <p:spPr/>
-        <p:txBody>
-          <a:bodyPr>
-            <a:normAutofit fontScale="92500" lnSpcReduction="10000"/>
-          </a:bodyPr>
-          <a:lstStyle/>
-          <a:p>
-            <a:r>
-              <a:rPr lang="pt-BR" dirty="0" smtClean="0">
-                <a:solidFill>
-                  <a:schemeClr val="bg1"/>
-                </a:solidFill>
-              </a:rPr>
-              <a:t>Site oficial do </a:t>
-            </a:r>
-            <a:r>
-              <a:rPr lang="pt-BR" dirty="0" err="1" smtClean="0">
-                <a:solidFill>
-                  <a:schemeClr val="bg1"/>
-                </a:solidFill>
-              </a:rPr>
-              <a:t>Unity</a:t>
-            </a:r>
-            <a:endParaRPr lang="pt-BR" dirty="0" smtClean="0">
-              <a:solidFill>
-                <a:schemeClr val="bg1"/>
-              </a:solidFill>
-            </a:endParaRPr>
-          </a:p>
-          <a:p>
-            <a:pPr marL="0" indent="0">
-              <a:buNone/>
-            </a:pPr>
-            <a:r>
-              <a:rPr lang="pt-BR" dirty="0" smtClean="0">
-                <a:solidFill>
-                  <a:schemeClr val="bg1"/>
-                </a:solidFill>
-              </a:rPr>
-              <a:t>[</a:t>
-            </a:r>
-            <a:r>
-              <a:rPr lang="pt-BR" dirty="0">
-                <a:hlinkClick r:id="rId2"/>
-              </a:rPr>
-              <a:t>http://portuguese.unity3d.com</a:t>
-            </a:r>
-            <a:r>
-              <a:rPr lang="pt-BR" dirty="0" smtClean="0">
-                <a:hlinkClick r:id="rId2"/>
-              </a:rPr>
-              <a:t>/</a:t>
-            </a:r>
-            <a:r>
-              <a:rPr lang="pt-BR" dirty="0" smtClean="0">
-                <a:solidFill>
-                  <a:schemeClr val="bg1"/>
-                </a:solidFill>
-              </a:rPr>
-              <a:t>]</a:t>
-            </a:r>
-          </a:p>
-          <a:p>
-            <a:endParaRPr lang="pt-BR" dirty="0" smtClean="0">
-              <a:hlinkClick r:id="rId3"/>
-            </a:endParaRPr>
-          </a:p>
-          <a:p>
-            <a:pPr marL="0" indent="0">
-              <a:buNone/>
-            </a:pPr>
-            <a:r>
-              <a:rPr lang="pt-BR" dirty="0" smtClean="0">
-                <a:hlinkClick r:id="rId3"/>
-              </a:rPr>
-              <a:t>http</a:t>
-            </a:r>
-            <a:r>
-              <a:rPr lang="pt-BR" dirty="0">
-                <a:hlinkClick r:id="rId3"/>
-              </a:rPr>
-              <a:t>://</a:t>
-            </a:r>
-            <a:r>
-              <a:rPr lang="pt-BR" dirty="0" smtClean="0">
-                <a:hlinkClick r:id="rId3"/>
-              </a:rPr>
-              <a:t>www.devmedia.com.br/desenvolva-jogos-com-a-unity-3d/29125</a:t>
-            </a:r>
-            <a:endParaRPr lang="pt-BR" dirty="0" smtClean="0"/>
-          </a:p>
-          <a:p>
-            <a:endParaRPr lang="pt-BR" dirty="0" smtClean="0">
-              <a:solidFill>
-                <a:schemeClr val="bg1"/>
-              </a:solidFill>
-            </a:endParaRPr>
-          </a:p>
-          <a:p>
-            <a:r>
-              <a:rPr lang="pt-BR" dirty="0">
-                <a:solidFill>
-                  <a:schemeClr val="bg1"/>
-                </a:solidFill>
-              </a:rPr>
-              <a:t>CHANDLER, Heather Maxwell. </a:t>
-            </a:r>
-            <a:r>
-              <a:rPr lang="pt-BR" b="1" dirty="0">
-                <a:solidFill>
-                  <a:schemeClr val="bg1"/>
-                </a:solidFill>
-              </a:rPr>
-              <a:t>Manual de produção de jogos digitais. </a:t>
-            </a:r>
-            <a:r>
-              <a:rPr lang="pt-BR" dirty="0">
-                <a:solidFill>
-                  <a:schemeClr val="bg1"/>
-                </a:solidFill>
-              </a:rPr>
-              <a:t>2. ed. Porto Alegre: </a:t>
-            </a:r>
-            <a:r>
-              <a:rPr lang="pt-BR" dirty="0" err="1">
-                <a:solidFill>
-                  <a:schemeClr val="bg1"/>
-                </a:solidFill>
-              </a:rPr>
-              <a:t>Bookman</a:t>
-            </a:r>
-            <a:r>
-              <a:rPr lang="pt-BR" dirty="0">
-                <a:solidFill>
-                  <a:schemeClr val="bg1"/>
-                </a:solidFill>
-              </a:rPr>
-              <a:t>, 2012.</a:t>
-            </a:r>
-            <a:endParaRPr lang="pt-BR" dirty="0">
-              <a:solidFill>
-                <a:schemeClr val="bg1"/>
-              </a:solidFill>
-            </a:endParaRPr>
-          </a:p>
-          <a:p>
-            <a:endParaRPr lang="pt-BR" dirty="0" smtClean="0">
-              <a:solidFill>
-                <a:schemeClr val="bg1"/>
-              </a:solidFill>
-            </a:endParaRPr>
-          </a:p>
-          <a:p>
-            <a:endParaRPr lang="pt-BR" dirty="0">
-              <a:solidFill>
-                <a:schemeClr val="bg1"/>
-              </a:solidFill>
-            </a:endParaRPr>
-          </a:p>
-        </p:txBody>
-      </p:sp>
+            <p:extLst>
+              <p:ext uri="{D42A27DB-BD31-4B8C-83A1-F6EECF244321}">
+                <p14:modId xmlns:p14="http://schemas.microsoft.com/office/powerpoint/2010/main" val="871053414"/>
+              </p:ext>
+            </p:extLst>
+          </p:nvPr>
+        </p:nvGraphicFramePr>
+        <p:xfrm>
+          <a:off x="457200" y="1600200"/>
+          <a:ext cx="8229600" cy="4480560"/>
+        </p:xfrm>
+        <a:graphic>
+          <a:graphicData uri="http://schemas.openxmlformats.org/drawingml/2006/table">
+            <a:tbl>
+              <a:tblPr firstRow="1" bandRow="1">
+                <a:tableStyleId>{5C22544A-7EE6-4342-B048-85BDC9FD1C3A}</a:tableStyleId>
+              </a:tblPr>
+              <a:tblGrid>
+                <a:gridCol w="2530624"/>
+                <a:gridCol w="5698976"/>
+              </a:tblGrid>
+              <a:tr h="370840">
+                <a:tc>
+                  <a:txBody>
+                    <a:bodyPr/>
+                    <a:lstStyle/>
+                    <a:p>
+                      <a:r>
+                        <a:rPr lang="pt-BR" sz="3600" noProof="0" smtClean="0"/>
+                        <a:t>Data</a:t>
+                      </a:r>
+                      <a:endParaRPr lang="pt-BR" sz="3600" noProof="0"/>
+                    </a:p>
+                  </a:txBody>
+                  <a:tcPr/>
+                </a:tc>
+                <a:tc>
+                  <a:txBody>
+                    <a:bodyPr/>
+                    <a:lstStyle/>
+                    <a:p>
+                      <a:r>
+                        <a:rPr lang="pt-BR" sz="3600" noProof="0" smtClean="0"/>
+                        <a:t>Atividade</a:t>
+                      </a:r>
+                      <a:endParaRPr lang="pt-BR" sz="3600" noProof="0"/>
+                    </a:p>
+                  </a:txBody>
+                  <a:tcPr/>
+                </a:tc>
+              </a:tr>
+              <a:tr h="370840">
+                <a:tc>
+                  <a:txBody>
+                    <a:bodyPr/>
+                    <a:lstStyle/>
+                    <a:p>
+                      <a:endParaRPr lang="pt-BR" sz="3600" noProof="0"/>
+                    </a:p>
+                  </a:txBody>
+                  <a:tcPr/>
+                </a:tc>
+                <a:tc>
+                  <a:txBody>
+                    <a:bodyPr/>
+                    <a:lstStyle/>
+                    <a:p>
+                      <a:r>
+                        <a:rPr lang="pt-BR" sz="3600" noProof="0" dirty="0" smtClean="0"/>
+                        <a:t>Pr</a:t>
+                      </a:r>
+                      <a:r>
+                        <a:rPr lang="pt-BR" sz="3600" noProof="0" dirty="0" smtClean="0"/>
+                        <a:t>é-produção</a:t>
+                      </a:r>
+                      <a:endParaRPr lang="pt-BR" sz="3600" noProof="0" dirty="0"/>
+                    </a:p>
+                  </a:txBody>
+                  <a:tcPr/>
+                </a:tc>
+              </a:tr>
+              <a:tr h="370840">
+                <a:tc>
+                  <a:txBody>
+                    <a:bodyPr/>
+                    <a:lstStyle/>
+                    <a:p>
+                      <a:endParaRPr lang="en-US" sz="3600" dirty="0"/>
+                    </a:p>
+                  </a:txBody>
+                  <a:tcPr/>
+                </a:tc>
+                <a:tc>
+                  <a:txBody>
+                    <a:bodyPr/>
+                    <a:lstStyle/>
+                    <a:p>
+                      <a:r>
+                        <a:rPr lang="en-US" sz="3600" dirty="0" smtClean="0"/>
+                        <a:t>Plano</a:t>
+                      </a:r>
+                      <a:r>
+                        <a:rPr lang="en-US" sz="3600" baseline="0" dirty="0" smtClean="0"/>
+                        <a:t> de release</a:t>
+                      </a:r>
+                      <a:endParaRPr lang="en-US" sz="3600" dirty="0"/>
+                    </a:p>
+                  </a:txBody>
+                  <a:tcPr/>
+                </a:tc>
+              </a:tr>
+              <a:tr h="370840">
+                <a:tc>
+                  <a:txBody>
+                    <a:bodyPr/>
+                    <a:lstStyle/>
+                    <a:p>
+                      <a:endParaRPr lang="en-US" sz="3600" dirty="0"/>
+                    </a:p>
+                  </a:txBody>
+                  <a:tcPr/>
+                </a:tc>
+                <a:tc>
+                  <a:txBody>
+                    <a:bodyPr/>
+                    <a:lstStyle/>
+                    <a:p>
+                      <a:r>
+                        <a:rPr lang="en-US" sz="3600" dirty="0" smtClean="0"/>
+                        <a:t>Release 1</a:t>
+                      </a:r>
+                      <a:endParaRPr lang="en-US" sz="3600" dirty="0"/>
+                    </a:p>
+                  </a:txBody>
+                  <a:tcPr/>
+                </a:tc>
+              </a:tr>
+              <a:tr h="370840">
+                <a:tc>
+                  <a:txBody>
+                    <a:bodyPr/>
+                    <a:lstStyle/>
+                    <a:p>
+                      <a:endParaRPr lang="en-US" sz="3600" dirty="0"/>
+                    </a:p>
+                  </a:txBody>
+                  <a:tcPr/>
+                </a:tc>
+                <a:tc>
+                  <a:txBody>
+                    <a:bodyPr/>
+                    <a:lstStyle/>
+                    <a:p>
+                      <a:r>
+                        <a:rPr lang="en-US" sz="3600" dirty="0" smtClean="0"/>
+                        <a:t>Release 2</a:t>
+                      </a:r>
+                      <a:endParaRPr lang="en-US" sz="3600" dirty="0"/>
+                    </a:p>
+                  </a:txBody>
+                  <a:tcPr/>
+                </a:tc>
+              </a:tr>
+              <a:tr h="370840">
+                <a:tc>
+                  <a:txBody>
+                    <a:bodyPr/>
+                    <a:lstStyle/>
+                    <a:p>
+                      <a:endParaRPr lang="en-US" sz="3600" dirty="0"/>
+                    </a:p>
+                  </a:txBody>
+                  <a:tcPr/>
+                </a:tc>
+                <a:tc>
+                  <a:txBody>
+                    <a:bodyPr/>
+                    <a:lstStyle/>
+                    <a:p>
+                      <a:r>
+                        <a:rPr lang="en-US" sz="3600" dirty="0" smtClean="0"/>
+                        <a:t>Release 3</a:t>
+                      </a:r>
+                      <a:endParaRPr lang="en-US" sz="3600" dirty="0"/>
+                    </a:p>
+                  </a:txBody>
+                  <a:tcPr/>
+                </a:tc>
+              </a:tr>
+              <a:tr h="370840">
+                <a:tc>
+                  <a:txBody>
+                    <a:bodyPr/>
+                    <a:lstStyle/>
+                    <a:p>
+                      <a:endParaRPr lang="en-US" sz="3600" dirty="0"/>
+                    </a:p>
+                  </a:txBody>
+                  <a:tcPr/>
+                </a:tc>
+                <a:tc>
+                  <a:txBody>
+                    <a:bodyPr/>
+                    <a:lstStyle/>
+                    <a:p>
+                      <a:r>
+                        <a:rPr lang="en-US" sz="3600" dirty="0" smtClean="0"/>
+                        <a:t>Release …</a:t>
+                      </a:r>
+                      <a:endParaRPr lang="en-US" sz="3600" dirty="0"/>
+                    </a:p>
+                  </a:txBody>
+                  <a:tcPr/>
+                </a:tc>
+              </a:tr>
+            </a:tbl>
+          </a:graphicData>
+        </a:graphic>
+      </p:graphicFrame>
     </p:spTree>
+    <p:extLst>
+      <p:ext uri="{BB962C8B-B14F-4D97-AF65-F5344CB8AC3E}">
+        <p14:creationId xmlns:p14="http://schemas.microsoft.com/office/powerpoint/2010/main" val="3180058414"/>
+      </p:ext>
+    </p:extLst>
   </p:cSld>
   <p:clrMapOvr>
     <a:masterClrMapping/>
   </p:clrMapOvr>
-  <p:timing>
-    <p:tnLst>
-      <p:par>
-        <p:cTn id="1" dur="indefinite" restart="never" nodeType="tmRoot"/>
-      </p:par>
-    </p:tnLst>
-  </p:timing>
 </p:sld>
 </file>
 
@@ -4032,80 +5258,491 @@
       </p:grpSpPr>
       <p:sp>
         <p:nvSpPr>
-          <p:cNvPr id="2" name="CaixaDeTexto 1"/>
-          <p:cNvSpPr txBox="1"/>
-          <p:nvPr/>
-        </p:nvSpPr>
-        <p:spPr>
-          <a:xfrm>
-            <a:off x="395536" y="692696"/>
-            <a:ext cx="8064896" cy="3693319"/>
-          </a:xfrm>
-          <a:prstGeom prst="rect">
-            <a:avLst/>
-          </a:prstGeom>
-          <a:noFill/>
-        </p:spPr>
-        <p:txBody>
-          <a:bodyPr wrap="square" rtlCol="0">
-            <a:spAutoFit/>
-          </a:bodyPr>
-          <a:lstStyle/>
-          <a:p>
-            <a:endParaRPr lang="pt-BR" dirty="0" smtClean="0"/>
-          </a:p>
-          <a:p>
-            <a:endParaRPr lang="pt-BR" dirty="0"/>
-          </a:p>
-          <a:p>
-            <a:endParaRPr lang="pt-BR" dirty="0" smtClean="0"/>
-          </a:p>
-          <a:p>
-            <a:endParaRPr lang="pt-BR" dirty="0"/>
-          </a:p>
-          <a:p>
-            <a:endParaRPr lang="pt-BR" dirty="0" smtClean="0"/>
-          </a:p>
-          <a:p>
-            <a:endParaRPr lang="pt-BR" dirty="0"/>
-          </a:p>
-          <a:p>
-            <a:endParaRPr lang="pt-BR" dirty="0" smtClean="0"/>
-          </a:p>
-          <a:p>
-            <a:endParaRPr lang="pt-BR" dirty="0"/>
-          </a:p>
-          <a:p>
-            <a:endParaRPr lang="pt-BR" dirty="0" smtClean="0"/>
-          </a:p>
-          <a:p>
-            <a:endParaRPr lang="pt-BR" dirty="0"/>
-          </a:p>
-          <a:p>
-            <a:endParaRPr lang="pt-BR" dirty="0" smtClean="0"/>
-          </a:p>
-          <a:p>
-            <a:endParaRPr lang="pt-BR" dirty="0"/>
-          </a:p>
-          <a:p>
-            <a:r>
-              <a:rPr lang="pt-BR" dirty="0" err="1" smtClean="0"/>
-              <a:t>bfd</a:t>
-            </a:r>
-            <a:endParaRPr lang="pt-BR" dirty="0"/>
-          </a:p>
-        </p:txBody>
-      </p:sp>
+          <p:cNvPr id="4" name="Title 3"/>
+          <p:cNvSpPr>
+            <a:spLocks noGrp="1"/>
+          </p:cNvSpPr>
+          <p:nvPr>
+            <p:ph type="title"/>
+          </p:nvPr>
+        </p:nvSpPr>
+        <p:spPr/>
+        <p:txBody>
+          <a:bodyPr/>
+          <a:lstStyle/>
+          <a:p>
+            <a:r>
+              <a:rPr lang="en-US" dirty="0" err="1" smtClean="0">
+                <a:solidFill>
+                  <a:srgbClr val="FFFFFF"/>
+                </a:solidFill>
+              </a:rPr>
+              <a:t>Cronograma</a:t>
+            </a:r>
+            <a:r>
+              <a:rPr lang="en-US" dirty="0" smtClean="0">
+                <a:solidFill>
+                  <a:srgbClr val="FFFFFF"/>
+                </a:solidFill>
+              </a:rPr>
+              <a:t> - </a:t>
+            </a:r>
+            <a:r>
+              <a:rPr lang="en-US" dirty="0" err="1" smtClean="0">
+                <a:solidFill>
+                  <a:srgbClr val="FFFFFF"/>
+                </a:solidFill>
+              </a:rPr>
+              <a:t>Monografia</a:t>
+            </a:r>
+            <a:endParaRPr lang="en-US" dirty="0">
+              <a:solidFill>
+                <a:srgbClr val="FFFFFF"/>
+              </a:solidFill>
+            </a:endParaRPr>
+          </a:p>
+        </p:txBody>
+      </p:sp>
+      <p:graphicFrame>
+        <p:nvGraphicFramePr>
+          <p:cNvPr id="6" name="Content Placeholder 5"/>
+          <p:cNvGraphicFramePr>
+            <a:graphicFrameLocks noGrp="1"/>
+          </p:cNvGraphicFramePr>
+          <p:nvPr>
+            <p:ph idx="1"/>
+            <p:extLst>
+              <p:ext uri="{D42A27DB-BD31-4B8C-83A1-F6EECF244321}">
+                <p14:modId xmlns:p14="http://schemas.microsoft.com/office/powerpoint/2010/main" val="2672497424"/>
+              </p:ext>
+            </p:extLst>
+          </p:nvPr>
+        </p:nvGraphicFramePr>
+        <p:xfrm>
+          <a:off x="457200" y="1600200"/>
+          <a:ext cx="8229600" cy="3840480"/>
+        </p:xfrm>
+        <a:graphic>
+          <a:graphicData uri="http://schemas.openxmlformats.org/drawingml/2006/table">
+            <a:tbl>
+              <a:tblPr firstRow="1" bandRow="1">
+                <a:tableStyleId>{5C22544A-7EE6-4342-B048-85BDC9FD1C3A}</a:tableStyleId>
+              </a:tblPr>
+              <a:tblGrid>
+                <a:gridCol w="2530624"/>
+                <a:gridCol w="5698976"/>
+              </a:tblGrid>
+              <a:tr h="370840">
+                <a:tc>
+                  <a:txBody>
+                    <a:bodyPr/>
+                    <a:lstStyle/>
+                    <a:p>
+                      <a:r>
+                        <a:rPr lang="pt-BR" sz="3600" noProof="0" smtClean="0"/>
+                        <a:t>Data</a:t>
+                      </a:r>
+                      <a:endParaRPr lang="pt-BR" sz="3600" noProof="0"/>
+                    </a:p>
+                  </a:txBody>
+                  <a:tcPr/>
+                </a:tc>
+                <a:tc>
+                  <a:txBody>
+                    <a:bodyPr/>
+                    <a:lstStyle/>
+                    <a:p>
+                      <a:r>
+                        <a:rPr lang="pt-BR" sz="3600" noProof="0" dirty="0" smtClean="0"/>
+                        <a:t>Cap</a:t>
+                      </a:r>
+                      <a:r>
+                        <a:rPr lang="pt-BR" sz="3600" noProof="0" dirty="0" smtClean="0"/>
+                        <a:t>ítulo</a:t>
+                      </a:r>
+                      <a:endParaRPr lang="pt-BR" sz="3600" noProof="0" dirty="0"/>
+                    </a:p>
+                  </a:txBody>
+                  <a:tcPr/>
+                </a:tc>
+              </a:tr>
+              <a:tr h="370840">
+                <a:tc>
+                  <a:txBody>
+                    <a:bodyPr/>
+                    <a:lstStyle/>
+                    <a:p>
+                      <a:endParaRPr lang="pt-BR" sz="3600" noProof="0" dirty="0"/>
+                    </a:p>
+                  </a:txBody>
+                  <a:tcPr/>
+                </a:tc>
+                <a:tc>
+                  <a:txBody>
+                    <a:bodyPr/>
+                    <a:lstStyle/>
+                    <a:p>
+                      <a:r>
+                        <a:rPr lang="pt-BR" sz="3600" noProof="0" dirty="0" smtClean="0"/>
+                        <a:t>Estrutura do</a:t>
+                      </a:r>
+                      <a:r>
+                        <a:rPr lang="pt-BR" sz="3600" baseline="0" noProof="0" dirty="0" smtClean="0"/>
+                        <a:t> documento</a:t>
+                      </a:r>
+                      <a:endParaRPr lang="pt-BR" sz="3600" noProof="0" dirty="0" smtClean="0"/>
+                    </a:p>
+                  </a:txBody>
+                  <a:tcPr/>
+                </a:tc>
+              </a:tr>
+              <a:tr h="370840">
+                <a:tc>
+                  <a:txBody>
+                    <a:bodyPr/>
+                    <a:lstStyle/>
+                    <a:p>
+                      <a:endParaRPr lang="pt-BR" sz="3600" noProof="0" dirty="0"/>
+                    </a:p>
+                  </a:txBody>
+                  <a:tcPr/>
+                </a:tc>
+                <a:tc>
+                  <a:txBody>
+                    <a:bodyPr/>
+                    <a:lstStyle/>
+                    <a:p>
+                      <a:r>
+                        <a:rPr lang="pt-BR" sz="3600" noProof="0" dirty="0" smtClean="0"/>
+                        <a:t>1 - Introdu</a:t>
+                      </a:r>
+                      <a:r>
+                        <a:rPr lang="pt-BR" sz="3600" noProof="0" dirty="0" smtClean="0"/>
+                        <a:t>ção</a:t>
+                      </a:r>
+                    </a:p>
+                  </a:txBody>
+                  <a:tcPr/>
+                </a:tc>
+              </a:tr>
+              <a:tr h="370840">
+                <a:tc>
+                  <a:txBody>
+                    <a:bodyPr/>
+                    <a:lstStyle/>
+                    <a:p>
+                      <a:endParaRPr lang="pt-BR" sz="3600" noProof="0" dirty="0"/>
+                    </a:p>
+                  </a:txBody>
+                  <a:tcPr/>
+                </a:tc>
+                <a:tc>
+                  <a:txBody>
+                    <a:bodyPr/>
+                    <a:lstStyle/>
+                    <a:p>
+                      <a:r>
+                        <a:rPr lang="pt-BR" sz="3600" noProof="0" dirty="0" smtClean="0"/>
+                        <a:t>2 - Referencial teórico</a:t>
+                      </a:r>
+                    </a:p>
+                  </a:txBody>
+                  <a:tcPr/>
+                </a:tc>
+              </a:tr>
+              <a:tr h="370840">
+                <a:tc>
+                  <a:txBody>
+                    <a:bodyPr/>
+                    <a:lstStyle/>
+                    <a:p>
+                      <a:endParaRPr lang="pt-BR" sz="3600" noProof="0" dirty="0"/>
+                    </a:p>
+                  </a:txBody>
+                  <a:tcPr/>
+                </a:tc>
+                <a:tc>
+                  <a:txBody>
+                    <a:bodyPr/>
+                    <a:lstStyle/>
+                    <a:p>
+                      <a:r>
+                        <a:rPr lang="pt-BR" sz="3600" noProof="0" dirty="0" smtClean="0"/>
+                        <a:t>3 - Desenvolvimento do jogo</a:t>
+                      </a:r>
+                    </a:p>
+                  </a:txBody>
+                  <a:tcPr/>
+                </a:tc>
+              </a:tr>
+              <a:tr h="370840">
+                <a:tc>
+                  <a:txBody>
+                    <a:bodyPr/>
+                    <a:lstStyle/>
+                    <a:p>
+                      <a:endParaRPr lang="pt-BR" sz="3600" noProof="0" dirty="0"/>
+                    </a:p>
+                  </a:txBody>
+                  <a:tcPr/>
+                </a:tc>
+                <a:tc>
+                  <a:txBody>
+                    <a:bodyPr/>
+                    <a:lstStyle/>
+                    <a:p>
+                      <a:r>
+                        <a:rPr lang="pt-BR" sz="3600" noProof="0" dirty="0" smtClean="0"/>
+                        <a:t>4 - Considerações finais</a:t>
+                      </a:r>
+                    </a:p>
+                  </a:txBody>
+                  <a:tcPr/>
+                </a:tc>
+              </a:tr>
+            </a:tbl>
+          </a:graphicData>
+        </a:graphic>
+      </p:graphicFrame>
     </p:spTree>
     <p:extLst>
       <p:ext uri="{BB962C8B-B14F-4D97-AF65-F5344CB8AC3E}">
-        <p14:creationId xmlns:p14="http://schemas.microsoft.com/office/powerpoint/2010/main" val="1195320086"/>
+        <p14:creationId xmlns:p14="http://schemas.microsoft.com/office/powerpoint/2010/main" val="3711484762"/>
       </p:ext>
     </p:extLst>
   </p:cSld>
   <p:clrMapOvr>
     <a:masterClrMapping/>
   </p:clrMapOvr>
+</p:sld>
+</file>
+
+<file path=ppt/slides/slide15.xml><?xml version="1.0" encoding="utf-8"?>
+<p:sld xmlns:a="http://schemas.openxmlformats.org/drawingml/2006/main" xmlns:r="http://schemas.openxmlformats.org/officeDocument/2006/relationships" xmlns:p="http://schemas.openxmlformats.org/presentationml/2006/main">
+  <p:cSld>
+    <p:spTree>
+      <p:nvGrpSpPr>
+        <p:cNvPr id="1" name=""/>
+        <p:cNvGrpSpPr/>
+        <p:nvPr/>
+      </p:nvGrpSpPr>
+      <p:grpSpPr>
+        <a:xfrm>
+          <a:off x="0" y="0"/>
+          <a:ext cx="0" cy="0"/>
+          <a:chOff x="0" y="0"/>
+          <a:chExt cx="0" cy="0"/>
+        </a:xfrm>
+      </p:grpSpPr>
+      <p:sp>
+        <p:nvSpPr>
+          <p:cNvPr id="2" name="Título 1"/>
+          <p:cNvSpPr>
+            <a:spLocks noGrp="1"/>
+          </p:cNvSpPr>
+          <p:nvPr>
+            <p:ph type="title"/>
+          </p:nvPr>
+        </p:nvSpPr>
+        <p:spPr/>
+        <p:txBody>
+          <a:bodyPr/>
+          <a:lstStyle/>
+          <a:p>
+            <a:r>
+              <a:rPr lang="pt-BR" altLang="pt-BR" dirty="0">
+                <a:solidFill>
+                  <a:schemeClr val="bg1"/>
+                </a:solidFill>
+              </a:rPr>
+              <a:t>Bibliografia</a:t>
+            </a:r>
+            <a:endParaRPr lang="pt-BR" dirty="0">
+              <a:solidFill>
+                <a:schemeClr val="bg1"/>
+              </a:solidFill>
+            </a:endParaRPr>
+          </a:p>
+        </p:txBody>
+      </p:sp>
+      <p:sp>
+        <p:nvSpPr>
+          <p:cNvPr id="3" name="Espaço Reservado para Conteúdo 2"/>
+          <p:cNvSpPr>
+            <a:spLocks noGrp="1"/>
+          </p:cNvSpPr>
+          <p:nvPr>
+            <p:ph idx="1"/>
+          </p:nvPr>
+        </p:nvSpPr>
+        <p:spPr/>
+        <p:txBody>
+          <a:bodyPr>
+            <a:normAutofit fontScale="92500" lnSpcReduction="10000"/>
+          </a:bodyPr>
+          <a:lstStyle/>
+          <a:p>
+            <a:r>
+              <a:rPr lang="pt-BR" dirty="0" smtClean="0">
+                <a:solidFill>
+                  <a:schemeClr val="bg1"/>
+                </a:solidFill>
+              </a:rPr>
+              <a:t>Site oficial do </a:t>
+            </a:r>
+            <a:r>
+              <a:rPr lang="pt-BR" dirty="0" err="1" smtClean="0">
+                <a:solidFill>
+                  <a:schemeClr val="bg1"/>
+                </a:solidFill>
+              </a:rPr>
+              <a:t>Unity</a:t>
+            </a:r>
+            <a:endParaRPr lang="pt-BR" dirty="0" smtClean="0">
+              <a:solidFill>
+                <a:schemeClr val="bg1"/>
+              </a:solidFill>
+            </a:endParaRPr>
+          </a:p>
+          <a:p>
+            <a:pPr marL="0" indent="0">
+              <a:buNone/>
+            </a:pPr>
+            <a:r>
+              <a:rPr lang="pt-BR" dirty="0" smtClean="0">
+                <a:solidFill>
+                  <a:schemeClr val="bg1"/>
+                </a:solidFill>
+              </a:rPr>
+              <a:t>[</a:t>
+            </a:r>
+            <a:r>
+              <a:rPr lang="pt-BR" dirty="0">
+                <a:hlinkClick r:id="rId2"/>
+              </a:rPr>
+              <a:t>http://portuguese.unity3d.com</a:t>
+            </a:r>
+            <a:r>
+              <a:rPr lang="pt-BR" dirty="0" smtClean="0">
+                <a:hlinkClick r:id="rId2"/>
+              </a:rPr>
+              <a:t>/</a:t>
+            </a:r>
+            <a:r>
+              <a:rPr lang="pt-BR" dirty="0" smtClean="0">
+                <a:solidFill>
+                  <a:schemeClr val="bg1"/>
+                </a:solidFill>
+              </a:rPr>
+              <a:t>]</a:t>
+            </a:r>
+          </a:p>
+          <a:p>
+            <a:endParaRPr lang="pt-BR" dirty="0" smtClean="0">
+              <a:hlinkClick r:id="rId3"/>
+            </a:endParaRPr>
+          </a:p>
+          <a:p>
+            <a:pPr marL="0" indent="0">
+              <a:buNone/>
+            </a:pPr>
+            <a:r>
+              <a:rPr lang="pt-BR" dirty="0" smtClean="0">
+                <a:hlinkClick r:id="rId3"/>
+              </a:rPr>
+              <a:t>http</a:t>
+            </a:r>
+            <a:r>
+              <a:rPr lang="pt-BR" dirty="0">
+                <a:hlinkClick r:id="rId3"/>
+              </a:rPr>
+              <a:t>://</a:t>
+            </a:r>
+            <a:r>
+              <a:rPr lang="pt-BR" dirty="0" smtClean="0">
+                <a:hlinkClick r:id="rId3"/>
+              </a:rPr>
+              <a:t>www.devmedia.com.br/desenvolva-jogos-com-a-unity-3d/29125</a:t>
+            </a:r>
+            <a:endParaRPr lang="pt-BR" dirty="0" smtClean="0"/>
+          </a:p>
+          <a:p>
+            <a:endParaRPr lang="pt-BR" dirty="0" smtClean="0">
+              <a:solidFill>
+                <a:schemeClr val="bg1"/>
+              </a:solidFill>
+            </a:endParaRPr>
+          </a:p>
+          <a:p>
+            <a:r>
+              <a:rPr lang="pt-BR" dirty="0">
+                <a:solidFill>
+                  <a:schemeClr val="bg1"/>
+                </a:solidFill>
+              </a:rPr>
+              <a:t>CHANDLER, Heather Maxwell. </a:t>
+            </a:r>
+            <a:r>
+              <a:rPr lang="pt-BR" b="1" dirty="0">
+                <a:solidFill>
+                  <a:schemeClr val="bg1"/>
+                </a:solidFill>
+              </a:rPr>
+              <a:t>Manual de produção de jogos digitais. </a:t>
+            </a:r>
+            <a:r>
+              <a:rPr lang="pt-BR" dirty="0">
+                <a:solidFill>
+                  <a:schemeClr val="bg1"/>
+                </a:solidFill>
+              </a:rPr>
+              <a:t>2. ed. Porto Alegre: </a:t>
+            </a:r>
+            <a:r>
+              <a:rPr lang="pt-BR" dirty="0" err="1">
+                <a:solidFill>
+                  <a:schemeClr val="bg1"/>
+                </a:solidFill>
+              </a:rPr>
+              <a:t>Bookman</a:t>
+            </a:r>
+            <a:r>
+              <a:rPr lang="pt-BR" dirty="0">
+                <a:solidFill>
+                  <a:schemeClr val="bg1"/>
+                </a:solidFill>
+              </a:rPr>
+              <a:t>, 2012.</a:t>
+            </a:r>
+          </a:p>
+          <a:p>
+            <a:endParaRPr lang="pt-BR" dirty="0" smtClean="0">
+              <a:solidFill>
+                <a:schemeClr val="bg1"/>
+              </a:solidFill>
+            </a:endParaRPr>
+          </a:p>
+          <a:p>
+            <a:endParaRPr lang="pt-BR" dirty="0">
+              <a:solidFill>
+                <a:schemeClr val="bg1"/>
+              </a:solidFill>
+            </a:endParaRPr>
+          </a:p>
+        </p:txBody>
+      </p:sp>
+    </p:spTree>
+  </p:cSld>
+  <p:clrMapOvr>
+    <a:masterClrMapping/>
+  </p:clrMapOvr>
+  <p:timing>
+    <p:tnLst>
+      <p:par>
+        <p:cTn xmlns:p14="http://schemas.microsoft.com/office/powerpoint/2010/main" id="1" dur="indefinite" restart="never" nodeType="tmRoot"/>
+      </p:par>
+    </p:tnLst>
+  </p:timing>
 </p:sld>
 </file>
 
@@ -4128,7 +5765,7 @@
       </p:grpSpPr>
       <p:sp>
         <p:nvSpPr>
-          <p:cNvPr id="2" name="Título 1"/>
+          <p:cNvPr id="2" name="Title 1"/>
           <p:cNvSpPr>
             <a:spLocks noGrp="1"/>
           </p:cNvSpPr>
@@ -4142,125 +5779,118 @@
           <a:lstStyle/>
           <a:p>
             <a:r>
+              <a:rPr lang="en-US" dirty="0" err="1" smtClean="0">
+                <a:solidFill>
+                  <a:srgbClr val="FFFFFF"/>
+                </a:solidFill>
+              </a:rPr>
+              <a:t>Sum</a:t>
+            </a:r>
+            <a:r>
+              <a:rPr lang="en-US" dirty="0" err="1" smtClean="0">
+                <a:solidFill>
+                  <a:srgbClr val="FFFFFF"/>
+                </a:solidFill>
+              </a:rPr>
+              <a:t>ário</a:t>
+            </a:r>
+            <a:endParaRPr lang="en-US" dirty="0">
+              <a:solidFill>
+                <a:srgbClr val="FFFFFF"/>
+              </a:solidFill>
+            </a:endParaRPr>
+          </a:p>
+        </p:txBody>
+      </p:sp>
+      <p:sp>
+        <p:nvSpPr>
+          <p:cNvPr id="4" name="Content Placeholder 3"/>
+          <p:cNvSpPr>
+            <a:spLocks noGrp="1"/>
+          </p:cNvSpPr>
+          <p:nvPr>
+            <p:ph idx="1"/>
+          </p:nvPr>
+        </p:nvSpPr>
+        <p:spPr/>
+        <p:txBody>
+          <a:bodyPr/>
+          <a:lstStyle/>
+          <a:p>
+            <a:r>
               <a:rPr lang="pt-BR" dirty="0" smtClean="0">
                 <a:solidFill>
-                  <a:schemeClr val="bg1"/>
-                </a:solidFill>
-              </a:rPr>
-              <a:t>Introdução</a:t>
+                  <a:srgbClr val="FFFFFF"/>
+                </a:solidFill>
+              </a:rPr>
+              <a:t>Introdu</a:t>
+            </a:r>
+            <a:r>
+              <a:rPr lang="pt-BR" dirty="0" smtClean="0">
+                <a:solidFill>
+                  <a:srgbClr val="FFFFFF"/>
+                </a:solidFill>
+              </a:rPr>
+              <a:t>ção</a:t>
+            </a:r>
+          </a:p>
+          <a:p>
+            <a:r>
+              <a:rPr lang="pt-BR" dirty="0" smtClean="0">
+                <a:solidFill>
+                  <a:srgbClr val="FFFFFF"/>
+                </a:solidFill>
+              </a:rPr>
+              <a:t>Fundamenta</a:t>
+            </a:r>
+            <a:r>
+              <a:rPr lang="pt-BR" dirty="0" smtClean="0">
+                <a:solidFill>
+                  <a:srgbClr val="FFFFFF"/>
+                </a:solidFill>
+              </a:rPr>
+              <a:t>ção </a:t>
+            </a:r>
+            <a:r>
+              <a:rPr lang="pt-BR" dirty="0" smtClean="0">
+                <a:solidFill>
+                  <a:srgbClr val="FFFFFF"/>
+                </a:solidFill>
+              </a:rPr>
+              <a:t>te</a:t>
+            </a:r>
+            <a:r>
+              <a:rPr lang="pt-BR" dirty="0" smtClean="0">
+                <a:solidFill>
+                  <a:srgbClr val="FFFFFF"/>
+                </a:solidFill>
+              </a:rPr>
+              <a:t>órica</a:t>
+            </a:r>
+          </a:p>
+          <a:p>
+            <a:r>
+              <a:rPr lang="pt-BR" dirty="0" smtClean="0">
+                <a:solidFill>
+                  <a:srgbClr val="FFFFFF"/>
+                </a:solidFill>
+              </a:rPr>
+              <a:t>Cronograma</a:t>
             </a:r>
             <a:endParaRPr lang="pt-BR" dirty="0">
               <a:solidFill>
-                <a:schemeClr val="bg1"/>
+                <a:srgbClr val="FFFFFF"/>
               </a:solidFill>
             </a:endParaRPr>
           </a:p>
         </p:txBody>
       </p:sp>
-      <p:sp>
-        <p:nvSpPr>
-          <p:cNvPr id="3" name="Espaço Reservado para Conteúdo 2"/>
-          <p:cNvSpPr>
-            <a:spLocks noGrp="1"/>
-          </p:cNvSpPr>
-          <p:nvPr>
-            <p:ph idx="1"/>
-          </p:nvPr>
-        </p:nvSpPr>
-        <p:spPr/>
-        <p:txBody>
-          <a:bodyPr/>
-          <a:lstStyle/>
-          <a:p>
-            <a:pPr>
-              <a:buFont typeface="Wingdings" panose="05000000000000000000" pitchFamily="2" charset="2"/>
-              <a:buChar char="Ø"/>
-            </a:pPr>
-            <a:r>
-              <a:rPr lang="pt-BR" dirty="0" smtClean="0">
-                <a:solidFill>
-                  <a:schemeClr val="bg1"/>
-                </a:solidFill>
-              </a:rPr>
-              <a:t>Empresa de desenvolvimento de jogos</a:t>
-            </a:r>
-          </a:p>
-          <a:p>
-            <a:r>
-              <a:rPr lang="pt-BR" dirty="0" smtClean="0">
-                <a:solidFill>
-                  <a:schemeClr val="bg1"/>
-                </a:solidFill>
-              </a:rPr>
-              <a:t>Desenvolvimento do projeto</a:t>
-            </a:r>
-          </a:p>
-          <a:p>
-            <a:r>
-              <a:rPr lang="pt-BR" dirty="0" err="1" smtClean="0">
-                <a:solidFill>
-                  <a:schemeClr val="bg1"/>
-                </a:solidFill>
-              </a:rPr>
-              <a:t>Unity</a:t>
-            </a:r>
-            <a:endParaRPr lang="pt-BR" dirty="0" smtClean="0">
-              <a:solidFill>
-                <a:schemeClr val="bg1"/>
-              </a:solidFill>
-            </a:endParaRPr>
-          </a:p>
-          <a:p>
-            <a:pPr>
-              <a:buFont typeface="Wingdings" panose="05000000000000000000" pitchFamily="2" charset="2"/>
-              <a:buChar char="Ø"/>
-            </a:pPr>
-            <a:r>
-              <a:rPr lang="pt-BR" altLang="pt-BR" dirty="0">
-                <a:solidFill>
-                  <a:schemeClr val="bg1"/>
-                </a:solidFill>
-              </a:rPr>
-              <a:t>Introdução (problema, objetivos </a:t>
-            </a:r>
-            <a:r>
-              <a:rPr lang="pt-BR" altLang="pt-BR" dirty="0" smtClean="0">
-                <a:solidFill>
-                  <a:schemeClr val="bg1"/>
-                </a:solidFill>
-              </a:rPr>
-              <a:t>e justificativa)</a:t>
-            </a:r>
-          </a:p>
-          <a:p>
-            <a:pPr>
-              <a:buFont typeface="Wingdings" panose="05000000000000000000" pitchFamily="2" charset="2"/>
-              <a:buChar char="Ø"/>
-            </a:pPr>
-            <a:r>
-              <a:rPr lang="pt-BR" altLang="pt-BR" dirty="0" smtClean="0">
-                <a:solidFill>
-                  <a:schemeClr val="bg1"/>
-                </a:solidFill>
-              </a:rPr>
-              <a:t>Fundamentação teórica</a:t>
-            </a:r>
-            <a:endParaRPr lang="pt-BR" altLang="pt-BR" dirty="0">
-              <a:solidFill>
-                <a:schemeClr val="bg1"/>
-              </a:solidFill>
-            </a:endParaRPr>
-          </a:p>
-          <a:p>
-            <a:pPr>
-              <a:buFont typeface="Wingdings" panose="05000000000000000000" pitchFamily="2" charset="2"/>
-              <a:buChar char="Ø"/>
-            </a:pPr>
-            <a:endParaRPr lang="pt-BR" dirty="0" smtClean="0"/>
-          </a:p>
-        </p:txBody>
-      </p:sp>
     </p:spTree>
+    <p:extLst>
+      <p:ext uri="{BB962C8B-B14F-4D97-AF65-F5344CB8AC3E}">
+        <p14:creationId xmlns:p14="http://schemas.microsoft.com/office/powerpoint/2010/main" val="2449416787"/>
+      </p:ext>
+    </p:extLst>
   </p:cSld>
   <p:clrMapOvr>
     <a:masterClrMapping/>
@@ -4287,7 +5917,7 @@
       </p:grpSpPr>
       <p:sp>
         <p:nvSpPr>
-          <p:cNvPr id="2" name="Título 1"/>
+          <p:cNvPr id="4" name="Title 3"/>
           <p:cNvSpPr>
             <a:spLocks noGrp="1"/>
           </p:cNvSpPr>
@@ -4301,16 +5931,32 @@
           <a:lstStyle/>
           <a:p>
             <a:r>
-              <a:rPr lang="pt-BR" dirty="0" smtClean="0">
-                <a:solidFill>
-                  <a:schemeClr val="bg1"/>
-                </a:solidFill>
-              </a:rPr>
-              <a:t>Definição do Problema</a:t>
-            </a:r>
-            <a:endParaRPr lang="pt-BR" dirty="0">
+              <a:rPr lang="en-US" dirty="0" err="1" smtClean="0">
+                <a:solidFill>
+                  <a:srgbClr val="FFFFFF"/>
+                </a:solidFill>
+              </a:rPr>
+              <a:t>Introdu</a:t>
+            </a:r>
+            <a:r>
+              <a:rPr lang="en-US" dirty="0" err="1" smtClean="0">
+                <a:solidFill>
+                  <a:srgbClr val="FFFFFF"/>
+                </a:solidFill>
+              </a:rPr>
+              <a:t>çã</a:t>
+            </a:r>
+            <a:r>
+              <a:rPr lang="en-US" dirty="0" err="1" smtClean="0">
+                <a:solidFill>
+                  <a:srgbClr val="FFFFFF"/>
+                </a:solidFill>
+              </a:rPr>
+              <a:t>o</a:t>
+            </a:r>
+            <a:endParaRPr lang="en-US" dirty="0">
               <a:solidFill>
-                <a:schemeClr val="bg1"/>
+                <a:srgbClr val="FFFFFF"/>
               </a:solidFill>
             </a:endParaRPr>
           </a:p>
@@ -4318,73 +5964,29 @@
       </p:sp>
       <p:sp>
         <p:nvSpPr>
-          <p:cNvPr id="3" name="Espaço Reservado para Conteúdo 2"/>
-          <p:cNvSpPr>
-            <a:spLocks noGrp="1"/>
-          </p:cNvSpPr>
-          <p:nvPr>
-            <p:ph idx="1"/>
-          </p:nvPr>
-        </p:nvSpPr>
-        <p:spPr>
-          <a:xfrm>
-            <a:off x="467544" y="1628800"/>
-            <a:ext cx="8229600" cy="4525963"/>
-          </a:xfrm>
-        </p:spPr>
+          <p:cNvPr id="5" name="Text Placeholder 4"/>
+          <p:cNvSpPr>
+            <a:spLocks noGrp="1"/>
+          </p:cNvSpPr>
+          <p:nvPr>
+            <p:ph type="body" idx="1"/>
+          </p:nvPr>
+        </p:nvSpPr>
+        <p:spPr/>
         <p:txBody>
           <a:bodyPr/>
           <a:lstStyle/>
           <a:p>
-            <a:pPr>
-              <a:buFont typeface="Wingdings" panose="05000000000000000000" pitchFamily="2" charset="2"/>
-              <a:buChar char="Ø"/>
-            </a:pPr>
-            <a:endParaRPr lang="pt-BR" dirty="0" smtClean="0"/>
-          </a:p>
-          <a:p>
-            <a:pPr>
-              <a:buFont typeface="Wingdings" panose="05000000000000000000" pitchFamily="2" charset="2"/>
-              <a:buChar char="Ø"/>
-            </a:pPr>
-            <a:endParaRPr lang="pt-BR" dirty="0"/>
-          </a:p>
-          <a:p>
-            <a:pPr>
-              <a:buFont typeface="Wingdings" panose="05000000000000000000" pitchFamily="2" charset="2"/>
-              <a:buChar char="Ø"/>
-            </a:pPr>
-            <a:r>
-              <a:rPr lang="pt-BR" dirty="0" smtClean="0">
-                <a:solidFill>
-                  <a:schemeClr val="bg1"/>
-                </a:solidFill>
-              </a:rPr>
-              <a:t>Empresa não tem um jogo desenvolvido</a:t>
-            </a:r>
-          </a:p>
-          <a:p>
-            <a:pPr>
-              <a:buFont typeface="Wingdings" panose="05000000000000000000" pitchFamily="2" charset="2"/>
-              <a:buChar char="Ø"/>
-            </a:pPr>
-            <a:r>
-              <a:rPr lang="pt-BR" dirty="0" smtClean="0">
-                <a:solidFill>
-                  <a:schemeClr val="bg1"/>
-                </a:solidFill>
-              </a:rPr>
-              <a:t>A empresa precisa de um produto para ser comercializado</a:t>
-            </a:r>
-            <a:endParaRPr lang="pt-BR" dirty="0" smtClean="0">
-              <a:solidFill>
-                <a:schemeClr val="bg1"/>
-              </a:solidFill>
-            </a:endParaRPr>
+            <a:endParaRPr lang="en-US" dirty="0"/>
           </a:p>
         </p:txBody>
       </p:sp>
     </p:spTree>
+    <p:extLst>
+      <p:ext uri="{BB962C8B-B14F-4D97-AF65-F5344CB8AC3E}">
+        <p14:creationId xmlns:p14="http://schemas.microsoft.com/office/powerpoint/2010/main" val="4170357425"/>
+      </p:ext>
+    </p:extLst>
   </p:cSld>
   <p:clrMapOvr>
     <a:masterClrMapping/>
@@ -4430,7 +6032,7 @@
                   <a:schemeClr val="bg1"/>
                 </a:solidFill>
               </a:rPr>
-              <a:t>Objetivos</a:t>
+              <a:t>Introdução</a:t>
             </a:r>
             <a:endParaRPr lang="pt-BR" dirty="0">
               <a:solidFill>
@@ -4452,43 +6054,43 @@
         </p:nvSpPr>
         <p:spPr/>
         <p:txBody>
-          <a:bodyPr/>
+          <a:bodyPr anchor="ctr"/>
           <a:lstStyle/>
           <a:p>
             <a:pPr>
               <a:buFont typeface="Wingdings" panose="05000000000000000000" pitchFamily="2" charset="2"/>
               <a:buChar char="Ø"/>
             </a:pPr>
-            <a:endParaRPr lang="pt-BR" dirty="0" smtClean="0"/>
-          </a:p>
-          <a:p>
-            <a:pPr>
-              <a:buFont typeface="Wingdings" panose="05000000000000000000" pitchFamily="2" charset="2"/>
-              <a:buChar char="Ø"/>
-            </a:pPr>
-            <a:endParaRPr lang="pt-BR" dirty="0"/>
-          </a:p>
-          <a:p>
-            <a:pPr>
-              <a:buFont typeface="Wingdings" panose="05000000000000000000" pitchFamily="2" charset="2"/>
-              <a:buChar char="Ø"/>
-            </a:pPr>
             <a:r>
               <a:rPr lang="pt-BR" dirty="0" smtClean="0">
                 <a:solidFill>
                   <a:schemeClr val="bg1"/>
                 </a:solidFill>
               </a:rPr>
-              <a:t>Desenvolver </a:t>
-            </a:r>
-            <a:r>
-              <a:rPr lang="pt-BR" dirty="0">
-                <a:solidFill>
-                  <a:schemeClr val="bg1"/>
-                </a:solidFill>
-              </a:rPr>
-              <a:t>um jogo usando o </a:t>
-            </a:r>
+              <a:t>Empresa </a:t>
+            </a:r>
+            <a:r>
+              <a:rPr lang="pt-BR" dirty="0" smtClean="0">
+                <a:solidFill>
+                  <a:schemeClr val="bg1"/>
+                </a:solidFill>
+              </a:rPr>
+              <a:t>de desenvolvimento de jogos</a:t>
+            </a:r>
+          </a:p>
+          <a:p>
+            <a:pPr lvl="1"/>
+            <a:r>
+              <a:rPr lang="pt-BR" dirty="0" smtClean="0">
+                <a:solidFill>
+                  <a:schemeClr val="bg1"/>
+                </a:solidFill>
+              </a:rPr>
+              <a:t>Desenvolvimento do projeto</a:t>
+            </a:r>
+          </a:p>
+          <a:p>
+            <a:pPr lvl="1"/>
             <a:r>
               <a:rPr lang="pt-BR" dirty="0" err="1" smtClean="0">
                 <a:solidFill>
@@ -4498,49 +6100,6 @@
               <a:t>Unity</a:t>
             </a:r>
             <a:endParaRPr lang="pt-BR" dirty="0" smtClean="0">
-              <a:solidFill>
-                <a:schemeClr val="bg1"/>
-              </a:solidFill>
-            </a:endParaRPr>
-          </a:p>
-          <a:p>
-            <a:pPr>
-              <a:buFont typeface="Wingdings" panose="05000000000000000000" pitchFamily="2" charset="2"/>
-              <a:buChar char="Ø"/>
-            </a:pPr>
-            <a:r>
-              <a:rPr lang="pt-BR" dirty="0">
-                <a:solidFill>
-                  <a:schemeClr val="bg1"/>
-                </a:solidFill>
-              </a:rPr>
-              <a:t>C</a:t>
-            </a:r>
-            <a:r>
-              <a:rPr lang="pt-BR" dirty="0" smtClean="0">
-                <a:solidFill>
-                  <a:schemeClr val="bg1"/>
-                </a:solidFill>
-              </a:rPr>
-              <a:t>ompreender </a:t>
-            </a:r>
-            <a:r>
-              <a:rPr lang="pt-BR" dirty="0">
-                <a:solidFill>
-                  <a:schemeClr val="bg1"/>
-                </a:solidFill>
-              </a:rPr>
-              <a:t>o </a:t>
-            </a:r>
-            <a:r>
-              <a:rPr lang="pt-BR" dirty="0" err="1">
-                <a:solidFill>
-                  <a:schemeClr val="bg1"/>
-                </a:solidFill>
-              </a:rPr>
-              <a:t>unity</a:t>
-            </a:r>
-            <a:endParaRPr lang="pt-BR" dirty="0">
               <a:solidFill>
                 <a:schemeClr val="bg1"/>
               </a:solidFill>
@@ -4594,7 +6153,7 @@
                   <a:schemeClr val="bg1"/>
                 </a:solidFill>
               </a:rPr>
-              <a:t>Justificativa [ou motivação]</a:t>
+              <a:t>Definição do Problema</a:t>
             </a:r>
             <a:endParaRPr lang="pt-BR" dirty="0">
               <a:solidFill>
@@ -4614,11 +6173,14 @@
             <p:ph idx="1"/>
           </p:nvPr>
         </p:nvSpPr>
-        <p:spPr/>
-        <p:txBody>
-          <a:bodyPr>
-            <a:normAutofit/>
-          </a:bodyPr>
+        <p:spPr>
+          <a:xfrm>
+            <a:off x="467544" y="1628800"/>
+            <a:ext cx="8229600" cy="4525963"/>
+          </a:xfrm>
+        </p:spPr>
+        <p:txBody>
+          <a:bodyPr anchor="ctr"/>
           <a:lstStyle/>
           <a:p>
             <a:pPr>
@@ -4626,42 +6188,26 @@
               <a:buChar char="Ø"/>
             </a:pPr>
             <a:r>
-              <a:rPr lang="pt-BR" dirty="0">
-                <a:solidFill>
-                  <a:schemeClr val="bg1"/>
-                </a:solidFill>
-              </a:rPr>
-              <a:t>A indústria de desenvolvimento de jogos tem apresentado um crescimento bastante acentuado nas últimas </a:t>
-            </a:r>
-            <a:r>
               <a:rPr lang="pt-BR" dirty="0" smtClean="0">
                 <a:solidFill>
                   <a:schemeClr val="bg1"/>
                 </a:solidFill>
               </a:rPr>
-              <a:t>décadas.</a:t>
-            </a:r>
-          </a:p>
-          <a:p>
-            <a:pPr>
+              <a:t>Empresa (startup)</a:t>
+            </a:r>
+          </a:p>
+          <a:p>
+            <a:pPr lvl="1">
               <a:buFont typeface="Wingdings" panose="05000000000000000000" pitchFamily="2" charset="2"/>
               <a:buChar char="Ø"/>
             </a:pPr>
             <a:r>
-              <a:rPr lang="pt-BR" dirty="0">
-                <a:solidFill>
-                  <a:schemeClr val="bg1"/>
-                </a:solidFill>
-              </a:rPr>
-              <a:t>Indústria de jogos tem influenciado uma ampla e variada gama de perfis de usuários, tornando-se parte importante da vida cotidiana da maioria das pessoas, sem restrição de faixa </a:t>
-            </a:r>
-            <a:r>
               <a:rPr lang="pt-BR" dirty="0" smtClean="0">
                 <a:solidFill>
                   <a:schemeClr val="bg1"/>
                 </a:solidFill>
               </a:rPr>
-              <a:t>etária.</a:t>
+              <a:t>Sem produtos iniciais</a:t>
             </a:r>
           </a:p>
         </p:txBody>
@@ -4703,242 +6249,16 @@
         </p:nvSpPr>
         <p:spPr/>
         <p:txBody>
-          <a:bodyPr>
-            <a:normAutofit fontScale="90000"/>
-          </a:bodyPr>
-          <a:lstStyle/>
-          <a:p>
-            <a:r>
-              <a:rPr lang="pt-BR" dirty="0" smtClean="0"/>
-              <a:t/>
-            </a:r>
-            <a:br>
-              <a:rPr lang="pt-BR" dirty="0" smtClean="0"/>
-            </a:br>
-            <a:r>
-              <a:rPr lang="pt-BR" dirty="0"/>
-              <a:t/>
-            </a:r>
-            <a:br>
-              <a:rPr lang="pt-BR" dirty="0"/>
-            </a:br>
-            <a:r>
-              <a:rPr lang="pt-BR" dirty="0"/>
-              <a:t/>
-            </a:r>
-            <a:br>
-              <a:rPr lang="pt-BR" dirty="0"/>
-            </a:br>
-            <a:r>
-              <a:rPr lang="pt-BR" dirty="0" smtClean="0"/>
-              <a:t/>
-            </a:r>
-            <a:br>
-              <a:rPr lang="pt-BR" dirty="0" smtClean="0"/>
-            </a:br>
-            <a:endParaRPr lang="pt-BR" dirty="0"/>
-          </a:p>
-        </p:txBody>
-      </p:sp>
-      <p:sp>
-        <p:nvSpPr>
-          <p:cNvPr id="4" name="Espaço Reservado para Conteúdo 3"/>
-          <p:cNvSpPr>
-            <a:spLocks noGrp="1"/>
-          </p:cNvSpPr>
-          <p:nvPr>
-            <p:ph idx="1"/>
-          </p:nvPr>
-        </p:nvSpPr>
-        <p:spPr>
-          <a:xfrm>
-            <a:off x="467544" y="404664"/>
-            <a:ext cx="8229600" cy="5400600"/>
-          </a:xfrm>
-        </p:spPr>
-        <p:txBody>
           <a:bodyPr/>
           <a:lstStyle/>
           <a:p>
-            <a:pPr>
-              <a:buFont typeface="Wingdings" panose="05000000000000000000" pitchFamily="2" charset="2"/>
-              <a:buChar char="Ø"/>
-            </a:pPr>
-            <a:r>
-              <a:rPr lang="pt-BR" dirty="0">
-                <a:solidFill>
-                  <a:schemeClr val="bg1"/>
-                </a:solidFill>
-              </a:rPr>
-              <a:t>A </a:t>
-            </a:r>
-            <a:r>
-              <a:rPr lang="pt-BR" dirty="0" err="1">
-                <a:solidFill>
-                  <a:schemeClr val="bg1"/>
-                </a:solidFill>
-              </a:rPr>
-              <a:t>Unity</a:t>
-            </a:r>
-            <a:r>
-              <a:rPr lang="pt-BR" dirty="0">
-                <a:solidFill>
-                  <a:schemeClr val="bg1"/>
-                </a:solidFill>
-              </a:rPr>
-              <a:t> é uma ferramenta de desenvolvimento de jogos para vários sistemas operacionais como Mac, Windows, IPhone, Web e Nintendo </a:t>
-            </a:r>
             <a:r>
               <a:rPr lang="pt-BR" dirty="0" smtClean="0">
                 <a:solidFill>
                   <a:schemeClr val="bg1"/>
                 </a:solidFill>
               </a:rPr>
-              <a:t>Wii.</a:t>
-            </a:r>
-          </a:p>
-          <a:p>
-            <a:pPr>
-              <a:buFont typeface="Wingdings" panose="05000000000000000000" pitchFamily="2" charset="2"/>
-              <a:buChar char="Ø"/>
-            </a:pPr>
-            <a:r>
-              <a:rPr lang="pt-BR" dirty="0" smtClean="0">
-                <a:solidFill>
-                  <a:schemeClr val="bg1"/>
-                </a:solidFill>
-              </a:rPr>
-              <a:t>Várias </a:t>
-            </a:r>
-            <a:r>
-              <a:rPr lang="pt-BR" dirty="0">
-                <a:solidFill>
-                  <a:schemeClr val="bg1"/>
-                </a:solidFill>
-              </a:rPr>
-              <a:t>linguagens de programação (C Sharp, </a:t>
-            </a:r>
-            <a:r>
-              <a:rPr lang="pt-BR" dirty="0" err="1">
-                <a:solidFill>
-                  <a:schemeClr val="bg1"/>
-                </a:solidFill>
-              </a:rPr>
-              <a:t>JavaScripti</a:t>
-            </a:r>
-            <a:r>
-              <a:rPr lang="pt-BR" dirty="0">
-                <a:solidFill>
-                  <a:schemeClr val="bg1"/>
-                </a:solidFill>
-              </a:rPr>
-              <a:t>, </a:t>
-            </a:r>
-            <a:r>
-              <a:rPr lang="pt-BR" dirty="0" err="1">
-                <a:solidFill>
-                  <a:schemeClr val="bg1"/>
-                </a:solidFill>
-              </a:rPr>
-              <a:t>Boo</a:t>
-            </a:r>
-            <a:r>
-              <a:rPr lang="pt-BR" dirty="0">
-                <a:solidFill>
-                  <a:schemeClr val="bg1"/>
-                </a:solidFill>
-              </a:rPr>
-              <a:t>(</a:t>
-            </a:r>
-            <a:r>
-              <a:rPr lang="pt-BR" dirty="0" err="1">
-                <a:solidFill>
-                  <a:schemeClr val="bg1"/>
-                </a:solidFill>
-              </a:rPr>
-              <a:t>Pytoon</a:t>
-            </a:r>
-            <a:r>
-              <a:rPr lang="pt-BR" dirty="0" smtClean="0">
-                <a:solidFill>
-                  <a:schemeClr val="bg1"/>
-                </a:solidFill>
-              </a:rPr>
-              <a:t>)).</a:t>
-            </a:r>
-          </a:p>
-          <a:p>
-            <a:pPr>
-              <a:buFont typeface="Wingdings" panose="05000000000000000000" pitchFamily="2" charset="2"/>
-              <a:buChar char="Ø"/>
-            </a:pPr>
-            <a:r>
-              <a:rPr lang="pt-BR" dirty="0" smtClean="0">
-                <a:solidFill>
-                  <a:schemeClr val="bg1"/>
-                </a:solidFill>
-              </a:rPr>
-              <a:t>Oferece uma gama de </a:t>
-            </a:r>
-            <a:r>
-              <a:rPr lang="pt-BR" dirty="0">
-                <a:solidFill>
-                  <a:schemeClr val="bg1"/>
-                </a:solidFill>
-              </a:rPr>
-              <a:t>componentes para </a:t>
-            </a:r>
-            <a:r>
-              <a:rPr lang="pt-BR" dirty="0" smtClean="0">
-                <a:solidFill>
-                  <a:schemeClr val="bg1"/>
-                </a:solidFill>
-              </a:rPr>
-              <a:t>trabalhar.</a:t>
-            </a:r>
-          </a:p>
-          <a:p>
-            <a:pPr>
-              <a:buFont typeface="Wingdings" panose="05000000000000000000" pitchFamily="2" charset="2"/>
-              <a:buChar char="Ø"/>
-            </a:pPr>
-            <a:r>
-              <a:rPr lang="pt-BR" dirty="0" smtClean="0">
-                <a:solidFill>
-                  <a:schemeClr val="bg1"/>
-                </a:solidFill>
-              </a:rPr>
-              <a:t>Desenvolvimento 3D e 2D.</a:t>
-            </a:r>
-          </a:p>
-          <a:p>
-            <a:pPr>
-              <a:buFont typeface="Wingdings" panose="05000000000000000000" pitchFamily="2" charset="2"/>
-              <a:buChar char="Ø"/>
-            </a:pPr>
-            <a:r>
-              <a:rPr lang="pt-BR" dirty="0" smtClean="0">
-                <a:solidFill>
-                  <a:schemeClr val="bg1"/>
-                </a:solidFill>
-              </a:rPr>
-              <a:t>Versão </a:t>
-            </a:r>
-            <a:r>
-              <a:rPr lang="pt-BR" dirty="0" err="1" smtClean="0">
-                <a:solidFill>
-                  <a:schemeClr val="bg1"/>
-                </a:solidFill>
-              </a:rPr>
-              <a:t>free</a:t>
-            </a:r>
-            <a:r>
-              <a:rPr lang="pt-BR" dirty="0" smtClean="0">
-                <a:solidFill>
-                  <a:schemeClr val="bg1"/>
-                </a:solidFill>
-              </a:rPr>
-              <a:t>.</a:t>
+              <a:t>Objetivos</a:t>
             </a:r>
             <a:endParaRPr lang="pt-BR" dirty="0">
               <a:solidFill>
@@ -4948,12 +6268,165 @@
           </a:p>
         </p:txBody>
       </p:sp>
+      <p:sp>
+        <p:nvSpPr>
+          <p:cNvPr id="3" name="Espaço Reservado para Conteúdo 2"/>
+          <p:cNvSpPr>
+            <a:spLocks noGrp="1"/>
+          </p:cNvSpPr>
+          <p:nvPr>
+            <p:ph idx="1"/>
+          </p:nvPr>
+        </p:nvSpPr>
+        <p:spPr/>
+        <p:txBody>
+          <a:bodyPr anchor="ctr"/>
+          <a:lstStyle/>
+          <a:p>
+            <a:pPr>
+              <a:buFont typeface="Wingdings" panose="05000000000000000000" pitchFamily="2" charset="2"/>
+              <a:buChar char="Ø"/>
+            </a:pPr>
+            <a:r>
+              <a:rPr lang="pt-BR" dirty="0" smtClean="0">
+                <a:solidFill>
+                  <a:srgbClr val="FFFFFF"/>
+                </a:solidFill>
+              </a:rPr>
+              <a:t>Geral</a:t>
+            </a:r>
+            <a:endParaRPr lang="pt-BR" dirty="0" smtClean="0">
+              <a:solidFill>
+                <a:srgbClr val="FFFFFF"/>
+              </a:solidFill>
+            </a:endParaRPr>
+          </a:p>
+          <a:p>
+            <a:pPr lvl="1">
+              <a:buFont typeface="Wingdings" panose="05000000000000000000" pitchFamily="2" charset="2"/>
+              <a:buChar char="Ø"/>
+            </a:pPr>
+            <a:r>
+              <a:rPr lang="pt-BR" dirty="0" smtClean="0">
+                <a:solidFill>
+                  <a:srgbClr val="FFFFFF"/>
+                </a:solidFill>
+              </a:rPr>
+              <a:t>Desenvolver </a:t>
+            </a:r>
+            <a:r>
+              <a:rPr lang="pt-BR" dirty="0">
+                <a:solidFill>
+                  <a:srgbClr val="FFFFFF"/>
+                </a:solidFill>
+              </a:rPr>
+              <a:t>um jogo usando o </a:t>
+            </a:r>
+            <a:r>
+              <a:rPr lang="pt-BR" dirty="0" err="1" smtClean="0">
+                <a:solidFill>
+                  <a:srgbClr val="FFFFFF"/>
+                </a:solidFill>
+              </a:rPr>
+              <a:t>Unity</a:t>
+            </a:r>
+            <a:endParaRPr lang="pt-BR" dirty="0" smtClean="0">
+              <a:solidFill>
+                <a:srgbClr val="FFFFFF"/>
+              </a:solidFill>
+            </a:endParaRPr>
+          </a:p>
+          <a:p>
+            <a:pPr>
+              <a:buFont typeface="Wingdings" panose="05000000000000000000" pitchFamily="2" charset="2"/>
+              <a:buChar char="Ø"/>
+            </a:pPr>
+            <a:r>
+              <a:rPr lang="pt-BR" dirty="0" smtClean="0">
+                <a:solidFill>
+                  <a:srgbClr val="FFFFFF"/>
+                </a:solidFill>
+              </a:rPr>
+              <a:t>Específicos</a:t>
+            </a:r>
+            <a:endParaRPr lang="pt-BR" dirty="0">
+              <a:solidFill>
+                <a:srgbClr val="FFFFFF"/>
+              </a:solidFill>
+            </a:endParaRPr>
+          </a:p>
+          <a:p>
+            <a:pPr lvl="1">
+              <a:buFont typeface="Wingdings" panose="05000000000000000000" pitchFamily="2" charset="2"/>
+              <a:buChar char="Ø"/>
+            </a:pPr>
+            <a:r>
+              <a:rPr lang="pt-BR" dirty="0" smtClean="0">
+                <a:solidFill>
+                  <a:srgbClr val="FFFFFF"/>
+                </a:solidFill>
+              </a:rPr>
+              <a:t>Mono usu</a:t>
+            </a:r>
+            <a:r>
+              <a:rPr lang="pt-BR" dirty="0" smtClean="0">
+                <a:solidFill>
+                  <a:srgbClr val="FFFFFF"/>
+                </a:solidFill>
+              </a:rPr>
+              <a:t>ário</a:t>
+            </a:r>
+          </a:p>
+          <a:p>
+            <a:pPr lvl="1">
+              <a:buFont typeface="Wingdings" panose="05000000000000000000" pitchFamily="2" charset="2"/>
+              <a:buChar char="Ø"/>
+            </a:pPr>
+            <a:r>
+              <a:rPr lang="pt-BR" dirty="0" smtClean="0">
+                <a:solidFill>
+                  <a:srgbClr val="FFFFFF"/>
+                </a:solidFill>
+              </a:rPr>
+              <a:t>Mobile (qual plataforma?)</a:t>
+            </a:r>
+          </a:p>
+          <a:p>
+            <a:pPr lvl="1">
+              <a:buFont typeface="Wingdings" panose="05000000000000000000" pitchFamily="2" charset="2"/>
+              <a:buChar char="Ø"/>
+            </a:pPr>
+            <a:r>
+              <a:rPr lang="pt-BR" dirty="0" smtClean="0">
+                <a:solidFill>
+                  <a:srgbClr val="FFFFFF"/>
+                </a:solidFill>
+              </a:rPr>
+              <a:t>Adventure baseado em tabuleiro</a:t>
+            </a:r>
+          </a:p>
+          <a:p>
+            <a:pPr lvl="1">
+              <a:buFont typeface="Wingdings" panose="05000000000000000000" pitchFamily="2" charset="2"/>
+              <a:buChar char="Ø"/>
+            </a:pPr>
+            <a:r>
+              <a:rPr lang="pt-BR" dirty="0" smtClean="0">
+                <a:solidFill>
+                  <a:srgbClr val="FFFFFF"/>
+                </a:solidFill>
+              </a:rPr>
+              <a:t>Mais algo sobre qual o tipo de jogo?</a:t>
+            </a:r>
+            <a:endParaRPr lang="pt-BR" dirty="0" smtClean="0">
+              <a:solidFill>
+                <a:srgbClr val="FFFFFF"/>
+              </a:solidFill>
+            </a:endParaRPr>
+          </a:p>
+        </p:txBody>
+      </p:sp>
     </p:spTree>
-    <p:extLst>
-      <p:ext uri="{BB962C8B-B14F-4D97-AF65-F5344CB8AC3E}">
-        <p14:creationId xmlns:p14="http://schemas.microsoft.com/office/powerpoint/2010/main" val="2740099633"/>
-      </p:ext>
-    </p:extLst>
   </p:cSld>
   <p:clrMapOvr>
     <a:masterClrMapping/>
@@ -4999,7 +6472,7 @@
                   <a:schemeClr val="bg1"/>
                 </a:solidFill>
               </a:rPr>
-              <a:t>Metodologia</a:t>
+              <a:t>Justificativa [ou motivação]</a:t>
             </a:r>
             <a:endParaRPr lang="pt-BR" dirty="0">
               <a:solidFill>
@@ -5021,28 +6494,252 @@
         </p:nvSpPr>
         <p:spPr/>
         <p:txBody>
-          <a:bodyPr/>
-          <a:lstStyle/>
-          <a:p>
+          <a:bodyPr anchor="ctr">
+            <a:normAutofit/>
+          </a:bodyPr>
+          <a:lstStyle/>
+          <a:p>
+            <a:pPr>
+              <a:buFont typeface="Wingdings" panose="05000000000000000000" pitchFamily="2" charset="2"/>
+              <a:buChar char="Ø"/>
+            </a:pPr>
+            <a:r>
+              <a:rPr lang="pt-BR" dirty="0" err="1" smtClean="0">
+                <a:solidFill>
+                  <a:schemeClr val="bg1"/>
+                </a:solidFill>
+              </a:rPr>
+              <a:t>Unity</a:t>
+            </a:r>
+            <a:endParaRPr lang="pt-BR" dirty="0" smtClean="0">
+              <a:solidFill>
+                <a:schemeClr val="bg1"/>
+              </a:solidFill>
+            </a:endParaRPr>
+          </a:p>
+          <a:p>
+            <a:pPr lvl="1">
+              <a:buFont typeface="Wingdings" panose="05000000000000000000" pitchFamily="2" charset="2"/>
+              <a:buChar char="Ø"/>
+            </a:pPr>
             <a:r>
               <a:rPr lang="pt-BR" dirty="0" smtClean="0">
                 <a:solidFill>
                   <a:schemeClr val="bg1"/>
                 </a:solidFill>
               </a:rPr>
-              <a:t>Atividades a serem realizadas (sequência)</a:t>
-            </a:r>
-          </a:p>
-          <a:p>
+              <a:t>V</a:t>
+            </a:r>
             <a:r>
               <a:rPr lang="pt-BR" dirty="0" smtClean="0">
                 <a:solidFill>
                   <a:schemeClr val="bg1"/>
                 </a:solidFill>
               </a:rPr>
-              <a:t>Cronograma</a:t>
+              <a:t>árias plataformas</a:t>
             </a:r>
             <a:endParaRPr lang="pt-BR" dirty="0">
+              <a:solidFill>
+                <a:schemeClr val="bg1"/>
+              </a:solidFill>
+            </a:endParaRPr>
+          </a:p>
+          <a:p>
+            <a:pPr lvl="2">
+              <a:buFont typeface="Wingdings" panose="05000000000000000000" pitchFamily="2" charset="2"/>
+              <a:buChar char="Ø"/>
+            </a:pPr>
+            <a:r>
+              <a:rPr lang="pt-BR" dirty="0" smtClean="0">
+                <a:solidFill>
+                  <a:schemeClr val="bg1"/>
+                </a:solidFill>
+              </a:rPr>
+              <a:t>Mac</a:t>
+            </a:r>
+            <a:r>
+              <a:rPr lang="pt-BR" dirty="0">
+                <a:solidFill>
+                  <a:schemeClr val="bg1"/>
+                </a:solidFill>
+              </a:rPr>
+              <a:t>, Windows, IPhone, Web e Nintendo </a:t>
+            </a:r>
+            <a:r>
+              <a:rPr lang="pt-BR" dirty="0" smtClean="0">
+                <a:solidFill>
+                  <a:schemeClr val="bg1"/>
+                </a:solidFill>
+              </a:rPr>
+              <a:t>Wii</a:t>
+            </a:r>
+            <a:endParaRPr lang="pt-BR" dirty="0">
+              <a:solidFill>
+                <a:schemeClr val="bg1"/>
+              </a:solidFill>
+            </a:endParaRPr>
+          </a:p>
+          <a:p>
+            <a:pPr lvl="2">
+              <a:buFont typeface="Wingdings" panose="05000000000000000000" pitchFamily="2" charset="2"/>
+              <a:buChar char="Ø"/>
+            </a:pPr>
+            <a:r>
+              <a:rPr lang="pt-BR" dirty="0" smtClean="0">
+                <a:solidFill>
+                  <a:schemeClr val="bg1"/>
+                </a:solidFill>
+              </a:rPr>
+              <a:t>C </a:t>
+            </a:r>
+            <a:r>
+              <a:rPr lang="pt-BR" dirty="0">
+                <a:solidFill>
+                  <a:schemeClr val="bg1"/>
+                </a:solidFill>
+              </a:rPr>
+              <a:t>Sharp, </a:t>
+            </a:r>
+            <a:r>
+              <a:rPr lang="pt-BR" dirty="0" err="1">
+                <a:solidFill>
+                  <a:schemeClr val="bg1"/>
+                </a:solidFill>
+              </a:rPr>
+              <a:t>JavaScripti</a:t>
+            </a:r>
+            <a:r>
+              <a:rPr lang="pt-BR" dirty="0">
+                <a:solidFill>
+                  <a:schemeClr val="bg1"/>
+                </a:solidFill>
+              </a:rPr>
+              <a:t>, </a:t>
+            </a:r>
+            <a:r>
+              <a:rPr lang="pt-BR" dirty="0" err="1">
+                <a:solidFill>
+                  <a:schemeClr val="bg1"/>
+                </a:solidFill>
+              </a:rPr>
+              <a:t>Boo</a:t>
+            </a:r>
+            <a:r>
+              <a:rPr lang="pt-BR" dirty="0">
+                <a:solidFill>
+                  <a:schemeClr val="bg1"/>
+                </a:solidFill>
+              </a:rPr>
+              <a:t>(</a:t>
+            </a:r>
+            <a:r>
+              <a:rPr lang="pt-BR" dirty="0" err="1">
+                <a:solidFill>
+                  <a:schemeClr val="bg1"/>
+                </a:solidFill>
+              </a:rPr>
+              <a:t>Pytoon</a:t>
+            </a:r>
+            <a:r>
+              <a:rPr lang="pt-BR" dirty="0" smtClean="0">
+                <a:solidFill>
+                  <a:schemeClr val="bg1"/>
+                </a:solidFill>
+              </a:rPr>
+              <a:t>)</a:t>
+            </a:r>
+          </a:p>
+          <a:p>
+            <a:pPr lvl="1">
+              <a:buFont typeface="Wingdings" panose="05000000000000000000" pitchFamily="2" charset="2"/>
+              <a:buChar char="Ø"/>
+            </a:pPr>
+            <a:r>
+              <a:rPr lang="pt-BR" dirty="0" smtClean="0">
+                <a:solidFill>
+                  <a:schemeClr val="bg1"/>
+                </a:solidFill>
+              </a:rPr>
+              <a:t>Vers</a:t>
+            </a:r>
+            <a:r>
+              <a:rPr lang="pt-BR" dirty="0" smtClean="0">
+                <a:solidFill>
+                  <a:schemeClr val="bg1"/>
+                </a:solidFill>
+              </a:rPr>
+              <a:t>ão gratuita e paga</a:t>
+            </a:r>
+          </a:p>
+          <a:p>
+            <a:pPr>
+              <a:buFont typeface="Wingdings" panose="05000000000000000000" pitchFamily="2" charset="2"/>
+              <a:buChar char="Ø"/>
+            </a:pPr>
+            <a:r>
+              <a:rPr lang="pt-BR" dirty="0" smtClean="0">
+                <a:solidFill>
+                  <a:schemeClr val="bg1"/>
+                </a:solidFill>
+              </a:rPr>
+              <a:t>Por que monousuário?</a:t>
+            </a:r>
+          </a:p>
+          <a:p>
+            <a:pPr>
+              <a:buFont typeface="Wingdings" panose="05000000000000000000" pitchFamily="2" charset="2"/>
+              <a:buChar char="Ø"/>
+            </a:pPr>
+            <a:r>
+              <a:rPr lang="pt-BR" dirty="0" smtClean="0">
+                <a:solidFill>
+                  <a:schemeClr val="bg1"/>
+                </a:solidFill>
+              </a:rPr>
+              <a:t>Por que mobile? Qual plataforma?</a:t>
+            </a:r>
+          </a:p>
+          <a:p>
+            <a:pPr>
+              <a:buFont typeface="Wingdings" panose="05000000000000000000" pitchFamily="2" charset="2"/>
+              <a:buChar char="Ø"/>
+            </a:pPr>
+            <a:r>
+              <a:rPr lang="pt-BR" dirty="0" smtClean="0">
+                <a:solidFill>
+                  <a:schemeClr val="bg1"/>
+                </a:solidFill>
+              </a:rPr>
+              <a:t>Por que </a:t>
+            </a:r>
+            <a:r>
+              <a:rPr lang="pt-BR" dirty="0" err="1" smtClean="0">
+                <a:solidFill>
+                  <a:schemeClr val="bg1"/>
+                </a:solidFill>
+              </a:rPr>
+              <a:t>adventure</a:t>
+            </a:r>
+            <a:r>
+              <a:rPr lang="pt-BR" dirty="0" smtClean="0">
+                <a:solidFill>
+                  <a:schemeClr val="bg1"/>
+                </a:solidFill>
+              </a:rPr>
+              <a:t>/tabuleiro?</a:t>
+            </a:r>
+            <a:endParaRPr lang="pt-BR" dirty="0">
+              <a:solidFill>
+                <a:schemeClr val="bg1"/>
+              </a:solidFill>
+            </a:endParaRPr>
+          </a:p>
+          <a:p>
+            <a:pPr lvl="1">
+              <a:buFont typeface="Wingdings" panose="05000000000000000000" pitchFamily="2" charset="2"/>
+              <a:buChar char="Ø"/>
+            </a:pPr>
+            <a:endParaRPr lang="pt-BR" dirty="0" smtClean="0">
               <a:solidFill>
                 <a:schemeClr val="bg1"/>
               </a:solidFill>
@@ -5077,7 +6774,7 @@
       </p:grpSpPr>
       <p:sp>
         <p:nvSpPr>
-          <p:cNvPr id="4" name="Título 3"/>
+          <p:cNvPr id="2" name="Título 1"/>
           <p:cNvSpPr>
             <a:spLocks noGrp="1"/>
           </p:cNvSpPr>
@@ -5096,7 +6793,7 @@
                   <a:schemeClr val="bg1"/>
                 </a:solidFill>
               </a:rPr>
-              <a:t>Referencial teórico</a:t>
+              <a:t>Metodologia</a:t>
             </a:r>
             <a:endParaRPr lang="pt-BR" dirty="0">
               <a:solidFill>
@@ -5108,24 +6805,125 @@
       </p:sp>
       <p:sp>
         <p:nvSpPr>
-          <p:cNvPr id="5" name="Espaço Reservado para Texto 4"/>
-          <p:cNvSpPr>
-            <a:spLocks noGrp="1"/>
-          </p:cNvSpPr>
-          <p:nvPr>
-            <p:ph type="body" idx="1"/>
+          <p:cNvPr id="3" name="Espaço Reservado para Conteúdo 2"/>
+          <p:cNvSpPr>
+            <a:spLocks noGrp="1"/>
+          </p:cNvSpPr>
+          <p:nvPr>
+            <p:ph idx="1"/>
           </p:nvPr>
         </p:nvSpPr>
         <p:spPr/>
         <p:txBody>
-          <a:bodyPr/>
-          <a:lstStyle/>
-          <a:p>
-            <a:endParaRPr lang="pt-BR"/>
+          <a:bodyPr anchor="ctr">
+            <a:normAutofit/>
+          </a:bodyPr>
+          <a:lstStyle/>
+          <a:p>
+            <a:pPr lvl="1">
+              <a:buFont typeface="Wingdings" panose="05000000000000000000" pitchFamily="2" charset="2"/>
+              <a:buChar char="Ø"/>
+            </a:pPr>
+            <a:r>
+              <a:rPr lang="pt-BR" sz="3200" dirty="0" smtClean="0">
+                <a:solidFill>
+                  <a:schemeClr val="bg1"/>
+                </a:solidFill>
+              </a:rPr>
+              <a:t>Desenvolvimento do jogo</a:t>
+            </a:r>
+          </a:p>
+          <a:p>
+            <a:pPr lvl="2">
+              <a:buFont typeface="Wingdings" panose="05000000000000000000" pitchFamily="2" charset="2"/>
+              <a:buChar char="Ø"/>
+            </a:pPr>
+            <a:r>
+              <a:rPr lang="pt-BR" sz="2800" dirty="0" smtClean="0">
+                <a:solidFill>
+                  <a:schemeClr val="bg1"/>
+                </a:solidFill>
+              </a:rPr>
+              <a:t>Pré-produção</a:t>
+            </a:r>
+          </a:p>
+          <a:p>
+            <a:pPr lvl="3">
+              <a:buFont typeface="Wingdings" panose="05000000000000000000" pitchFamily="2" charset="2"/>
+              <a:buChar char="Ø"/>
+            </a:pPr>
+            <a:r>
+              <a:rPr lang="pt-BR" sz="2400" dirty="0" smtClean="0">
+                <a:solidFill>
+                  <a:schemeClr val="bg1"/>
+                </a:solidFill>
+              </a:rPr>
+              <a:t>Definição do jogo</a:t>
+            </a:r>
+          </a:p>
+          <a:p>
+            <a:pPr lvl="2">
+              <a:buFont typeface="Wingdings" panose="05000000000000000000" pitchFamily="2" charset="2"/>
+              <a:buChar char="Ø"/>
+            </a:pPr>
+            <a:r>
+              <a:rPr lang="pt-BR" sz="2800" dirty="0" smtClean="0">
+                <a:solidFill>
+                  <a:schemeClr val="bg1"/>
+                </a:solidFill>
+              </a:rPr>
+              <a:t>Produção</a:t>
+            </a:r>
+          </a:p>
+          <a:p>
+            <a:pPr lvl="3">
+              <a:buFont typeface="Wingdings" panose="05000000000000000000" pitchFamily="2" charset="2"/>
+              <a:buChar char="Ø"/>
+            </a:pPr>
+            <a:r>
+              <a:rPr lang="pt-BR" sz="2400" dirty="0" smtClean="0">
+                <a:solidFill>
+                  <a:schemeClr val="bg1"/>
+                </a:solidFill>
+              </a:rPr>
+              <a:t>Ciclos iterativos baseados no </a:t>
+            </a:r>
+            <a:r>
+              <a:rPr lang="pt-BR" sz="2400" dirty="0" err="1" smtClean="0">
+                <a:solidFill>
+                  <a:schemeClr val="bg1"/>
+                </a:solidFill>
+              </a:rPr>
+              <a:t>Scrum</a:t>
+            </a:r>
+            <a:endParaRPr lang="pt-BR" sz="2400" dirty="0" smtClean="0">
+              <a:solidFill>
+                <a:schemeClr val="bg1"/>
+              </a:solidFill>
+            </a:endParaRPr>
+          </a:p>
+          <a:p>
+            <a:pPr lvl="2">
+              <a:buFont typeface="Wingdings" panose="05000000000000000000" pitchFamily="2" charset="2"/>
+              <a:buChar char="Ø"/>
+            </a:pPr>
+            <a:r>
+              <a:rPr lang="pt-BR" sz="2800" strike="sngStrike" dirty="0" smtClean="0">
+                <a:solidFill>
+                  <a:schemeClr val="bg1"/>
+                </a:solidFill>
+              </a:rPr>
+              <a:t>Pós-produção</a:t>
+            </a:r>
           </a:p>
         </p:txBody>
       </p:sp>
     </p:spTree>
+    <p:extLst>
+      <p:ext uri="{BB962C8B-B14F-4D97-AF65-F5344CB8AC3E}">
+        <p14:creationId xmlns:p14="http://schemas.microsoft.com/office/powerpoint/2010/main" val="260927960"/>
+      </p:ext>
+    </p:extLst>
   </p:cSld>
   <p:clrMapOvr>
     <a:masterClrMapping/>
@@ -5152,7 +6950,7 @@
       </p:grpSpPr>
       <p:sp>
         <p:nvSpPr>
-          <p:cNvPr id="6" name="Título 5"/>
+          <p:cNvPr id="4" name="Título 3"/>
           <p:cNvSpPr>
             <a:spLocks noGrp="1"/>
           </p:cNvSpPr>
@@ -5171,7 +6969,23 @@
                   <a:schemeClr val="bg1"/>
                 </a:solidFill>
               </a:rPr>
-              <a:t>Referencial Teórico</a:t>
+              <a:t>Fundamenta</a:t>
+            </a:r>
+            <a:r>
+              <a:rPr lang="pt-BR" dirty="0" smtClean="0">
+                <a:solidFill>
+                  <a:schemeClr val="bg1"/>
+                </a:solidFill>
+              </a:rPr>
+              <a:t>ção </a:t>
+            </a:r>
+            <a:r>
+              <a:rPr lang="pt-BR" dirty="0" smtClean="0">
+                <a:solidFill>
+                  <a:schemeClr val="bg1"/>
+                </a:solidFill>
+              </a:rPr>
+              <a:t>teórica</a:t>
             </a:r>
             <a:endParaRPr lang="pt-BR" dirty="0">
               <a:solidFill>
@@ -5183,12 +6997,12 @@
       </p:sp>
       <p:sp>
         <p:nvSpPr>
-          <p:cNvPr id="7" name="Espaço Reservado para Conteúdo 6"/>
-          <p:cNvSpPr>
-            <a:spLocks noGrp="1"/>
-          </p:cNvSpPr>
-          <p:nvPr>
-            <p:ph idx="1"/>
+          <p:cNvPr id="5" name="Espaço Reservado para Texto 4"/>
+          <p:cNvSpPr>
+            <a:spLocks noGrp="1"/>
+          </p:cNvSpPr>
+          <p:nvPr>
+            <p:ph type="body" idx="1"/>
           </p:nvPr>
         </p:nvSpPr>
         <p:spPr/>
@@ -5196,45 +7010,7 @@
           <a:bodyPr/>
           <a:lstStyle/>
           <a:p>
-            <a:pPr>
-              <a:buFont typeface="Wingdings" panose="05000000000000000000" pitchFamily="2" charset="2"/>
-              <a:buChar char="Ø"/>
-            </a:pPr>
-            <a:r>
-              <a:rPr lang="pt-BR" dirty="0" smtClean="0">
-                <a:solidFill>
-                  <a:schemeClr val="bg1"/>
-                </a:solidFill>
-              </a:rPr>
-              <a:t>Desenvolvimento de jogos</a:t>
-            </a:r>
-          </a:p>
-          <a:p>
-            <a:pPr>
-              <a:buFont typeface="Wingdings" panose="05000000000000000000" pitchFamily="2" charset="2"/>
-              <a:buChar char="Ø"/>
-            </a:pPr>
-            <a:r>
-              <a:rPr lang="pt-BR" dirty="0" err="1" smtClean="0">
-                <a:solidFill>
-                  <a:schemeClr val="bg1"/>
-                </a:solidFill>
-              </a:rPr>
-              <a:t>Unity</a:t>
-            </a:r>
-            <a:r>
-              <a:rPr lang="pt-BR" dirty="0" smtClean="0">
-                <a:solidFill>
-                  <a:schemeClr val="bg1"/>
-                </a:solidFill>
-              </a:rPr>
-              <a:t> 3D</a:t>
-            </a:r>
-            <a:endParaRPr lang="pt-BR" dirty="0">
-              <a:solidFill>
-                <a:schemeClr val="bg1"/>
-              </a:solidFill>
-            </a:endParaRPr>
+            <a:endParaRPr lang="pt-BR"/>
           </a:p>
         </p:txBody>
       </p:sp>
@@ -5527,4 +7303,324 @@
   <a:objectDefaults/>
   <a:extraClrSchemeLst/>
 </a:theme>
+</file>
+
+<file path=ppt/theme/theme2.xml><?xml version="1.0" encoding="utf-8"?>
+<a:theme xmlns:a="http://schemas.openxmlformats.org/drawingml/2006/main" name="Office Theme">
+  <a:themeElements>
+    <a:clrScheme name="Office">
+      <a:dk1>
+        <a:sysClr val="windowText" lastClr="000000"/>
+      </a:dk1>
+      <a:lt1>
+        <a:sysClr val="window" lastClr="FFFFFF"/>
+      </a:lt1>
+      <a:dk2>
+        <a:srgbClr val="1F497D"/>
+      </a:dk2>
+      <a:lt2>
+        <a:srgbClr val="EEECE1"/>
+      </a:lt2>
+      <a:accent1>
+        <a:srgbClr val="4F81BD"/>
+      </a:accent1>
+      <a:accent2>
+        <a:srgbClr val="C0504D"/>
+      </a:accent2>
+      <a:accent3>
+        <a:srgbClr val="9BBB59"/>
+      </a:accent3>
+      <a:accent4>
+        <a:srgbClr val="8064A2"/>
+      </a:accent4>
+      <a:accent5>
+        <a:srgbClr val="4BACC6"/>
+      </a:accent5>
+      <a:accent6>
+        <a:srgbClr val="F79646"/>
+      </a:accent6>
+      <a:hlink>
+        <a:srgbClr val="0000FF"/>
+      </a:hlink>
+      <a:folHlink>
+        <a:srgbClr val="800080"/>
+      </a:folHlink>
+    </a:clrScheme>
+    <a:fontScheme name="Office">
+      <a:majorFont>
+        <a:latin typeface="Calibri"/>
+        <a:ea typeface=""/>
+        <a:cs typeface=""/>
+        <a:font script="Jpan" typeface="ＭＳ Ｐゴシック"/>
+        <a:font script="Hang" typeface="맑은 고딕"/>
+        <a:font script="Hans" typeface="宋体"/>
+        <a:font script="Hant" typeface="新細明體"/>
+        <a:font script="Arab" typeface="Times New Roman"/>
+        <a:font script="Hebr" typeface="Times New Roman"/>
+        <a:font script="Thai" typeface="Angsana New"/>
+        <a:font script="Ethi" typeface="Nyala"/>
+        <a:font script="Beng" typeface="Vrinda"/>
+        <a:font script="Gujr" typeface="Shruti"/>
+        <a:font script="Khmr" typeface="MoolBoran"/>
+        <a:font script="Knda" typeface="Tunga"/>
+        <a:font script="Guru" typeface="Raavi"/>
+        <a:font script="Cans" typeface="Euphemia"/>
+        <a:font script="Cher" typeface="Plantagenet Cherokee"/>
+        <a:font script="Yiii" typeface="Microsoft Yi Baiti"/>
+        <a:font script="Tibt" typeface="Microsoft Himalaya"/>
+        <a:font script="Thaa" typeface="MV Boli"/>
+        <a:font script="Deva" typeface="Mangal"/>
+        <a:font script="Telu" typeface="Gautami"/>
+        <a:font script="Taml" typeface="Latha"/>
+        <a:font script="Syrc" typeface="Estrangelo Edessa"/>
+        <a:font script="Orya" typeface="Kalinga"/>
+        <a:font script="Mlym" typeface="Kartika"/>
+        <a:font script="Laoo" typeface="DokChampa"/>
+        <a:font script="Sinh" typeface="Iskoola Pota"/>
+        <a:font script="Mong" typeface="Mongolian Baiti"/>
+        <a:font script="Viet" typeface="Times New Roman"/>
+        <a:font script="Uigh" typeface="Microsoft Uighur"/>
+        <a:font script="Geor" typeface="Sylfaen"/>
+      </a:majorFont>
+      <a:minorFont>
+        <a:latin typeface="Calibri"/>
+        <a:ea typeface=""/>
+        <a:cs typeface=""/>
+        <a:font script="Jpan" typeface="ＭＳ Ｐゴシック"/>
+        <a:font script="Hang" typeface="맑은 고딕"/>
+        <a:font script="Hans" typeface="宋体"/>
+        <a:font script="Hant" typeface="新細明體"/>
+        <a:font script="Arab" typeface="Arial"/>
+        <a:font script="Hebr" typeface="Arial"/>
+        <a:font script="Thai" typeface="Cordia New"/>
+        <a:font script="Ethi" typeface="Nyala"/>
+        <a:font script="Beng" typeface="Vrinda"/>
+        <a:font script="Gujr" typeface="Shruti"/>
+        <a:font script="Khmr" typeface="DaunPenh"/>
+        <a:font script="Knda" typeface="Tunga"/>
+        <a:font script="Guru" typeface="Raavi"/>
+        <a:font script="Cans" typeface="Euphemia"/>
+        <a:font script="Cher" typeface="Plantagenet Cherokee"/>
+        <a:font script="Yiii" typeface="Microsoft Yi Baiti"/>
+        <a:font script="Tibt" typeface="Microsoft Himalaya"/>
+        <a:font script="Thaa" typeface="MV Boli"/>
+        <a:font script="Deva" typeface="Mangal"/>
+        <a:font script="Telu" typeface="Gautami"/>
+        <a:font script="Taml" typeface="Latha"/>
+        <a:font script="Syrc" typeface="Estrangelo Edessa"/>
+        <a:font script="Orya" typeface="Kalinga"/>
+        <a:font script="Mlym" typeface="Kartika"/>
+        <a:font script="Laoo" typeface="DokChampa"/>
+        <a:font script="Sinh" typeface="Iskoola Pota"/>
+        <a:font script="Mong" typeface="Mongolian Baiti"/>
+        <a:font script="Viet" typeface="Arial"/>
+        <a:font script="Uigh" typeface="Microsoft Uighur"/>
+        <a:font script="Geor" typeface="Sylfaen"/>
+      </a:minorFont>
+    </a:fontScheme>
+    <a:fmtScheme name="Office">
+      <a:fillStyleLst>
+        <a:solidFill>
+          <a:schemeClr val="phClr"/>
+        </a:solidFill>
+        <a:gradFill rotWithShape="1">
+          <a:gsLst>
+            <a:gs pos="0">
+              <a:schemeClr val="phClr">
+                <a:tint val="50000"/>
+                <a:satMod val="300000"/>
+              </a:schemeClr>
+            </a:gs>
+            <a:gs pos="35000">
+              <a:schemeClr val="phClr">
+                <a:tint val="37000"/>
+                <a:satMod val="300000"/>
+              </a:schemeClr>
+            </a:gs>
+            <a:gs pos="100000">
+              <a:schemeClr val="phClr">
+                <a:tint val="15000"/>
+                <a:satMod val="350000"/>
+              </a:schemeClr>
+            </a:gs>
+          </a:gsLst>
+          <a:lin ang="16200000" scaled="1"/>
+        </a:gradFill>
+        <a:gradFill rotWithShape="1">
+          <a:gsLst>
+            <a:gs pos="0">
+              <a:schemeClr val="phClr">
+                <a:tint val="100000"/>
+                <a:shade val="100000"/>
+                <a:satMod val="130000"/>
+              </a:schemeClr>
+            </a:gs>
+            <a:gs pos="100000">
+              <a:schemeClr val="phClr">
+                <a:tint val="50000"/>
+                <a:shade val="100000"/>
+                <a:satMod val="350000"/>
+              </a:schemeClr>
+            </a:gs>
+          </a:gsLst>
+          <a:lin ang="16200000" scaled="0"/>
+        </a:gradFill>
+      </a:fillStyleLst>
+      <a:lnStyleLst>
+        <a:ln w="9525" cap="flat" cmpd="sng" algn="ctr">
+          <a:solidFill>
+            <a:schemeClr val="phClr">
+              <a:shade val="95000"/>
+              <a:satMod val="105000"/>
+            </a:schemeClr>
+          </a:solidFill>
+          <a:prstDash val="solid"/>
+        </a:ln>
+        <a:ln w="25400" cap="flat" cmpd="sng" algn="ctr">
+          <a:solidFill>
+            <a:schemeClr val="phClr"/>
+          </a:solidFill>
+          <a:prstDash val="solid"/>
+        </a:ln>
+        <a:ln w="38100" cap="flat" cmpd="sng" algn="ctr">
+          <a:solidFill>
+            <a:schemeClr val="phClr"/>
+          </a:solidFill>
+          <a:prstDash val="solid"/>
+        </a:ln>
+      </a:lnStyleLst>
+      <a:effectStyleLst>
+        <a:effectStyle>
+          <a:effectLst>
+            <a:outerShdw blurRad="40000" dist="20000" dir="5400000" rotWithShape="0">
+              <a:srgbClr val="000000">
+                <a:alpha val="38000"/>
+              </a:srgbClr>
+            </a:outerShdw>
+          </a:effectLst>
+        </a:effectStyle>
+        <a:effectStyle>
+          <a:effectLst>
+            <a:outerShdw blurRad="40000" dist="23000" dir="5400000" rotWithShape="0">
+              <a:srgbClr val="000000">
+                <a:alpha val="35000"/>
+              </a:srgbClr>
+            </a:outerShdw>
+          </a:effectLst>
+        </a:effectStyle>
+        <a:effectStyle>
+          <a:effectLst>
+            <a:outerShdw blurRad="40000" dist="23000" dir="5400000" rotWithShape="0">
+              <a:srgbClr val="000000">
+                <a:alpha val="35000"/>
+              </a:srgbClr>
+            </a:outerShdw>
+          </a:effectLst>
+          <a:scene3d>
+            <a:camera prst="orthographicFront">
+              <a:rot lat="0" lon="0" rev="0"/>
+            </a:camera>
+            <a:lightRig rig="threePt" dir="t">
+              <a:rot lat="0" lon="0" rev="1200000"/>
+            </a:lightRig>
+          </a:scene3d>
+          <a:sp3d>
+            <a:bevelT w="63500" h="25400"/>
+          </a:sp3d>
+        </a:effectStyle>
+      </a:effectStyleLst>
+      <a:bgFillStyleLst>
+        <a:solidFill>
+          <a:schemeClr val="phClr"/>
+        </a:solidFill>
+        <a:gradFill rotWithShape="1">
+          <a:gsLst>
+            <a:gs pos="0">
+              <a:schemeClr val="phClr">
+                <a:tint val="40000"/>
+                <a:satMod val="350000"/>
+              </a:schemeClr>
+            </a:gs>
+            <a:gs pos="40000">
+              <a:schemeClr val="phClr">
+                <a:tint val="45000"/>
+                <a:shade val="99000"/>
+                <a:satMod val="350000"/>
+              </a:schemeClr>
+            </a:gs>
+            <a:gs pos="100000">
+              <a:schemeClr val="phClr">
+                <a:shade val="20000"/>
+                <a:satMod val="255000"/>
+              </a:schemeClr>
+            </a:gs>
+          </a:gsLst>
+          <a:path path="circle">
+            <a:fillToRect l="50000" t="-80000" r="50000" b="180000"/>
+          </a:path>
+        </a:gradFill>
+        <a:gradFill rotWithShape="1">
+          <a:gsLst>
+            <a:gs pos="0">
+              <a:schemeClr val="phClr">
+                <a:tint val="80000"/>
+                <a:satMod val="300000"/>
+              </a:schemeClr>
+            </a:gs>
+            <a:gs pos="100000">
+              <a:schemeClr val="phClr">
+                <a:shade val="30000"/>
+                <a:satMod val="200000"/>
+              </a:schemeClr>
+            </a:gs>
+          </a:gsLst>
+          <a:path path="circle">
+            <a:fillToRect l="50000" t="50000" r="50000" b="50000"/>
+          </a:path>
+        </a:gradFill>
+      </a:bgFillStyleLst>
+    </a:fmtScheme>
+  </a:themeElements>
+  <a:objectDefaults>
+    <a:spDef>
+      <a:spPr/>
+      <a:bodyPr/>
+      <a:lstStyle/>
+      <a:style>
+        <a:lnRef idx="1">
+          <a:schemeClr val="accent1"/>
+        </a:lnRef>
+        <a:fillRef idx="3">
+          <a:schemeClr val="accent1"/>
+        </a:fillRef>
+        <a:effectRef idx="2">
+          <a:schemeClr val="accent1"/>
+        </a:effectRef>
+        <a:fontRef idx="minor">
+          <a:schemeClr val="lt1"/>
+        </a:fontRef>
+      </a:style>
+    </a:spDef>
+    <a:lnDef>
+      <a:spPr/>
+      <a:bodyPr/>
+      <a:lstStyle/>
+      <a:style>
+        <a:lnRef idx="2">
+          <a:schemeClr val="accent1"/>
+        </a:lnRef>
+        <a:fillRef idx="0">
+          <a:schemeClr val="accent1"/>
+        </a:fillRef>
+        <a:effectRef idx="1">
+          <a:schemeClr val="accent1"/>
+        </a:effectRef>
+        <a:fontRef idx="minor">
+          <a:schemeClr val="tx1"/>
+        </a:fontRef>
+      </a:style>
+    </a:lnDef>
+  </a:objectDefaults>
+  <a:extraClrSchemeLst/>
+</a:theme>
 </file>
</xml_diff>

<commit_message>
Pre-Projeto : deixando apenas um arquivo de slides  renamed:    pre-projeto/apresentacaorevisado.pptx -> pre-projeto/apresentacao.pptx
</commit_message>
<xml_diff>
--- a/pre-projeto/apresentacao.pptx
+++ b/pre-projeto/apresentacao.pptx
@@ -5,7 +5,7 @@
     <p:sldMasterId id="2147483648" r:id="rId1"/>
   </p:sldMasterIdLst>
   <p:notesMasterIdLst>
-    <p:notesMasterId r:id="rId17"/>
+    <p:notesMasterId r:id="rId21"/>
   </p:notesMasterIdLst>
   <p:sldIdLst>
     <p:sldId id="256" r:id="rId2"/>
@@ -15,14 +15,18 @@
     <p:sldId id="266" r:id="rId6"/>
     <p:sldId id="258" r:id="rId7"/>
     <p:sldId id="259" r:id="rId8"/>
-    <p:sldId id="273" r:id="rId9"/>
-    <p:sldId id="261" r:id="rId10"/>
-    <p:sldId id="265" r:id="rId11"/>
-    <p:sldId id="270" r:id="rId12"/>
-    <p:sldId id="263" r:id="rId13"/>
-    <p:sldId id="274" r:id="rId14"/>
-    <p:sldId id="275" r:id="rId15"/>
-    <p:sldId id="264" r:id="rId16"/>
+    <p:sldId id="276" r:id="rId9"/>
+    <p:sldId id="273" r:id="rId10"/>
+    <p:sldId id="261" r:id="rId11"/>
+    <p:sldId id="265" r:id="rId12"/>
+    <p:sldId id="270" r:id="rId13"/>
+    <p:sldId id="277" r:id="rId14"/>
+    <p:sldId id="278" r:id="rId15"/>
+    <p:sldId id="279" r:id="rId16"/>
+    <p:sldId id="263" r:id="rId17"/>
+    <p:sldId id="274" r:id="rId18"/>
+    <p:sldId id="275" r:id="rId19"/>
+    <p:sldId id="264" r:id="rId20"/>
   </p:sldIdLst>
   <p:sldSz cx="9144000" cy="6858000" type="screen4x3"/>
   <p:notesSz cx="6858000" cy="9144000"/>
@@ -206,7 +210,7 @@
           <a:p>
             <a:fld id="{3B3DC091-544D-4B42-9938-9A362E2AC839}" type="datetimeFigureOut">
               <a:rPr lang="en-US" smtClean="0"/>
-              <a:t>26/11/13</a:t>
+              <a:t>11/26/2013</a:t>
             </a:fld>
             <a:endParaRPr lang="en-US"/>
           </a:p>
@@ -365,7 +369,7 @@
           <a:p>
             <a:fld id="{76AF9A99-7F04-5641-8AF4-E3ACF999B5EC}" type="slidenum">
               <a:rPr lang="en-US" smtClean="0"/>
-              <a:t>‹#›</a:t>
+              <a:t>‹nº›</a:t>
             </a:fld>
             <a:endParaRPr lang="en-US"/>
           </a:p>
@@ -528,15 +532,7 @@
                   <a:schemeClr val="bg1"/>
                 </a:solidFill>
               </a:rPr>
-              <a:t>Isso </a:t>
-            </a:r>
-            <a:r>
-              <a:rPr lang="pt-BR" dirty="0" smtClean="0">
-                <a:solidFill>
-                  <a:schemeClr val="bg1"/>
-                </a:solidFill>
-              </a:rPr>
-              <a:t>é justificativa para abrir</a:t>
+              <a:t>Isso é justificativa para abrir</a:t>
             </a:r>
             <a:r>
               <a:rPr lang="pt-BR" baseline="0" dirty="0" smtClean="0">
@@ -608,15 +604,7 @@
                   <a:schemeClr val="bg1"/>
                 </a:solidFill>
               </a:rPr>
-              <a:t>Separe o que </a:t>
-            </a:r>
-            <a:r>
-              <a:rPr lang="pt-BR" dirty="0" smtClean="0">
-                <a:solidFill>
-                  <a:schemeClr val="bg1"/>
-                </a:solidFill>
-              </a:rPr>
-              <a:t>é objetivo</a:t>
+              <a:t>Separe o que é objetivo</a:t>
             </a:r>
             <a:r>
               <a:rPr lang="pt-BR" baseline="0" dirty="0" smtClean="0">
@@ -752,15 +740,7 @@
                   <a:schemeClr val="bg1"/>
                 </a:solidFill>
               </a:rPr>
-              <a:t>Lembrar que a p</a:t>
-            </a:r>
-            <a:r>
-              <a:rPr lang="pt-BR" dirty="0" smtClean="0">
-                <a:solidFill>
-                  <a:schemeClr val="bg1"/>
-                </a:solidFill>
-              </a:rPr>
-              <a:t>ós-produção será da empresa para acabamento</a:t>
+              <a:t>Lembrar que a pós-produção será da empresa para acabamento</a:t>
             </a:r>
             <a:r>
               <a:rPr lang="pt-BR" baseline="0" dirty="0" smtClean="0">
@@ -798,7 +778,7 @@
           <a:p>
             <a:fld id="{76AF9A99-7F04-5641-8AF4-E3ACF999B5EC}" type="slidenum">
               <a:rPr lang="en-US" smtClean="0"/>
-              <a:t>8</a:t>
+              <a:t>9</a:t>
             </a:fld>
             <a:endParaRPr lang="en-US"/>
           </a:p>
@@ -992,11 +972,7 @@
             </a:pPr>
             <a:r>
               <a:rPr lang="en-US" dirty="0" err="1" smtClean="0"/>
-              <a:t>Pr</a:t>
-            </a:r>
-            <a:r>
-              <a:rPr lang="en-US" dirty="0" err="1" smtClean="0"/>
-              <a:t>é-produção</a:t>
+              <a:t>Pré-produção</a:t>
             </a:r>
             <a:r>
               <a:rPr lang="en-US" dirty="0" smtClean="0"/>
@@ -1079,7 +1055,7 @@
           <a:p>
             <a:fld id="{76AF9A99-7F04-5641-8AF4-E3ACF999B5EC}" type="slidenum">
               <a:rPr lang="en-US" smtClean="0"/>
-              <a:t>10</a:t>
+              <a:t>11</a:t>
             </a:fld>
             <a:endParaRPr lang="en-US"/>
           </a:p>
@@ -1163,11 +1139,7 @@
             </a:r>
             <a:r>
               <a:rPr lang="en-US" baseline="0" dirty="0" err="1" smtClean="0"/>
-              <a:t>distribuiç</a:t>
-            </a:r>
-            <a:r>
-              <a:rPr lang="en-US" baseline="0" dirty="0" err="1" smtClean="0"/>
-              <a:t>ão</a:t>
+              <a:t>distribuição</a:t>
             </a:r>
             <a:r>
               <a:rPr lang="en-US" baseline="0" dirty="0" smtClean="0"/>
@@ -1365,7 +1337,7 @@
           <a:p>
             <a:fld id="{76AF9A99-7F04-5641-8AF4-E3ACF999B5EC}" type="slidenum">
               <a:rPr lang="en-US" smtClean="0"/>
-              <a:t>11</a:t>
+              <a:t>12</a:t>
             </a:fld>
             <a:endParaRPr lang="en-US"/>
           </a:p>
@@ -1566,7 +1538,7 @@
             <a:fld id="{69FAF774-2C22-4986-A8EB-521CC8256BA2}" type="datetimeFigureOut">
               <a:rPr lang="pt-BR" smtClean="0"/>
               <a:pPr/>
-              <a:t>26/11/13</a:t>
+              <a:t>26/11/2013</a:t>
             </a:fld>
             <a:endParaRPr lang="pt-BR"/>
           </a:p>
@@ -1609,7 +1581,7 @@
             <a:fld id="{AEBE9E91-1164-48B5-9DD9-0906DC7D818B}" type="slidenum">
               <a:rPr lang="pt-BR" smtClean="0"/>
               <a:pPr/>
-              <a:t>‹#›</a:t>
+              <a:t>‹nº›</a:t>
             </a:fld>
             <a:endParaRPr lang="pt-BR"/>
           </a:p>
@@ -1733,7 +1705,7 @@
             <a:fld id="{69FAF774-2C22-4986-A8EB-521CC8256BA2}" type="datetimeFigureOut">
               <a:rPr lang="pt-BR" smtClean="0"/>
               <a:pPr/>
-              <a:t>26/11/13</a:t>
+              <a:t>26/11/2013</a:t>
             </a:fld>
             <a:endParaRPr lang="pt-BR"/>
           </a:p>
@@ -1776,7 +1748,7 @@
             <a:fld id="{AEBE9E91-1164-48B5-9DD9-0906DC7D818B}" type="slidenum">
               <a:rPr lang="pt-BR" smtClean="0"/>
               <a:pPr/>
-              <a:t>‹#›</a:t>
+              <a:t>‹nº›</a:t>
             </a:fld>
             <a:endParaRPr lang="pt-BR"/>
           </a:p>
@@ -1910,7 +1882,7 @@
             <a:fld id="{69FAF774-2C22-4986-A8EB-521CC8256BA2}" type="datetimeFigureOut">
               <a:rPr lang="pt-BR" smtClean="0"/>
               <a:pPr/>
-              <a:t>26/11/13</a:t>
+              <a:t>26/11/2013</a:t>
             </a:fld>
             <a:endParaRPr lang="pt-BR"/>
           </a:p>
@@ -1953,7 +1925,7 @@
             <a:fld id="{AEBE9E91-1164-48B5-9DD9-0906DC7D818B}" type="slidenum">
               <a:rPr lang="pt-BR" smtClean="0"/>
               <a:pPr/>
-              <a:t>‹#›</a:t>
+              <a:t>‹nº›</a:t>
             </a:fld>
             <a:endParaRPr lang="pt-BR"/>
           </a:p>
@@ -2077,7 +2049,7 @@
             <a:fld id="{69FAF774-2C22-4986-A8EB-521CC8256BA2}" type="datetimeFigureOut">
               <a:rPr lang="pt-BR" smtClean="0"/>
               <a:pPr/>
-              <a:t>26/11/13</a:t>
+              <a:t>26/11/2013</a:t>
             </a:fld>
             <a:endParaRPr lang="pt-BR"/>
           </a:p>
@@ -2120,7 +2092,7 @@
             <a:fld id="{AEBE9E91-1164-48B5-9DD9-0906DC7D818B}" type="slidenum">
               <a:rPr lang="pt-BR" smtClean="0"/>
               <a:pPr/>
-              <a:t>‹#›</a:t>
+              <a:t>‹nº›</a:t>
             </a:fld>
             <a:endParaRPr lang="pt-BR"/>
           </a:p>
@@ -2320,7 +2292,7 @@
             <a:fld id="{69FAF774-2C22-4986-A8EB-521CC8256BA2}" type="datetimeFigureOut">
               <a:rPr lang="pt-BR" smtClean="0"/>
               <a:pPr/>
-              <a:t>26/11/13</a:t>
+              <a:t>26/11/2013</a:t>
             </a:fld>
             <a:endParaRPr lang="pt-BR"/>
           </a:p>
@@ -2363,7 +2335,7 @@
             <a:fld id="{AEBE9E91-1164-48B5-9DD9-0906DC7D818B}" type="slidenum">
               <a:rPr lang="pt-BR" smtClean="0"/>
               <a:pPr/>
-              <a:t>‹#›</a:t>
+              <a:t>‹nº›</a:t>
             </a:fld>
             <a:endParaRPr lang="pt-BR"/>
           </a:p>
@@ -2605,7 +2577,7 @@
             <a:fld id="{69FAF774-2C22-4986-A8EB-521CC8256BA2}" type="datetimeFigureOut">
               <a:rPr lang="pt-BR" smtClean="0"/>
               <a:pPr/>
-              <a:t>26/11/13</a:t>
+              <a:t>26/11/2013</a:t>
             </a:fld>
             <a:endParaRPr lang="pt-BR"/>
           </a:p>
@@ -2648,7 +2620,7 @@
             <a:fld id="{AEBE9E91-1164-48B5-9DD9-0906DC7D818B}" type="slidenum">
               <a:rPr lang="pt-BR" smtClean="0"/>
               <a:pPr/>
-              <a:t>‹#›</a:t>
+              <a:t>‹nº›</a:t>
             </a:fld>
             <a:endParaRPr lang="pt-BR"/>
           </a:p>
@@ -3024,7 +2996,7 @@
             <a:fld id="{69FAF774-2C22-4986-A8EB-521CC8256BA2}" type="datetimeFigureOut">
               <a:rPr lang="pt-BR" smtClean="0"/>
               <a:pPr/>
-              <a:t>26/11/13</a:t>
+              <a:t>26/11/2013</a:t>
             </a:fld>
             <a:endParaRPr lang="pt-BR"/>
           </a:p>
@@ -3067,7 +3039,7 @@
             <a:fld id="{AEBE9E91-1164-48B5-9DD9-0906DC7D818B}" type="slidenum">
               <a:rPr lang="pt-BR" smtClean="0"/>
               <a:pPr/>
-              <a:t>‹#›</a:t>
+              <a:t>‹nº›</a:t>
             </a:fld>
             <a:endParaRPr lang="pt-BR"/>
           </a:p>
@@ -3139,7 +3111,7 @@
             <a:fld id="{69FAF774-2C22-4986-A8EB-521CC8256BA2}" type="datetimeFigureOut">
               <a:rPr lang="pt-BR" smtClean="0"/>
               <a:pPr/>
-              <a:t>26/11/13</a:t>
+              <a:t>26/11/2013</a:t>
             </a:fld>
             <a:endParaRPr lang="pt-BR"/>
           </a:p>
@@ -3182,7 +3154,7 @@
             <a:fld id="{AEBE9E91-1164-48B5-9DD9-0906DC7D818B}" type="slidenum">
               <a:rPr lang="pt-BR" smtClean="0"/>
               <a:pPr/>
-              <a:t>‹#›</a:t>
+              <a:t>‹nº›</a:t>
             </a:fld>
             <a:endParaRPr lang="pt-BR"/>
           </a:p>
@@ -3231,7 +3203,7 @@
             <a:fld id="{69FAF774-2C22-4986-A8EB-521CC8256BA2}" type="datetimeFigureOut">
               <a:rPr lang="pt-BR" smtClean="0"/>
               <a:pPr/>
-              <a:t>26/11/13</a:t>
+              <a:t>26/11/2013</a:t>
             </a:fld>
             <a:endParaRPr lang="pt-BR"/>
           </a:p>
@@ -3274,7 +3246,7 @@
             <a:fld id="{AEBE9E91-1164-48B5-9DD9-0906DC7D818B}" type="slidenum">
               <a:rPr lang="pt-BR" smtClean="0"/>
               <a:pPr/>
-              <a:t>‹#›</a:t>
+              <a:t>‹nº›</a:t>
             </a:fld>
             <a:endParaRPr lang="pt-BR"/>
           </a:p>
@@ -3505,7 +3477,7 @@
             <a:fld id="{69FAF774-2C22-4986-A8EB-521CC8256BA2}" type="datetimeFigureOut">
               <a:rPr lang="pt-BR" smtClean="0"/>
               <a:pPr/>
-              <a:t>26/11/13</a:t>
+              <a:t>26/11/2013</a:t>
             </a:fld>
             <a:endParaRPr lang="pt-BR"/>
           </a:p>
@@ -3548,7 +3520,7 @@
             <a:fld id="{AEBE9E91-1164-48B5-9DD9-0906DC7D818B}" type="slidenum">
               <a:rPr lang="pt-BR" smtClean="0"/>
               <a:pPr/>
-              <a:t>‹#›</a:t>
+              <a:t>‹nº›</a:t>
             </a:fld>
             <a:endParaRPr lang="pt-BR"/>
           </a:p>
@@ -3755,7 +3727,7 @@
             <a:fld id="{69FAF774-2C22-4986-A8EB-521CC8256BA2}" type="datetimeFigureOut">
               <a:rPr lang="pt-BR" smtClean="0"/>
               <a:pPr/>
-              <a:t>26/11/13</a:t>
+              <a:t>26/11/2013</a:t>
             </a:fld>
             <a:endParaRPr lang="pt-BR"/>
           </a:p>
@@ -3798,7 +3770,7 @@
             <a:fld id="{AEBE9E91-1164-48B5-9DD9-0906DC7D818B}" type="slidenum">
               <a:rPr lang="pt-BR" smtClean="0"/>
               <a:pPr/>
-              <a:t>‹#›</a:t>
+              <a:t>‹nº›</a:t>
             </a:fld>
             <a:endParaRPr lang="pt-BR"/>
           </a:p>
@@ -3968,7 +3940,7 @@
             <a:fld id="{69FAF774-2C22-4986-A8EB-521CC8256BA2}" type="datetimeFigureOut">
               <a:rPr lang="pt-BR" smtClean="0"/>
               <a:pPr/>
-              <a:t>26/11/13</a:t>
+              <a:t>26/11/2013</a:t>
             </a:fld>
             <a:endParaRPr lang="pt-BR"/>
           </a:p>
@@ -4047,7 +4019,7 @@
             <a:fld id="{AEBE9E91-1164-48B5-9DD9-0906DC7D818B}" type="slidenum">
               <a:rPr lang="pt-BR" smtClean="0"/>
               <a:pPr/>
-              <a:t>‹#›</a:t>
+              <a:t>‹nº›</a:t>
             </a:fld>
             <a:endParaRPr lang="pt-BR"/>
           </a:p>
@@ -4516,11 +4488,6 @@
               </a:rPr>
               <a:t>DIATINF</a:t>
             </a:r>
-            <a:endParaRPr lang="pt-BR" sz="2400" dirty="0" smtClean="0">
-              <a:solidFill>
-                <a:schemeClr val="bg1"/>
-              </a:solidFill>
-            </a:endParaRPr>
           </a:p>
           <a:p>
             <a:pPr marL="0" marR="0" lvl="0" indent="0" algn="ctr" defTabSz="914400" rtl="0" eaLnBrk="1" fontAlgn="auto" latinLnBrk="0" hangingPunct="1">
@@ -4589,7 +4556,7 @@
       </p:grpSpPr>
       <p:sp>
         <p:nvSpPr>
-          <p:cNvPr id="6" name="Título 5"/>
+          <p:cNvPr id="4" name="Título 3"/>
           <p:cNvSpPr>
             <a:spLocks noGrp="1"/>
           </p:cNvSpPr>
@@ -4608,7 +4575,7 @@
                   <a:schemeClr val="bg1"/>
                 </a:solidFill>
               </a:rPr>
-              <a:t>Jogos computacionais</a:t>
+              <a:t>Fundamentação teórica</a:t>
             </a:r>
             <a:endParaRPr lang="pt-BR" dirty="0">
               <a:solidFill>
@@ -4620,12 +4587,12 @@
       </p:sp>
       <p:sp>
         <p:nvSpPr>
-          <p:cNvPr id="7" name="Espaço Reservado para Conteúdo 6"/>
-          <p:cNvSpPr>
-            <a:spLocks noGrp="1"/>
-          </p:cNvSpPr>
-          <p:nvPr>
-            <p:ph idx="1"/>
+          <p:cNvPr id="5" name="Espaço Reservado para Texto 4"/>
+          <p:cNvSpPr>
+            <a:spLocks noGrp="1"/>
+          </p:cNvSpPr>
+          <p:nvPr>
+            <p:ph type="body" idx="1"/>
           </p:nvPr>
         </p:nvSpPr>
         <p:spPr/>
@@ -4633,37 +4600,7 @@
           <a:bodyPr/>
           <a:lstStyle/>
           <a:p>
-            <a:pPr>
-              <a:buFont typeface="Wingdings" panose="05000000000000000000" pitchFamily="2" charset="2"/>
-              <a:buChar char="Ø"/>
-            </a:pPr>
-            <a:r>
-              <a:rPr lang="pt-BR" dirty="0" smtClean="0">
-                <a:solidFill>
-                  <a:schemeClr val="bg1"/>
-                </a:solidFill>
-              </a:rPr>
-              <a:t>Jogos computacionais</a:t>
-            </a:r>
-          </a:p>
-          <a:p>
-            <a:pPr>
-              <a:buFont typeface="Wingdings" panose="05000000000000000000" pitchFamily="2" charset="2"/>
-              <a:buChar char="Ø"/>
-            </a:pPr>
-            <a:r>
-              <a:rPr lang="pt-BR" dirty="0" smtClean="0">
-                <a:solidFill>
-                  <a:schemeClr val="bg1"/>
-                </a:solidFill>
-              </a:rPr>
-              <a:t>Processo de desenvolvimento de jogos</a:t>
-            </a:r>
-            <a:endParaRPr lang="pt-BR" dirty="0">
-              <a:solidFill>
-                <a:schemeClr val="bg1"/>
-              </a:solidFill>
-            </a:endParaRPr>
+            <a:endParaRPr lang="pt-BR"/>
           </a:p>
         </p:txBody>
       </p:sp>
@@ -4694,92 +4631,27 @@
       </p:grpSpPr>
       <p:sp>
         <p:nvSpPr>
-          <p:cNvPr id="2" name="CaixaDeTexto 1"/>
-          <p:cNvSpPr txBox="1"/>
-          <p:nvPr/>
-        </p:nvSpPr>
-        <p:spPr>
-          <a:xfrm>
-            <a:off x="395536" y="1916832"/>
-            <a:ext cx="7704856" cy="1292662"/>
-          </a:xfrm>
-          <a:prstGeom prst="rect">
-            <a:avLst/>
-          </a:prstGeom>
-          <a:noFill/>
-        </p:spPr>
-        <p:txBody>
-          <a:bodyPr wrap="square" rtlCol="0">
-            <a:spAutoFit/>
-          </a:bodyPr>
+          <p:cNvPr id="6" name="Título 5"/>
+          <p:cNvSpPr>
+            <a:spLocks noGrp="1"/>
+          </p:cNvSpPr>
+          <p:nvPr>
+            <p:ph type="title"/>
+          </p:nvPr>
+        </p:nvSpPr>
+        <p:spPr/>
+        <p:txBody>
+          <a:bodyPr/>
           <a:lstStyle/>
           <a:p>
-            <a:pPr marL="285750" indent="-285750">
-              <a:buFont typeface="Wingdings" panose="05000000000000000000" pitchFamily="2" charset="2"/>
-              <a:buChar char="Ø"/>
-            </a:pPr>
-            <a:r>
-              <a:rPr lang="pt-BR" sz="3000" dirty="0">
-                <a:solidFill>
-                  <a:schemeClr val="bg1"/>
-                </a:solidFill>
-              </a:rPr>
-              <a:t>Utilização do </a:t>
-            </a:r>
-            <a:r>
-              <a:rPr lang="pt-BR" sz="3000" dirty="0" err="1">
-                <a:solidFill>
-                  <a:schemeClr val="bg1"/>
-                </a:solidFill>
-              </a:rPr>
-              <a:t>Unity</a:t>
-            </a:r>
-            <a:r>
-              <a:rPr lang="pt-BR" sz="3000" dirty="0">
-                <a:solidFill>
-                  <a:schemeClr val="bg1"/>
-                </a:solidFill>
-              </a:rPr>
-              <a:t>? O que falar sobre o </a:t>
-            </a:r>
-            <a:r>
-              <a:rPr lang="pt-BR" sz="3000" dirty="0" err="1">
-                <a:solidFill>
-                  <a:schemeClr val="bg1"/>
-                </a:solidFill>
-              </a:rPr>
-              <a:t>unity</a:t>
-            </a:r>
-            <a:r>
-              <a:rPr lang="pt-BR" sz="3000" dirty="0">
-                <a:solidFill>
-                  <a:schemeClr val="bg1"/>
-                </a:solidFill>
-              </a:rPr>
-              <a:t> no referencial </a:t>
-            </a:r>
-            <a:r>
-              <a:rPr lang="pt-BR" sz="3000" dirty="0" err="1">
-                <a:solidFill>
-                  <a:schemeClr val="bg1"/>
-                </a:solidFill>
-              </a:rPr>
-              <a:t>teorico</a:t>
-            </a:r>
-            <a:r>
-              <a:rPr lang="pt-BR" sz="3000" dirty="0">
-                <a:solidFill>
-                  <a:schemeClr val="bg1"/>
-                </a:solidFill>
-              </a:rPr>
-              <a:t>? O que abordar? </a:t>
-            </a:r>
-          </a:p>
-          <a:p>
-            <a:pPr marL="285750" indent="-285750">
-              <a:buFont typeface="Wingdings" panose="05000000000000000000" pitchFamily="2" charset="2"/>
-              <a:buChar char="Ø"/>
-            </a:pPr>
+            <a:r>
+              <a:rPr lang="pt-BR" dirty="0" smtClean="0">
+                <a:solidFill>
+                  <a:schemeClr val="bg1"/>
+                </a:solidFill>
+              </a:rPr>
+              <a:t>Jogos computacionais</a:t>
+            </a:r>
             <a:endParaRPr lang="pt-BR" dirty="0">
               <a:solidFill>
                 <a:schemeClr val="bg1"/>
@@ -4788,6 +4660,306 @@
           </a:p>
         </p:txBody>
       </p:sp>
+      <p:sp>
+        <p:nvSpPr>
+          <p:cNvPr id="7" name="Espaço Reservado para Conteúdo 6"/>
+          <p:cNvSpPr>
+            <a:spLocks noGrp="1"/>
+          </p:cNvSpPr>
+          <p:nvPr>
+            <p:ph idx="1"/>
+          </p:nvPr>
+        </p:nvSpPr>
+        <p:spPr/>
+        <p:txBody>
+          <a:bodyPr/>
+          <a:lstStyle/>
+          <a:p>
+            <a:pPr>
+              <a:buFont typeface="Wingdings" panose="05000000000000000000" pitchFamily="2" charset="2"/>
+              <a:buChar char="Ø"/>
+            </a:pPr>
+            <a:r>
+              <a:rPr lang="pt-BR" dirty="0" smtClean="0">
+                <a:solidFill>
+                  <a:schemeClr val="bg1"/>
+                </a:solidFill>
+              </a:rPr>
+              <a:t>Jogos </a:t>
+            </a:r>
+            <a:r>
+              <a:rPr lang="pt-BR" dirty="0" smtClean="0">
+                <a:solidFill>
+                  <a:schemeClr val="bg1"/>
+                </a:solidFill>
+              </a:rPr>
+              <a:t>computacionais</a:t>
+            </a:r>
+          </a:p>
+          <a:p>
+            <a:pPr lvl="1">
+              <a:buFont typeface="Wingdings" panose="05000000000000000000" pitchFamily="2" charset="2"/>
+              <a:buChar char="Ø"/>
+            </a:pPr>
+            <a:r>
+              <a:rPr lang="pt-BR" sz="2400" dirty="0" smtClean="0">
+                <a:solidFill>
+                  <a:schemeClr val="bg1"/>
+                </a:solidFill>
+              </a:rPr>
+              <a:t>Plataforma, corrida, luta, tabuleiro, puzzle, estratégia, tiro, música e entre outros.</a:t>
+            </a:r>
+          </a:p>
+          <a:p>
+            <a:pPr lvl="1">
+              <a:buFont typeface="Wingdings" panose="05000000000000000000" pitchFamily="2" charset="2"/>
+              <a:buChar char="Ø"/>
+            </a:pPr>
+            <a:r>
+              <a:rPr lang="pt-BR" sz="2400" dirty="0" smtClean="0">
+                <a:solidFill>
+                  <a:schemeClr val="bg1"/>
+                </a:solidFill>
+              </a:rPr>
+              <a:t>Aventura em primeira pessoa, </a:t>
+            </a:r>
+            <a:r>
+              <a:rPr lang="pt-BR" sz="2400" dirty="0" err="1" smtClean="0">
+                <a:solidFill>
+                  <a:schemeClr val="bg1"/>
+                </a:solidFill>
+              </a:rPr>
+              <a:t>first</a:t>
+            </a:r>
+            <a:r>
+              <a:rPr lang="pt-BR" sz="2400" dirty="0" smtClean="0">
+                <a:solidFill>
+                  <a:schemeClr val="bg1"/>
+                </a:solidFill>
+              </a:rPr>
+              <a:t> </a:t>
+            </a:r>
+            <a:r>
+              <a:rPr lang="pt-BR" sz="2400" dirty="0" err="1" smtClean="0">
+                <a:solidFill>
+                  <a:schemeClr val="bg1"/>
+                </a:solidFill>
+              </a:rPr>
+              <a:t>person</a:t>
+            </a:r>
+            <a:r>
+              <a:rPr lang="pt-BR" sz="2400" dirty="0" smtClean="0">
+                <a:solidFill>
+                  <a:schemeClr val="bg1"/>
+                </a:solidFill>
+              </a:rPr>
+              <a:t> </a:t>
+            </a:r>
+            <a:r>
+              <a:rPr lang="pt-BR" sz="2400" dirty="0" err="1" smtClean="0">
+                <a:solidFill>
+                  <a:schemeClr val="bg1"/>
+                </a:solidFill>
+              </a:rPr>
+              <a:t>shooter</a:t>
+            </a:r>
+            <a:r>
+              <a:rPr lang="pt-BR" sz="2400" dirty="0" smtClean="0">
+                <a:solidFill>
+                  <a:schemeClr val="bg1"/>
+                </a:solidFill>
+              </a:rPr>
+              <a:t>, </a:t>
+            </a:r>
+            <a:r>
+              <a:rPr lang="pt-BR" sz="2400" dirty="0" err="1" smtClean="0">
+                <a:solidFill>
+                  <a:schemeClr val="bg1"/>
+                </a:solidFill>
+              </a:rPr>
+              <a:t>third</a:t>
+            </a:r>
+            <a:r>
+              <a:rPr lang="pt-BR" sz="2400" dirty="0" smtClean="0">
+                <a:solidFill>
+                  <a:schemeClr val="bg1"/>
+                </a:solidFill>
+              </a:rPr>
+              <a:t> </a:t>
+            </a:r>
+            <a:r>
+              <a:rPr lang="pt-BR" sz="2400" dirty="0" err="1" smtClean="0">
+                <a:solidFill>
+                  <a:schemeClr val="bg1"/>
+                </a:solidFill>
+              </a:rPr>
+              <a:t>person</a:t>
+            </a:r>
+            <a:r>
+              <a:rPr lang="pt-BR" sz="2400" dirty="0" smtClean="0">
+                <a:solidFill>
+                  <a:schemeClr val="bg1"/>
+                </a:solidFill>
+              </a:rPr>
+              <a:t> </a:t>
+            </a:r>
+            <a:r>
+              <a:rPr lang="pt-BR" sz="2400" dirty="0" err="1" smtClean="0">
+                <a:solidFill>
+                  <a:schemeClr val="bg1"/>
+                </a:solidFill>
+              </a:rPr>
+              <a:t>shooter</a:t>
+            </a:r>
+            <a:r>
+              <a:rPr lang="pt-BR" sz="2400" dirty="0" smtClean="0">
+                <a:solidFill>
+                  <a:schemeClr val="bg1"/>
+                </a:solidFill>
+              </a:rPr>
+              <a:t>, RPG, MMORPG, MMOG, TBS e </a:t>
+            </a:r>
+            <a:r>
+              <a:rPr lang="pt-BR" sz="2400" dirty="0" smtClean="0">
+                <a:solidFill>
+                  <a:schemeClr val="bg1"/>
+                </a:solidFill>
+              </a:rPr>
+              <a:t>etc.</a:t>
+            </a:r>
+            <a:endParaRPr lang="pt-BR" sz="2400" dirty="0" smtClean="0">
+              <a:solidFill>
+                <a:schemeClr val="bg1"/>
+              </a:solidFill>
+            </a:endParaRPr>
+          </a:p>
+          <a:p>
+            <a:pPr>
+              <a:buFont typeface="Wingdings" panose="05000000000000000000" pitchFamily="2" charset="2"/>
+              <a:buChar char="Ø"/>
+            </a:pPr>
+            <a:r>
+              <a:rPr lang="pt-BR" dirty="0" smtClean="0">
+                <a:solidFill>
+                  <a:schemeClr val="bg1"/>
+                </a:solidFill>
+              </a:rPr>
+              <a:t>Processo </a:t>
+            </a:r>
+            <a:r>
+              <a:rPr lang="pt-BR" dirty="0" smtClean="0">
+                <a:solidFill>
+                  <a:schemeClr val="bg1"/>
+                </a:solidFill>
+              </a:rPr>
+              <a:t>de desenvolvimento de </a:t>
+            </a:r>
+            <a:r>
+              <a:rPr lang="pt-BR" dirty="0" smtClean="0">
+                <a:solidFill>
+                  <a:schemeClr val="bg1"/>
+                </a:solidFill>
+              </a:rPr>
+              <a:t>jogos</a:t>
+            </a:r>
+          </a:p>
+          <a:p>
+            <a:pPr lvl="1">
+              <a:buFont typeface="Wingdings" panose="05000000000000000000" pitchFamily="2" charset="2"/>
+              <a:buChar char="Ø"/>
+            </a:pPr>
+            <a:r>
+              <a:rPr lang="pt-BR" dirty="0" smtClean="0">
+                <a:solidFill>
+                  <a:schemeClr val="bg1"/>
+                </a:solidFill>
+              </a:rPr>
+              <a:t>Pré-produção</a:t>
+            </a:r>
+          </a:p>
+          <a:p>
+            <a:pPr lvl="1">
+              <a:buFont typeface="Wingdings" panose="05000000000000000000" pitchFamily="2" charset="2"/>
+              <a:buChar char="Ø"/>
+            </a:pPr>
+            <a:r>
+              <a:rPr lang="pt-BR" dirty="0" smtClean="0">
+                <a:solidFill>
+                  <a:schemeClr val="bg1"/>
+                </a:solidFill>
+              </a:rPr>
+              <a:t>Produção(usualmente um processo ágil (</a:t>
+            </a:r>
+            <a:r>
+              <a:rPr lang="pt-BR" dirty="0" err="1" smtClean="0">
+                <a:solidFill>
+                  <a:schemeClr val="bg1"/>
+                </a:solidFill>
+              </a:rPr>
+              <a:t>Srum</a:t>
+            </a:r>
+            <a:r>
+              <a:rPr lang="pt-BR" dirty="0" smtClean="0">
+                <a:solidFill>
+                  <a:schemeClr val="bg1"/>
+                </a:solidFill>
+              </a:rPr>
+              <a:t>))</a:t>
+            </a:r>
+          </a:p>
+          <a:p>
+            <a:pPr lvl="1">
+              <a:buFont typeface="Wingdings" panose="05000000000000000000" pitchFamily="2" charset="2"/>
+              <a:buChar char="Ø"/>
+            </a:pPr>
+            <a:r>
+              <a:rPr lang="pt-BR" dirty="0" smtClean="0">
+                <a:solidFill>
+                  <a:schemeClr val="bg1"/>
+                </a:solidFill>
+              </a:rPr>
+              <a:t>Pós-produção</a:t>
+            </a:r>
+            <a:endParaRPr lang="pt-BR" dirty="0">
+              <a:solidFill>
+                <a:schemeClr val="bg1"/>
+              </a:solidFill>
+            </a:endParaRPr>
+          </a:p>
+        </p:txBody>
+      </p:sp>
+    </p:spTree>
+  </p:cSld>
+  <p:clrMapOvr>
+    <a:masterClrMapping/>
+  </p:clrMapOvr>
+  <p:timing>
+    <p:tnLst>
+      <p:par>
+        <p:cTn id="1" dur="indefinite" restart="never" nodeType="tmRoot"/>
+      </p:par>
+    </p:tnLst>
+  </p:timing>
+</p:sld>
+</file>
+
+<file path=ppt/slides/slide12.xml><?xml version="1.0" encoding="utf-8"?>
+<p:sld xmlns:a="http://schemas.openxmlformats.org/drawingml/2006/main" xmlns:r="http://schemas.openxmlformats.org/officeDocument/2006/relationships" xmlns:p="http://schemas.openxmlformats.org/presentationml/2006/main">
+  <p:cSld>
+    <p:spTree>
+      <p:nvGrpSpPr>
+        <p:cNvPr id="1" name=""/>
+        <p:cNvGrpSpPr/>
+        <p:nvPr/>
+      </p:nvGrpSpPr>
+      <p:grpSpPr>
+        <a:xfrm>
+          <a:off x="0" y="0"/>
+          <a:ext cx="0" cy="0"/>
+          <a:chOff x="0" y="0"/>
+          <a:chExt cx="0" cy="0"/>
+        </a:xfrm>
+      </p:grpSpPr>
       <p:pic>
         <p:nvPicPr>
           <p:cNvPr id="3" name="Imagem 2"/>
@@ -4840,8 +5012,8 @@
         </p:blipFill>
         <p:spPr>
           <a:xfrm>
-            <a:off x="0" y="3501008"/>
-            <a:ext cx="9144000" cy="2914369"/>
+            <a:off x="-3215" y="2157791"/>
+            <a:ext cx="9144000" cy="3778465"/>
           </a:xfrm>
           <a:prstGeom prst="rect">
             <a:avLst/>
@@ -4858,85 +5030,10 @@
   <p:clrMapOvr>
     <a:masterClrMapping/>
   </p:clrMapOvr>
-</p:sld>
-</file>
-
-<file path=ppt/slides/slide12.xml><?xml version="1.0" encoding="utf-8"?>
-<p:sld xmlns:a="http://schemas.openxmlformats.org/drawingml/2006/main" xmlns:r="http://schemas.openxmlformats.org/officeDocument/2006/relationships" xmlns:p="http://schemas.openxmlformats.org/presentationml/2006/main">
-  <p:cSld>
-    <p:spTree>
-      <p:nvGrpSpPr>
-        <p:cNvPr id="1" name=""/>
-        <p:cNvGrpSpPr/>
-        <p:nvPr/>
-      </p:nvGrpSpPr>
-      <p:grpSpPr>
-        <a:xfrm>
-          <a:off x="0" y="0"/>
-          <a:ext cx="0" cy="0"/>
-          <a:chOff x="0" y="0"/>
-          <a:chExt cx="0" cy="0"/>
-        </a:xfrm>
-      </p:grpSpPr>
-      <p:sp>
-        <p:nvSpPr>
-          <p:cNvPr id="4" name="Título 3"/>
-          <p:cNvSpPr>
-            <a:spLocks noGrp="1"/>
-          </p:cNvSpPr>
-          <p:nvPr>
-            <p:ph type="title"/>
-          </p:nvPr>
-        </p:nvSpPr>
-        <p:spPr/>
-        <p:txBody>
-          <a:bodyPr/>
-          <a:lstStyle/>
-          <a:p>
-            <a:r>
-              <a:rPr lang="pt-BR" dirty="0" smtClean="0">
-                <a:solidFill>
-                  <a:schemeClr val="bg1"/>
-                </a:solidFill>
-              </a:rPr>
-              <a:t>cronograma</a:t>
-            </a:r>
-            <a:endParaRPr lang="pt-BR" dirty="0">
-              <a:solidFill>
-                <a:schemeClr val="bg1"/>
-              </a:solidFill>
-            </a:endParaRPr>
-          </a:p>
-        </p:txBody>
-      </p:sp>
-      <p:sp>
-        <p:nvSpPr>
-          <p:cNvPr id="5" name="Espaço Reservado para Texto 4"/>
-          <p:cNvSpPr>
-            <a:spLocks noGrp="1"/>
-          </p:cNvSpPr>
-          <p:nvPr>
-            <p:ph type="body" idx="1"/>
-          </p:nvPr>
-        </p:nvSpPr>
-        <p:spPr/>
-        <p:txBody>
-          <a:bodyPr/>
-          <a:lstStyle/>
-          <a:p>
-            <a:endParaRPr lang="pt-BR"/>
-          </a:p>
-        </p:txBody>
-      </p:sp>
-    </p:spTree>
-  </p:cSld>
-  <p:clrMapOvr>
-    <a:masterClrMapping/>
-  </p:clrMapOvr>
   <p:timing>
     <p:tnLst>
       <p:par>
-        <p:cTn xmlns:p14="http://schemas.microsoft.com/office/powerpoint/2010/main" id="1" dur="indefinite" restart="never" nodeType="tmRoot"/>
+        <p:cTn id="1" dur="indefinite" restart="never" nodeType="tmRoot"/>
       </p:par>
     </p:tnLst>
   </p:timing>
@@ -4962,6 +5059,614 @@
       </p:grpSpPr>
       <p:sp>
         <p:nvSpPr>
+          <p:cNvPr id="2" name="CaixaDeTexto 1"/>
+          <p:cNvSpPr txBox="1"/>
+          <p:nvPr/>
+        </p:nvSpPr>
+        <p:spPr>
+          <a:xfrm>
+            <a:off x="755576" y="476672"/>
+            <a:ext cx="6624736" cy="584775"/>
+          </a:xfrm>
+          <a:prstGeom prst="rect">
+            <a:avLst/>
+          </a:prstGeom>
+          <a:noFill/>
+        </p:spPr>
+        <p:txBody>
+          <a:bodyPr wrap="square" rtlCol="0">
+            <a:spAutoFit/>
+          </a:bodyPr>
+          <a:lstStyle/>
+          <a:p>
+            <a:pPr marL="457200" indent="-457200">
+              <a:buFont typeface="Wingdings" panose="05000000000000000000" pitchFamily="2" charset="2"/>
+              <a:buChar char="Ø"/>
+            </a:pPr>
+            <a:r>
+              <a:rPr lang="pt-BR" sz="3200" dirty="0" smtClean="0">
+                <a:solidFill>
+                  <a:schemeClr val="bg1"/>
+                </a:solidFill>
+              </a:rPr>
+              <a:t>Versões gratuita e paga</a:t>
+            </a:r>
+            <a:endParaRPr lang="pt-BR" sz="3200" dirty="0">
+              <a:solidFill>
+                <a:schemeClr val="bg1"/>
+              </a:solidFill>
+            </a:endParaRPr>
+          </a:p>
+        </p:txBody>
+      </p:sp>
+      <p:pic>
+        <p:nvPicPr>
+          <p:cNvPr id="3" name="Imagem 2"/>
+          <p:cNvPicPr>
+            <a:picLocks noChangeAspect="1"/>
+          </p:cNvPicPr>
+          <p:nvPr/>
+        </p:nvPicPr>
+        <p:blipFill>
+          <a:blip r:embed="rId2">
+            <a:extLst>
+              <a:ext uri="{28A0092B-C50C-407E-A947-70E740481C1C}">
+                <a14:useLocalDpi xmlns:a14="http://schemas.microsoft.com/office/drawing/2010/main" val="0"/>
+              </a:ext>
+            </a:extLst>
+          </a:blip>
+          <a:stretch>
+            <a:fillRect/>
+          </a:stretch>
+        </p:blipFill>
+        <p:spPr>
+          <a:xfrm>
+            <a:off x="971600" y="1196752"/>
+            <a:ext cx="7056784" cy="4540416"/>
+          </a:xfrm>
+          <a:prstGeom prst="rect">
+            <a:avLst/>
+          </a:prstGeom>
+        </p:spPr>
+      </p:pic>
+    </p:spTree>
+    <p:extLst>
+      <p:ext uri="{BB962C8B-B14F-4D97-AF65-F5344CB8AC3E}">
+        <p14:creationId xmlns:p14="http://schemas.microsoft.com/office/powerpoint/2010/main" val="914801687"/>
+      </p:ext>
+    </p:extLst>
+  </p:cSld>
+  <p:clrMapOvr>
+    <a:masterClrMapping/>
+  </p:clrMapOvr>
+  <p:timing>
+    <p:tnLst>
+      <p:par>
+        <p:cTn id="1" dur="indefinite" restart="never" nodeType="tmRoot"/>
+      </p:par>
+    </p:tnLst>
+  </p:timing>
+</p:sld>
+</file>
+
+<file path=ppt/slides/slide14.xml><?xml version="1.0" encoding="utf-8"?>
+<p:sld xmlns:a="http://schemas.openxmlformats.org/drawingml/2006/main" xmlns:r="http://schemas.openxmlformats.org/officeDocument/2006/relationships" xmlns:p="http://schemas.openxmlformats.org/presentationml/2006/main">
+  <p:cSld>
+    <p:spTree>
+      <p:nvGrpSpPr>
+        <p:cNvPr id="1" name=""/>
+        <p:cNvGrpSpPr/>
+        <p:nvPr/>
+      </p:nvGrpSpPr>
+      <p:grpSpPr>
+        <a:xfrm>
+          <a:off x="0" y="0"/>
+          <a:ext cx="0" cy="0"/>
+          <a:chOff x="0" y="0"/>
+          <a:chExt cx="0" cy="0"/>
+        </a:xfrm>
+      </p:grpSpPr>
+      <p:pic>
+        <p:nvPicPr>
+          <p:cNvPr id="2" name="Imagem 1"/>
+          <p:cNvPicPr>
+            <a:picLocks noChangeAspect="1"/>
+          </p:cNvPicPr>
+          <p:nvPr/>
+        </p:nvPicPr>
+        <p:blipFill>
+          <a:blip r:embed="rId2">
+            <a:extLst>
+              <a:ext uri="{28A0092B-C50C-407E-A947-70E740481C1C}">
+                <a14:useLocalDpi xmlns:a14="http://schemas.microsoft.com/office/drawing/2010/main" val="0"/>
+              </a:ext>
+            </a:extLst>
+          </a:blip>
+          <a:stretch>
+            <a:fillRect/>
+          </a:stretch>
+        </p:blipFill>
+        <p:spPr>
+          <a:xfrm>
+            <a:off x="1312818" y="296486"/>
+            <a:ext cx="6363589" cy="2988498"/>
+          </a:xfrm>
+          <a:prstGeom prst="rect">
+            <a:avLst/>
+          </a:prstGeom>
+        </p:spPr>
+      </p:pic>
+      <p:pic>
+        <p:nvPicPr>
+          <p:cNvPr id="3" name="Imagem 2"/>
+          <p:cNvPicPr>
+            <a:picLocks noChangeAspect="1"/>
+          </p:cNvPicPr>
+          <p:nvPr/>
+        </p:nvPicPr>
+        <p:blipFill>
+          <a:blip r:embed="rId3">
+            <a:extLst>
+              <a:ext uri="{28A0092B-C50C-407E-A947-70E740481C1C}">
+                <a14:useLocalDpi xmlns:a14="http://schemas.microsoft.com/office/drawing/2010/main" val="0"/>
+              </a:ext>
+            </a:extLst>
+          </a:blip>
+          <a:stretch>
+            <a:fillRect/>
+          </a:stretch>
+        </p:blipFill>
+        <p:spPr>
+          <a:xfrm>
+            <a:off x="1312818" y="3284984"/>
+            <a:ext cx="6382641" cy="3456384"/>
+          </a:xfrm>
+          <a:prstGeom prst="rect">
+            <a:avLst/>
+          </a:prstGeom>
+        </p:spPr>
+      </p:pic>
+    </p:spTree>
+    <p:extLst>
+      <p:ext uri="{BB962C8B-B14F-4D97-AF65-F5344CB8AC3E}">
+        <p14:creationId xmlns:p14="http://schemas.microsoft.com/office/powerpoint/2010/main" val="1003783408"/>
+      </p:ext>
+    </p:extLst>
+  </p:cSld>
+  <p:clrMapOvr>
+    <a:masterClrMapping/>
+  </p:clrMapOvr>
+  <p:timing>
+    <p:tnLst>
+      <p:par>
+        <p:cTn id="1" dur="indefinite" restart="never" nodeType="tmRoot"/>
+      </p:par>
+    </p:tnLst>
+  </p:timing>
+</p:sld>
+</file>
+
+<file path=ppt/slides/slide15.xml><?xml version="1.0" encoding="utf-8"?>
+<p:sld xmlns:a="http://schemas.openxmlformats.org/drawingml/2006/main" xmlns:r="http://schemas.openxmlformats.org/officeDocument/2006/relationships" xmlns:p="http://schemas.openxmlformats.org/presentationml/2006/main">
+  <p:cSld>
+    <p:spTree>
+      <p:nvGrpSpPr>
+        <p:cNvPr id="1" name=""/>
+        <p:cNvGrpSpPr/>
+        <p:nvPr/>
+      </p:nvGrpSpPr>
+      <p:grpSpPr>
+        <a:xfrm>
+          <a:off x="0" y="0"/>
+          <a:ext cx="0" cy="0"/>
+          <a:chOff x="0" y="0"/>
+          <a:chExt cx="0" cy="0"/>
+        </a:xfrm>
+      </p:grpSpPr>
+      <p:sp>
+        <p:nvSpPr>
+          <p:cNvPr id="3" name="CaixaDeTexto 2"/>
+          <p:cNvSpPr txBox="1"/>
+          <p:nvPr/>
+        </p:nvSpPr>
+        <p:spPr>
+          <a:xfrm>
+            <a:off x="611560" y="513496"/>
+            <a:ext cx="6696744" cy="4401205"/>
+          </a:xfrm>
+          <a:prstGeom prst="rect">
+            <a:avLst/>
+          </a:prstGeom>
+          <a:noFill/>
+        </p:spPr>
+        <p:txBody>
+          <a:bodyPr wrap="square" rtlCol="0">
+            <a:spAutoFit/>
+          </a:bodyPr>
+          <a:lstStyle/>
+          <a:p>
+            <a:pPr marL="457200" indent="-457200">
+              <a:buFont typeface="Wingdings" panose="05000000000000000000" pitchFamily="2" charset="2"/>
+              <a:buChar char="Ø"/>
+            </a:pPr>
+            <a:r>
+              <a:rPr lang="pt-BR" sz="2800" dirty="0" smtClean="0">
+                <a:solidFill>
+                  <a:schemeClr val="bg1"/>
+                </a:solidFill>
+              </a:rPr>
+              <a:t>Windows, Mac, Linux, Web, Windows </a:t>
+            </a:r>
+            <a:r>
+              <a:rPr lang="pt-BR" sz="2800" dirty="0" err="1" smtClean="0">
+                <a:solidFill>
+                  <a:schemeClr val="bg1"/>
+                </a:solidFill>
+              </a:rPr>
+              <a:t>phone</a:t>
+            </a:r>
+            <a:r>
+              <a:rPr lang="pt-BR" sz="2800" dirty="0" smtClean="0">
+                <a:solidFill>
+                  <a:schemeClr val="bg1"/>
+                </a:solidFill>
+              </a:rPr>
+              <a:t>, </a:t>
+            </a:r>
+            <a:r>
+              <a:rPr lang="pt-BR" sz="2800" dirty="0" err="1" smtClean="0">
+                <a:solidFill>
+                  <a:schemeClr val="bg1"/>
+                </a:solidFill>
+              </a:rPr>
+              <a:t>Android</a:t>
+            </a:r>
+            <a:r>
+              <a:rPr lang="pt-BR" sz="2800" dirty="0" smtClean="0">
+                <a:solidFill>
+                  <a:schemeClr val="bg1"/>
+                </a:solidFill>
+              </a:rPr>
+              <a:t>, IOS, BlackBerry, PC, Xbox, Playstation e Wii U.</a:t>
+            </a:r>
+          </a:p>
+          <a:p>
+            <a:pPr marL="457200" indent="-457200">
+              <a:buFont typeface="Wingdings" panose="05000000000000000000" pitchFamily="2" charset="2"/>
+              <a:buChar char="Ø"/>
+            </a:pPr>
+            <a:r>
+              <a:rPr lang="pt-BR" sz="2800" dirty="0" smtClean="0">
+                <a:solidFill>
+                  <a:schemeClr val="bg1"/>
+                </a:solidFill>
+              </a:rPr>
+              <a:t>C#, </a:t>
+            </a:r>
+            <a:r>
+              <a:rPr lang="pt-BR" sz="2800" dirty="0" err="1" smtClean="0">
+                <a:solidFill>
+                  <a:schemeClr val="bg1"/>
+                </a:solidFill>
+              </a:rPr>
+              <a:t>JavaScript</a:t>
+            </a:r>
+            <a:r>
+              <a:rPr lang="pt-BR" sz="2800" dirty="0" smtClean="0">
+                <a:solidFill>
+                  <a:schemeClr val="bg1"/>
+                </a:solidFill>
+              </a:rPr>
+              <a:t> e </a:t>
+            </a:r>
+            <a:r>
+              <a:rPr lang="pt-BR" sz="2800" dirty="0" err="1" smtClean="0">
+                <a:solidFill>
+                  <a:schemeClr val="bg1"/>
+                </a:solidFill>
+              </a:rPr>
+              <a:t>Boo</a:t>
+            </a:r>
+            <a:endParaRPr lang="pt-BR" sz="2800" dirty="0" smtClean="0">
+              <a:solidFill>
+                <a:schemeClr val="bg1"/>
+              </a:solidFill>
+            </a:endParaRPr>
+          </a:p>
+          <a:p>
+            <a:pPr marL="457200" indent="-457200">
+              <a:buFont typeface="Wingdings" panose="05000000000000000000" pitchFamily="2" charset="2"/>
+              <a:buChar char="Ø"/>
+            </a:pPr>
+            <a:r>
+              <a:rPr lang="pt-BR" sz="2800" dirty="0" err="1" smtClean="0">
+                <a:solidFill>
+                  <a:schemeClr val="bg1"/>
+                </a:solidFill>
+              </a:rPr>
+              <a:t>Rovio</a:t>
+            </a:r>
+            <a:r>
+              <a:rPr lang="pt-BR" sz="2800" dirty="0" smtClean="0">
+                <a:solidFill>
+                  <a:schemeClr val="bg1"/>
+                </a:solidFill>
+              </a:rPr>
+              <a:t> – </a:t>
+            </a:r>
+            <a:r>
+              <a:rPr lang="pt-BR" sz="2800" dirty="0" err="1" smtClean="0">
+                <a:solidFill>
+                  <a:schemeClr val="bg1"/>
+                </a:solidFill>
+              </a:rPr>
+              <a:t>Bad</a:t>
+            </a:r>
+            <a:r>
+              <a:rPr lang="pt-BR" sz="2800" dirty="0" smtClean="0">
+                <a:solidFill>
+                  <a:schemeClr val="bg1"/>
+                </a:solidFill>
+              </a:rPr>
+              <a:t> </a:t>
+            </a:r>
+            <a:r>
+              <a:rPr lang="pt-BR" sz="2800" dirty="0" err="1" smtClean="0">
+                <a:solidFill>
+                  <a:schemeClr val="bg1"/>
+                </a:solidFill>
+              </a:rPr>
+              <a:t>Piggies</a:t>
+            </a:r>
+            <a:endParaRPr lang="pt-BR" sz="2800" dirty="0" smtClean="0">
+              <a:solidFill>
+                <a:schemeClr val="bg1"/>
+              </a:solidFill>
+            </a:endParaRPr>
+          </a:p>
+          <a:p>
+            <a:pPr marL="457200" indent="-457200">
+              <a:buFont typeface="Wingdings" panose="05000000000000000000" pitchFamily="2" charset="2"/>
+              <a:buChar char="Ø"/>
+            </a:pPr>
+            <a:r>
+              <a:rPr lang="pt-BR" sz="2800" dirty="0" err="1">
+                <a:solidFill>
+                  <a:schemeClr val="bg1"/>
+                </a:solidFill>
+              </a:rPr>
+              <a:t>Unity</a:t>
+            </a:r>
+            <a:r>
+              <a:rPr lang="pt-BR" sz="2800" dirty="0">
+                <a:solidFill>
+                  <a:schemeClr val="bg1"/>
+                </a:solidFill>
+              </a:rPr>
+              <a:t> Game </a:t>
+            </a:r>
+            <a:r>
+              <a:rPr lang="pt-BR" sz="2800" dirty="0" err="1">
+                <a:solidFill>
+                  <a:schemeClr val="bg1"/>
+                </a:solidFill>
+              </a:rPr>
+              <a:t>Development</a:t>
+            </a:r>
+            <a:r>
+              <a:rPr lang="pt-BR" sz="2800" dirty="0">
+                <a:solidFill>
+                  <a:schemeClr val="bg1"/>
+                </a:solidFill>
+              </a:rPr>
+              <a:t> </a:t>
+            </a:r>
+            <a:r>
+              <a:rPr lang="pt-BR" sz="2800" dirty="0" smtClean="0">
+                <a:solidFill>
+                  <a:schemeClr val="bg1"/>
+                </a:solidFill>
+              </a:rPr>
+              <a:t>Essentials </a:t>
+            </a:r>
+            <a:r>
+              <a:rPr lang="pt-BR" sz="2800" dirty="0" err="1" smtClean="0">
+                <a:solidFill>
+                  <a:schemeClr val="bg1"/>
+                </a:solidFill>
+              </a:rPr>
+              <a:t>Goldstone</a:t>
+            </a:r>
+            <a:r>
+              <a:rPr lang="pt-BR" sz="2800" dirty="0" smtClean="0">
+                <a:solidFill>
+                  <a:schemeClr val="bg1"/>
+                </a:solidFill>
+              </a:rPr>
+              <a:t>, Will</a:t>
+            </a:r>
+          </a:p>
+          <a:p>
+            <a:pPr marL="457200" indent="-457200">
+              <a:buFont typeface="Wingdings" panose="05000000000000000000" pitchFamily="2" charset="2"/>
+              <a:buChar char="Ø"/>
+            </a:pPr>
+            <a:r>
+              <a:rPr lang="pt-BR" sz="2800" dirty="0" smtClean="0">
+                <a:solidFill>
+                  <a:schemeClr val="bg1"/>
+                </a:solidFill>
+              </a:rPr>
+              <a:t>Site oficial do </a:t>
+            </a:r>
+            <a:r>
+              <a:rPr lang="pt-BR" sz="2800" dirty="0" err="1" smtClean="0">
+                <a:solidFill>
+                  <a:schemeClr val="bg1"/>
+                </a:solidFill>
+              </a:rPr>
+              <a:t>Unity</a:t>
+            </a:r>
+            <a:endParaRPr lang="pt-BR" sz="2800" dirty="0" smtClean="0">
+              <a:solidFill>
+                <a:schemeClr val="bg1"/>
+              </a:solidFill>
+            </a:endParaRPr>
+          </a:p>
+          <a:p>
+            <a:pPr marL="457200" indent="-457200">
+              <a:buFont typeface="Wingdings" panose="05000000000000000000" pitchFamily="2" charset="2"/>
+              <a:buChar char="Ø"/>
+            </a:pPr>
+            <a:r>
+              <a:rPr lang="pt-BR" sz="2800" dirty="0">
+                <a:hlinkClick r:id="rId2"/>
+              </a:rPr>
+              <a:t>http://</a:t>
+            </a:r>
+            <a:r>
+              <a:rPr lang="pt-BR" sz="2800" dirty="0" smtClean="0">
+                <a:hlinkClick r:id="rId2"/>
+              </a:rPr>
+              <a:t>unity3d.com/learn</a:t>
+            </a:r>
+            <a:endParaRPr lang="pt-BR" sz="2800" dirty="0" smtClean="0"/>
+          </a:p>
+          <a:p>
+            <a:pPr marL="457200" indent="-457200">
+              <a:buFont typeface="Wingdings" panose="05000000000000000000" pitchFamily="2" charset="2"/>
+              <a:buChar char="Ø"/>
+            </a:pPr>
+            <a:r>
+              <a:rPr lang="pt-BR" sz="2800" dirty="0" smtClean="0">
+                <a:solidFill>
+                  <a:schemeClr val="bg1"/>
+                </a:solidFill>
+              </a:rPr>
+              <a:t>Materiais de internet</a:t>
+            </a:r>
+            <a:endParaRPr lang="pt-BR" sz="2800" dirty="0">
+              <a:solidFill>
+                <a:schemeClr val="bg1"/>
+              </a:solidFill>
+            </a:endParaRPr>
+          </a:p>
+        </p:txBody>
+      </p:sp>
+    </p:spTree>
+    <p:extLst>
+      <p:ext uri="{BB962C8B-B14F-4D97-AF65-F5344CB8AC3E}">
+        <p14:creationId xmlns:p14="http://schemas.microsoft.com/office/powerpoint/2010/main" val="3763309755"/>
+      </p:ext>
+    </p:extLst>
+  </p:cSld>
+  <p:clrMapOvr>
+    <a:masterClrMapping/>
+  </p:clrMapOvr>
+</p:sld>
+</file>
+
+<file path=ppt/slides/slide16.xml><?xml version="1.0" encoding="utf-8"?>
+<p:sld xmlns:a="http://schemas.openxmlformats.org/drawingml/2006/main" xmlns:r="http://schemas.openxmlformats.org/officeDocument/2006/relationships" xmlns:p="http://schemas.openxmlformats.org/presentationml/2006/main">
+  <p:cSld>
+    <p:spTree>
+      <p:nvGrpSpPr>
+        <p:cNvPr id="1" name=""/>
+        <p:cNvGrpSpPr/>
+        <p:nvPr/>
+      </p:nvGrpSpPr>
+      <p:grpSpPr>
+        <a:xfrm>
+          <a:off x="0" y="0"/>
+          <a:ext cx="0" cy="0"/>
+          <a:chOff x="0" y="0"/>
+          <a:chExt cx="0" cy="0"/>
+        </a:xfrm>
+      </p:grpSpPr>
+      <p:sp>
+        <p:nvSpPr>
+          <p:cNvPr id="4" name="Título 3"/>
+          <p:cNvSpPr>
+            <a:spLocks noGrp="1"/>
+          </p:cNvSpPr>
+          <p:nvPr>
+            <p:ph type="title"/>
+          </p:nvPr>
+        </p:nvSpPr>
+        <p:spPr/>
+        <p:txBody>
+          <a:bodyPr/>
+          <a:lstStyle/>
+          <a:p>
+            <a:r>
+              <a:rPr lang="pt-BR" dirty="0" smtClean="0">
+                <a:solidFill>
+                  <a:schemeClr val="bg1"/>
+                </a:solidFill>
+              </a:rPr>
+              <a:t>cronograma</a:t>
+            </a:r>
+            <a:endParaRPr lang="pt-BR" dirty="0">
+              <a:solidFill>
+                <a:schemeClr val="bg1"/>
+              </a:solidFill>
+            </a:endParaRPr>
+          </a:p>
+        </p:txBody>
+      </p:sp>
+      <p:sp>
+        <p:nvSpPr>
+          <p:cNvPr id="5" name="Espaço Reservado para Texto 4"/>
+          <p:cNvSpPr>
+            <a:spLocks noGrp="1"/>
+          </p:cNvSpPr>
+          <p:nvPr>
+            <p:ph type="body" idx="1"/>
+          </p:nvPr>
+        </p:nvSpPr>
+        <p:spPr/>
+        <p:txBody>
+          <a:bodyPr/>
+          <a:lstStyle/>
+          <a:p>
+            <a:endParaRPr lang="pt-BR"/>
+          </a:p>
+        </p:txBody>
+      </p:sp>
+    </p:spTree>
+  </p:cSld>
+  <p:clrMapOvr>
+    <a:masterClrMapping/>
+  </p:clrMapOvr>
+  <p:timing>
+    <p:tnLst>
+      <p:par>
+        <p:cTn id="1" dur="indefinite" restart="never" nodeType="tmRoot"/>
+      </p:par>
+    </p:tnLst>
+  </p:timing>
+</p:sld>
+</file>
+
+<file path=ppt/slides/slide17.xml><?xml version="1.0" encoding="utf-8"?>
+<p:sld xmlns:a="http://schemas.openxmlformats.org/drawingml/2006/main" xmlns:r="http://schemas.openxmlformats.org/officeDocument/2006/relationships" xmlns:p="http://schemas.openxmlformats.org/presentationml/2006/main">
+  <p:cSld>
+    <p:spTree>
+      <p:nvGrpSpPr>
+        <p:cNvPr id="1" name=""/>
+        <p:cNvGrpSpPr/>
+        <p:nvPr/>
+      </p:nvGrpSpPr>
+      <p:grpSpPr>
+        <a:xfrm>
+          <a:off x="0" y="0"/>
+          <a:ext cx="0" cy="0"/>
+          <a:chOff x="0" y="0"/>
+          <a:chExt cx="0" cy="0"/>
+        </a:xfrm>
+      </p:grpSpPr>
+      <p:sp>
+        <p:nvSpPr>
           <p:cNvPr id="4" name="Title 3"/>
           <p:cNvSpPr>
             <a:spLocks noGrp="1"/>
@@ -5035,10 +5740,10 @@
                     <a:lstStyle/>
                     <a:p>
                       <a:r>
-                        <a:rPr lang="pt-BR" sz="3600" noProof="0" smtClean="0"/>
+                        <a:rPr lang="pt-BR" sz="3600" noProof="0" dirty="0" smtClean="0"/>
                         <a:t>Data</a:t>
                       </a:r>
-                      <a:endParaRPr lang="pt-BR" sz="3600" noProof="0"/>
+                      <a:endParaRPr lang="pt-BR" sz="3600" noProof="0" dirty="0"/>
                     </a:p>
                   </a:txBody>
                   <a:tcPr/>
@@ -5064,7 +5769,7 @@
                     <a:bodyPr/>
                     <a:lstStyle/>
                     <a:p>
-                      <a:endParaRPr lang="pt-BR" sz="3600" noProof="0"/>
+                      <a:endParaRPr lang="pt-BR" sz="3600" noProof="0" dirty="0"/>
                     </a:p>
                   </a:txBody>
                   <a:tcPr/>
@@ -5076,11 +5781,7 @@
                     <a:p>
                       <a:r>
                         <a:rPr lang="pt-BR" sz="3600" noProof="0" dirty="0" smtClean="0"/>
-                        <a:t>Pr</a:t>
-                      </a:r>
-                      <a:r>
-                        <a:rPr lang="pt-BR" sz="3600" noProof="0" dirty="0" smtClean="0"/>
-                        <a:t>é-produção</a:t>
+                        <a:t>Pré-produção</a:t>
                       </a:r>
                       <a:endParaRPr lang="pt-BR" sz="3600" noProof="0" dirty="0"/>
                     </a:p>
@@ -5236,10 +5937,17 @@
   <p:clrMapOvr>
     <a:masterClrMapping/>
   </p:clrMapOvr>
+  <p:timing>
+    <p:tnLst>
+      <p:par>
+        <p:cTn id="1" dur="indefinite" restart="never" nodeType="tmRoot"/>
+      </p:par>
+    </p:tnLst>
+  </p:timing>
 </p:sld>
 </file>
 
-<file path=ppt/slides/slide14.xml><?xml version="1.0" encoding="utf-8"?>
+<file path=ppt/slides/slide18.xml><?xml version="1.0" encoding="utf-8"?>
 <p:sld xmlns:a="http://schemas.openxmlformats.org/drawingml/2006/main" xmlns:r="http://schemas.openxmlformats.org/officeDocument/2006/relationships" xmlns:p="http://schemas.openxmlformats.org/presentationml/2006/main">
   <p:cSld>
     <p:spTree>
@@ -5354,11 +6062,7 @@
                     <a:p>
                       <a:r>
                         <a:rPr lang="pt-BR" sz="3600" noProof="0" dirty="0" smtClean="0"/>
-                        <a:t>Cap</a:t>
-                      </a:r>
-                      <a:r>
-                        <a:rPr lang="pt-BR" sz="3600" noProof="0" dirty="0" smtClean="0"/>
-                        <a:t>ítulo</a:t>
+                        <a:t>Capítulo</a:t>
                       </a:r>
                       <a:endParaRPr lang="pt-BR" sz="3600" noProof="0" dirty="0"/>
                     </a:p>
@@ -5414,11 +6118,7 @@
                     <a:p>
                       <a:r>
                         <a:rPr lang="pt-BR" sz="3600" noProof="0" dirty="0" smtClean="0"/>
-                        <a:t>1 - Introdu</a:t>
-                      </a:r>
-                      <a:r>
-                        <a:rPr lang="pt-BR" sz="3600" noProof="0" dirty="0" smtClean="0"/>
-                        <a:t>ção</a:t>
+                        <a:t>1 - Introdução</a:t>
                       </a:r>
                     </a:p>
                   </a:txBody>
@@ -5517,7 +6217,7 @@
 </p:sld>
 </file>
 
-<file path=ppt/slides/slide15.xml><?xml version="1.0" encoding="utf-8"?>
+<file path=ppt/slides/slide19.xml><?xml version="1.0" encoding="utf-8"?>
 <p:sld xmlns:a="http://schemas.openxmlformats.org/drawingml/2006/main" xmlns:r="http://schemas.openxmlformats.org/officeDocument/2006/relationships" xmlns:p="http://schemas.openxmlformats.org/presentationml/2006/main">
   <p:cSld>
     <p:spTree>
@@ -5739,7 +6439,7 @@
   <p:timing>
     <p:tnLst>
       <p:par>
-        <p:cTn xmlns:p14="http://schemas.microsoft.com/office/powerpoint/2010/main" id="1" dur="indefinite" restart="never" nodeType="tmRoot"/>
+        <p:cTn id="1" dur="indefinite" restart="never" nodeType="tmRoot"/>
       </p:par>
     </p:tnLst>
   </p:timing>
@@ -5784,15 +6484,7 @@
                   <a:srgbClr val="FFFFFF"/>
                 </a:solidFill>
               </a:rPr>
-              <a:t>Sum</a:t>
-            </a:r>
-            <a:r>
-              <a:rPr lang="en-US" dirty="0" err="1" smtClean="0">
-                <a:solidFill>
-                  <a:srgbClr val="FFFFFF"/>
-                </a:solidFill>
-              </a:rPr>
-              <a:t>ário</a:t>
+              <a:t>Sumário</a:t>
             </a:r>
             <a:endParaRPr lang="en-US" dirty="0">
               <a:solidFill>
@@ -5823,49 +6515,17 @@
                   <a:srgbClr val="FFFFFF"/>
                 </a:solidFill>
               </a:rPr>
-              <a:t>Introdu</a:t>
-            </a:r>
+              <a:t>Introdução</a:t>
+            </a:r>
+          </a:p>
+          <a:p>
             <a:r>
               <a:rPr lang="pt-BR" dirty="0" smtClean="0">
                 <a:solidFill>
                   <a:srgbClr val="FFFFFF"/>
                 </a:solidFill>
               </a:rPr>
-              <a:t>ção</a:t>
-            </a:r>
-          </a:p>
-          <a:p>
-            <a:r>
-              <a:rPr lang="pt-BR" dirty="0" smtClean="0">
-                <a:solidFill>
-                  <a:srgbClr val="FFFFFF"/>
-                </a:solidFill>
-              </a:rPr>
-              <a:t>Fundamenta</a:t>
-            </a:r>
-            <a:r>
-              <a:rPr lang="pt-BR" dirty="0" smtClean="0">
-                <a:solidFill>
-                  <a:srgbClr val="FFFFFF"/>
-                </a:solidFill>
-              </a:rPr>
-              <a:t>ção </a:t>
-            </a:r>
-            <a:r>
-              <a:rPr lang="pt-BR" dirty="0" smtClean="0">
-                <a:solidFill>
-                  <a:srgbClr val="FFFFFF"/>
-                </a:solidFill>
-              </a:rPr>
-              <a:t>te</a:t>
-            </a:r>
-            <a:r>
-              <a:rPr lang="pt-BR" dirty="0" smtClean="0">
-                <a:solidFill>
-                  <a:srgbClr val="FFFFFF"/>
-                </a:solidFill>
-              </a:rPr>
-              <a:t>órica</a:t>
+              <a:t>Fundamentação teórica</a:t>
             </a:r>
           </a:p>
           <a:p>
@@ -5936,23 +6596,7 @@
                   <a:srgbClr val="FFFFFF"/>
                 </a:solidFill>
               </a:rPr>
-              <a:t>Introdu</a:t>
-            </a:r>
-            <a:r>
-              <a:rPr lang="en-US" dirty="0" err="1" smtClean="0">
-                <a:solidFill>
-                  <a:srgbClr val="FFFFFF"/>
-                </a:solidFill>
-              </a:rPr>
-              <a:t>çã</a:t>
-            </a:r>
-            <a:r>
-              <a:rPr lang="en-US" dirty="0" err="1" smtClean="0">
-                <a:solidFill>
-                  <a:srgbClr val="FFFFFF"/>
-                </a:solidFill>
-              </a:rPr>
-              <a:t>o</a:t>
+              <a:t>Introdução</a:t>
             </a:r>
             <a:endParaRPr lang="en-US" dirty="0">
               <a:solidFill>
@@ -6067,15 +6711,7 @@
                   <a:schemeClr val="bg1"/>
                 </a:solidFill>
               </a:rPr>
-              <a:t>Empresa </a:t>
-            </a:r>
-            <a:r>
-              <a:rPr lang="pt-BR" dirty="0" smtClean="0">
-                <a:solidFill>
-                  <a:schemeClr val="bg1"/>
-                </a:solidFill>
-              </a:rPr>
-              <a:t>de desenvolvimento de jogos</a:t>
+              <a:t>Empresa de desenvolvimento de jogos</a:t>
             </a:r>
           </a:p>
           <a:p>
@@ -6295,6 +6931,36 @@
               </a:rPr>
               <a:t>Geral</a:t>
             </a:r>
+          </a:p>
+          <a:p>
+            <a:pPr lvl="1">
+              <a:buFont typeface="Wingdings" panose="05000000000000000000" pitchFamily="2" charset="2"/>
+              <a:buChar char="Ø"/>
+            </a:pPr>
+            <a:r>
+              <a:rPr lang="pt-BR" dirty="0" smtClean="0">
+                <a:solidFill>
+                  <a:srgbClr val="FFFFFF"/>
+                </a:solidFill>
+              </a:rPr>
+              <a:t>Desenvolver </a:t>
+            </a:r>
+            <a:r>
+              <a:rPr lang="pt-BR" dirty="0">
+                <a:solidFill>
+                  <a:srgbClr val="FFFFFF"/>
+                </a:solidFill>
+              </a:rPr>
+              <a:t>um jogo usando o </a:t>
+            </a:r>
+            <a:r>
+              <a:rPr lang="pt-BR" dirty="0" err="1" smtClean="0">
+                <a:solidFill>
+                  <a:srgbClr val="FFFFFF"/>
+                </a:solidFill>
+              </a:rPr>
+              <a:t>Unity</a:t>
+            </a:r>
             <a:endParaRPr lang="pt-BR" dirty="0" smtClean="0">
               <a:solidFill>
                 <a:srgbClr val="FFFFFF"/>
@@ -6302,6 +6968,25 @@
             </a:endParaRPr>
           </a:p>
           <a:p>
+            <a:pPr>
+              <a:buFont typeface="Wingdings" panose="05000000000000000000" pitchFamily="2" charset="2"/>
+              <a:buChar char="Ø"/>
+            </a:pPr>
+            <a:r>
+              <a:rPr lang="pt-BR" dirty="0" smtClean="0">
+                <a:solidFill>
+                  <a:srgbClr val="FFFFFF"/>
+                </a:solidFill>
+              </a:rPr>
+              <a:t>Específicos</a:t>
+            </a:r>
+            <a:endParaRPr lang="pt-BR" dirty="0">
+              <a:solidFill>
+                <a:srgbClr val="FFFFFF"/>
+              </a:solidFill>
+            </a:endParaRPr>
+          </a:p>
+          <a:p>
             <a:pPr lvl="1">
               <a:buFont typeface="Wingdings" panose="05000000000000000000" pitchFamily="2" charset="2"/>
               <a:buChar char="Ø"/>
@@ -6312,15 +6997,29 @@
                   <a:srgbClr val="FFFFFF"/>
                 </a:solidFill>
               </a:rPr>
-              <a:t>Desenvolver </a:t>
-            </a:r>
-            <a:r>
-              <a:rPr lang="pt-BR" dirty="0">
+              <a:t>Mono usuário</a:t>
+            </a:r>
+          </a:p>
+          <a:p>
+            <a:pPr lvl="1">
+              <a:buFont typeface="Wingdings" panose="05000000000000000000" pitchFamily="2" charset="2"/>
+              <a:buChar char="Ø"/>
+            </a:pPr>
+            <a:r>
+              <a:rPr lang="pt-BR" dirty="0" smtClean="0">
                 <a:solidFill>
                   <a:srgbClr val="FFFFFF"/>
                 </a:solidFill>
               </a:rPr>
-              <a:t>um jogo usando o </a:t>
+              <a:t>Mobile </a:t>
+            </a:r>
+            <a:r>
+              <a:rPr lang="pt-BR" dirty="0" smtClean="0">
+                <a:solidFill>
+                  <a:srgbClr val="FFFFFF"/>
+                </a:solidFill>
+              </a:rPr>
+              <a:t>(</a:t>
             </a:r>
             <a:r>
               <a:rPr lang="pt-BR" dirty="0" err="1" smtClean="0">
@@ -6328,7 +7027,15 @@
                   <a:srgbClr val="FFFFFF"/>
                 </a:solidFill>
               </a:rPr>
-              <a:t>Unity</a:t>
+              <a:t>Android</a:t>
+            </a:r>
+            <a:r>
+              <a:rPr lang="pt-BR" dirty="0" smtClean="0">
+                <a:solidFill>
+                  <a:srgbClr val="FFFFFF"/>
+                </a:solidFill>
+              </a:rPr>
+              <a:t>)</a:t>
             </a:r>
             <a:endParaRPr lang="pt-BR" dirty="0" smtClean="0">
               <a:solidFill>
@@ -6337,25 +7044,6 @@
             </a:endParaRPr>
           </a:p>
           <a:p>
-            <a:pPr>
-              <a:buFont typeface="Wingdings" panose="05000000000000000000" pitchFamily="2" charset="2"/>
-              <a:buChar char="Ø"/>
-            </a:pPr>
-            <a:r>
-              <a:rPr lang="pt-BR" dirty="0" smtClean="0">
-                <a:solidFill>
-                  <a:srgbClr val="FFFFFF"/>
-                </a:solidFill>
-              </a:rPr>
-              <a:t>Específicos</a:t>
-            </a:r>
-            <a:endParaRPr lang="pt-BR" dirty="0">
-              <a:solidFill>
-                <a:srgbClr val="FFFFFF"/>
-              </a:solidFill>
-            </a:endParaRPr>
-          </a:p>
-          <a:p>
             <a:pPr lvl="1">
               <a:buFont typeface="Wingdings" panose="05000000000000000000" pitchFamily="2" charset="2"/>
               <a:buChar char="Ø"/>
@@ -6366,63 +7054,27 @@
                   <a:srgbClr val="FFFFFF"/>
                 </a:solidFill>
               </a:rPr>
-              <a:t>Mono usu</a:t>
-            </a:r>
-            <a:r>
-              <a:rPr lang="pt-BR" dirty="0" smtClean="0">
-                <a:solidFill>
-                  <a:srgbClr val="FFFFFF"/>
-                </a:solidFill>
-              </a:rPr>
-              <a:t>ário</a:t>
-            </a:r>
-          </a:p>
-          <a:p>
-            <a:pPr lvl="1">
-              <a:buFont typeface="Wingdings" panose="05000000000000000000" pitchFamily="2" charset="2"/>
-              <a:buChar char="Ø"/>
-            </a:pPr>
-            <a:r>
-              <a:rPr lang="pt-BR" dirty="0" smtClean="0">
-                <a:solidFill>
-                  <a:srgbClr val="FFFFFF"/>
-                </a:solidFill>
-              </a:rPr>
-              <a:t>Mobile (qual plataforma?)</a:t>
-            </a:r>
-          </a:p>
-          <a:p>
-            <a:pPr lvl="1">
-              <a:buFont typeface="Wingdings" panose="05000000000000000000" pitchFamily="2" charset="2"/>
-              <a:buChar char="Ø"/>
-            </a:pPr>
-            <a:r>
-              <a:rPr lang="pt-BR" dirty="0" smtClean="0">
-                <a:solidFill>
-                  <a:srgbClr val="FFFFFF"/>
-                </a:solidFill>
-              </a:rPr>
-              <a:t>Adventure baseado em tabuleiro</a:t>
-            </a:r>
-          </a:p>
-          <a:p>
-            <a:pPr lvl="1">
-              <a:buFont typeface="Wingdings" panose="05000000000000000000" pitchFamily="2" charset="2"/>
-              <a:buChar char="Ø"/>
-            </a:pPr>
-            <a:r>
-              <a:rPr lang="pt-BR" dirty="0" smtClean="0">
-                <a:solidFill>
-                  <a:srgbClr val="FFFFFF"/>
-                </a:solidFill>
-              </a:rPr>
-              <a:t>Mais algo sobre qual o tipo de jogo?</a:t>
+              <a:t>Adventure/Puzzle</a:t>
             </a:r>
             <a:endParaRPr lang="pt-BR" dirty="0" smtClean="0">
               <a:solidFill>
                 <a:srgbClr val="FFFFFF"/>
               </a:solidFill>
             </a:endParaRPr>
+          </a:p>
+          <a:p>
+            <a:pPr lvl="1">
+              <a:buFont typeface="Wingdings" panose="05000000000000000000" pitchFamily="2" charset="2"/>
+              <a:buChar char="Ø"/>
+            </a:pPr>
+            <a:r>
+              <a:rPr lang="pt-BR" dirty="0" smtClean="0">
+                <a:solidFill>
+                  <a:srgbClr val="FFFFFF"/>
+                </a:solidFill>
+              </a:rPr>
+              <a:t>Mais algo sobre qual o tipo de jogo?</a:t>
+            </a:r>
           </a:p>
         </p:txBody>
       </p:sp>
@@ -6528,15 +7180,7 @@
                   <a:schemeClr val="bg1"/>
                 </a:solidFill>
               </a:rPr>
-              <a:t>V</a:t>
-            </a:r>
-            <a:r>
-              <a:rPr lang="pt-BR" dirty="0" smtClean="0">
-                <a:solidFill>
-                  <a:schemeClr val="bg1"/>
-                </a:solidFill>
-              </a:rPr>
-              <a:t>árias plataformas</a:t>
+              <a:t>Várias plataformas</a:t>
             </a:r>
             <a:endParaRPr lang="pt-BR" dirty="0">
               <a:solidFill>
@@ -6660,15 +7304,7 @@
                   <a:schemeClr val="bg1"/>
                 </a:solidFill>
               </a:rPr>
-              <a:t>Vers</a:t>
-            </a:r>
-            <a:r>
-              <a:rPr lang="pt-BR" dirty="0" smtClean="0">
-                <a:solidFill>
-                  <a:schemeClr val="bg1"/>
-                </a:solidFill>
-              </a:rPr>
-              <a:t>ão gratuita e paga</a:t>
+              <a:t>Versão gratuita e paga</a:t>
             </a:r>
           </a:p>
           <a:p>
@@ -6682,53 +7318,67 @@
                   <a:schemeClr val="bg1"/>
                 </a:solidFill>
               </a:rPr>
-              <a:t>Por que monousuário?</a:t>
-            </a:r>
+              <a:t>M</a:t>
+            </a:r>
+            <a:r>
+              <a:rPr lang="pt-BR" dirty="0" smtClean="0">
+                <a:solidFill>
+                  <a:schemeClr val="bg1"/>
+                </a:solidFill>
+              </a:rPr>
+              <a:t>onousuário</a:t>
+            </a:r>
+          </a:p>
+          <a:p>
+            <a:pPr lvl="1">
+              <a:buFont typeface="Wingdings" panose="05000000000000000000" pitchFamily="2" charset="2"/>
+              <a:buChar char="Ø"/>
+            </a:pPr>
+            <a:r>
+              <a:rPr lang="pt-BR" dirty="0" smtClean="0">
+                <a:solidFill>
+                  <a:schemeClr val="bg1"/>
+                </a:solidFill>
+              </a:rPr>
+              <a:t>Jogadores casuais e ativos</a:t>
+            </a:r>
+          </a:p>
+          <a:p>
+            <a:pPr lvl="1">
+              <a:buFont typeface="Wingdings" panose="05000000000000000000" pitchFamily="2" charset="2"/>
+              <a:buChar char="Ø"/>
+            </a:pPr>
+            <a:r>
+              <a:rPr lang="pt-BR" dirty="0" smtClean="0">
+                <a:solidFill>
+                  <a:schemeClr val="bg1"/>
+                </a:solidFill>
+              </a:rPr>
+              <a:t>Tempo ócio</a:t>
+            </a:r>
+            <a:endParaRPr lang="pt-BR" dirty="0" smtClean="0">
+              <a:solidFill>
+                <a:schemeClr val="bg1"/>
+              </a:solidFill>
+            </a:endParaRPr>
           </a:p>
           <a:p>
             <a:pPr>
               <a:buFont typeface="Wingdings" panose="05000000000000000000" pitchFamily="2" charset="2"/>
               <a:buChar char="Ø"/>
             </a:pPr>
-            <a:r>
-              <a:rPr lang="pt-BR" dirty="0" smtClean="0">
-                <a:solidFill>
-                  <a:schemeClr val="bg1"/>
-                </a:solidFill>
-              </a:rPr>
-              <a:t>Por que mobile? Qual plataforma?</a:t>
-            </a:r>
+            <a:endParaRPr lang="pt-BR" dirty="0">
+              <a:solidFill>
+                <a:schemeClr val="bg1"/>
+              </a:solidFill>
+            </a:endParaRPr>
           </a:p>
           <a:p>
             <a:pPr>
               <a:buFont typeface="Wingdings" panose="05000000000000000000" pitchFamily="2" charset="2"/>
               <a:buChar char="Ø"/>
             </a:pPr>
-            <a:r>
-              <a:rPr lang="pt-BR" dirty="0" smtClean="0">
-                <a:solidFill>
-                  <a:schemeClr val="bg1"/>
-                </a:solidFill>
-              </a:rPr>
-              <a:t>Por que </a:t>
-            </a:r>
-            <a:r>
-              <a:rPr lang="pt-BR" dirty="0" err="1" smtClean="0">
-                <a:solidFill>
-                  <a:schemeClr val="bg1"/>
-                </a:solidFill>
-              </a:rPr>
-              <a:t>adventure</a:t>
-            </a:r>
-            <a:r>
-              <a:rPr lang="pt-BR" dirty="0" smtClean="0">
-                <a:solidFill>
-                  <a:schemeClr val="bg1"/>
-                </a:solidFill>
-              </a:rPr>
-              <a:t>/tabuleiro?</a:t>
-            </a:r>
-            <a:endParaRPr lang="pt-BR" dirty="0">
+            <a:endParaRPr lang="pt-BR" dirty="0" smtClean="0">
               <a:solidFill>
                 <a:schemeClr val="bg1"/>
               </a:solidFill>
@@ -6774,154 +7424,139 @@
       </p:grpSpPr>
       <p:sp>
         <p:nvSpPr>
-          <p:cNvPr id="2" name="Título 1"/>
-          <p:cNvSpPr>
-            <a:spLocks noGrp="1"/>
-          </p:cNvSpPr>
-          <p:nvPr>
-            <p:ph type="title"/>
-          </p:nvPr>
-        </p:nvSpPr>
-        <p:spPr/>
-        <p:txBody>
-          <a:bodyPr/>
+          <p:cNvPr id="2" name="CaixaDeTexto 1"/>
+          <p:cNvSpPr txBox="1"/>
+          <p:nvPr/>
+        </p:nvSpPr>
+        <p:spPr>
+          <a:xfrm>
+            <a:off x="395536" y="815291"/>
+            <a:ext cx="8064896" cy="3139321"/>
+          </a:xfrm>
+          <a:prstGeom prst="rect">
+            <a:avLst/>
+          </a:prstGeom>
+          <a:noFill/>
+        </p:spPr>
+        <p:txBody>
+          <a:bodyPr wrap="square" rtlCol="0">
+            <a:spAutoFit/>
+          </a:bodyPr>
           <a:lstStyle/>
           <a:p>
-            <a:r>
-              <a:rPr lang="pt-BR" dirty="0" smtClean="0">
-                <a:solidFill>
-                  <a:schemeClr val="bg1"/>
-                </a:solidFill>
-              </a:rPr>
-              <a:t>Metodologia</a:t>
-            </a:r>
-            <a:endParaRPr lang="pt-BR" dirty="0">
+            <a:pPr>
+              <a:buFont typeface="Wingdings" panose="05000000000000000000" pitchFamily="2" charset="2"/>
+              <a:buChar char="Ø"/>
+            </a:pPr>
+            <a:r>
+              <a:rPr lang="pt-BR" sz="3200" dirty="0" smtClean="0">
+                <a:solidFill>
+                  <a:schemeClr val="bg1"/>
+                </a:solidFill>
+              </a:rPr>
+              <a:t>Mobile (</a:t>
+            </a:r>
+            <a:r>
+              <a:rPr lang="pt-BR" sz="3200" dirty="0" err="1" smtClean="0">
+                <a:solidFill>
+                  <a:schemeClr val="bg1"/>
+                </a:solidFill>
+              </a:rPr>
+              <a:t>Android</a:t>
+            </a:r>
+            <a:r>
+              <a:rPr lang="pt-BR" sz="3200" dirty="0" smtClean="0">
+                <a:solidFill>
+                  <a:schemeClr val="bg1"/>
+                </a:solidFill>
+              </a:rPr>
+              <a:t>)</a:t>
+            </a:r>
+          </a:p>
+          <a:p>
+            <a:pPr lvl="1">
+              <a:buFont typeface="Wingdings" panose="05000000000000000000" pitchFamily="2" charset="2"/>
+              <a:buChar char="Ø"/>
+            </a:pPr>
+            <a:r>
+              <a:rPr lang="pt-BR" sz="2800" dirty="0" smtClean="0">
+                <a:solidFill>
+                  <a:schemeClr val="bg1"/>
+                </a:solidFill>
+              </a:rPr>
+              <a:t>Popularidade</a:t>
+            </a:r>
+          </a:p>
+          <a:p>
+            <a:pPr lvl="1">
+              <a:buFont typeface="Wingdings" panose="05000000000000000000" pitchFamily="2" charset="2"/>
+              <a:buChar char="Ø"/>
+            </a:pPr>
+            <a:r>
+              <a:rPr lang="pt-BR" sz="2800" dirty="0" smtClean="0">
+                <a:solidFill>
+                  <a:schemeClr val="bg1"/>
+                </a:solidFill>
+              </a:rPr>
+              <a:t>Aparelhos sofisticados</a:t>
+            </a:r>
+          </a:p>
+          <a:p>
+            <a:pPr lvl="1">
+              <a:buFont typeface="Wingdings" panose="05000000000000000000" pitchFamily="2" charset="2"/>
+              <a:buChar char="Ø"/>
+            </a:pPr>
+            <a:r>
+              <a:rPr lang="pt-BR" sz="2800" dirty="0" smtClean="0">
+                <a:solidFill>
+                  <a:schemeClr val="bg1"/>
+                </a:solidFill>
+              </a:rPr>
+              <a:t>Utilizados em diversos contextos</a:t>
+            </a:r>
+          </a:p>
+          <a:p>
+            <a:pPr>
+              <a:buFont typeface="Wingdings" panose="05000000000000000000" pitchFamily="2" charset="2"/>
+              <a:buChar char="Ø"/>
+            </a:pPr>
+            <a:r>
+              <a:rPr lang="pt-BR" sz="3200" dirty="0" smtClean="0">
+                <a:solidFill>
+                  <a:schemeClr val="bg1"/>
+                </a:solidFill>
+              </a:rPr>
+              <a:t>Adventure/Puzzle</a:t>
+            </a:r>
+          </a:p>
+          <a:p>
+            <a:pPr lvl="1">
+              <a:buFont typeface="Wingdings" panose="05000000000000000000" pitchFamily="2" charset="2"/>
+              <a:buChar char="Ø"/>
+            </a:pPr>
+            <a:r>
+              <a:rPr lang="pt-BR" sz="2800" dirty="0" smtClean="0">
+                <a:solidFill>
+                  <a:schemeClr val="bg1"/>
+                </a:solidFill>
+              </a:rPr>
+              <a:t>Bom enredo, diversão e desafiador </a:t>
+            </a:r>
+            <a:endParaRPr lang="pt-BR" sz="2800" dirty="0">
               <a:solidFill>
                 <a:schemeClr val="bg1"/>
               </a:solidFill>
             </a:endParaRPr>
           </a:p>
-        </p:txBody>
-      </p:sp>
-      <p:sp>
-        <p:nvSpPr>
-          <p:cNvPr id="3" name="Espaço Reservado para Conteúdo 2"/>
-          <p:cNvSpPr>
-            <a:spLocks noGrp="1"/>
-          </p:cNvSpPr>
-          <p:nvPr>
-            <p:ph idx="1"/>
-          </p:nvPr>
-        </p:nvSpPr>
-        <p:spPr/>
-        <p:txBody>
-          <a:bodyPr anchor="ctr">
-            <a:normAutofit/>
-          </a:bodyPr>
-          <a:lstStyle/>
-          <a:p>
-            <a:pPr lvl="1">
-              <a:buFont typeface="Wingdings" panose="05000000000000000000" pitchFamily="2" charset="2"/>
-              <a:buChar char="Ø"/>
-            </a:pPr>
-            <a:r>
-              <a:rPr lang="pt-BR" sz="3200" dirty="0" smtClean="0">
-                <a:solidFill>
-                  <a:schemeClr val="bg1"/>
-                </a:solidFill>
-              </a:rPr>
-              <a:t>Desenvolvimento do jogo</a:t>
-            </a:r>
-          </a:p>
-          <a:p>
-            <a:pPr lvl="2">
-              <a:buFont typeface="Wingdings" panose="05000000000000000000" pitchFamily="2" charset="2"/>
-              <a:buChar char="Ø"/>
-            </a:pPr>
-            <a:r>
-              <a:rPr lang="pt-BR" sz="2800" dirty="0" smtClean="0">
-                <a:solidFill>
-                  <a:schemeClr val="bg1"/>
-                </a:solidFill>
-              </a:rPr>
-              <a:t>Pré-produção</a:t>
-            </a:r>
-          </a:p>
-          <a:p>
-            <a:pPr lvl="3">
-              <a:buFont typeface="Wingdings" panose="05000000000000000000" pitchFamily="2" charset="2"/>
-              <a:buChar char="Ø"/>
-            </a:pPr>
-            <a:r>
-              <a:rPr lang="pt-BR" sz="2400" dirty="0" smtClean="0">
-                <a:solidFill>
-                  <a:schemeClr val="bg1"/>
-                </a:solidFill>
-              </a:rPr>
-              <a:t>Definição do jogo</a:t>
-            </a:r>
-          </a:p>
-          <a:p>
-            <a:pPr lvl="2">
-              <a:buFont typeface="Wingdings" panose="05000000000000000000" pitchFamily="2" charset="2"/>
-              <a:buChar char="Ø"/>
-            </a:pPr>
-            <a:r>
-              <a:rPr lang="pt-BR" sz="2800" dirty="0" smtClean="0">
-                <a:solidFill>
-                  <a:schemeClr val="bg1"/>
-                </a:solidFill>
-              </a:rPr>
-              <a:t>Produção</a:t>
-            </a:r>
-          </a:p>
-          <a:p>
-            <a:pPr lvl="3">
-              <a:buFont typeface="Wingdings" panose="05000000000000000000" pitchFamily="2" charset="2"/>
-              <a:buChar char="Ø"/>
-            </a:pPr>
-            <a:r>
-              <a:rPr lang="pt-BR" sz="2400" dirty="0" smtClean="0">
-                <a:solidFill>
-                  <a:schemeClr val="bg1"/>
-                </a:solidFill>
-              </a:rPr>
-              <a:t>Ciclos iterativos baseados no </a:t>
-            </a:r>
-            <a:r>
-              <a:rPr lang="pt-BR" sz="2400" dirty="0" err="1" smtClean="0">
-                <a:solidFill>
-                  <a:schemeClr val="bg1"/>
-                </a:solidFill>
-              </a:rPr>
-              <a:t>Scrum</a:t>
-            </a:r>
-            <a:endParaRPr lang="pt-BR" sz="2400" dirty="0" smtClean="0">
-              <a:solidFill>
-                <a:schemeClr val="bg1"/>
-              </a:solidFill>
-            </a:endParaRPr>
-          </a:p>
-          <a:p>
-            <a:pPr lvl="2">
-              <a:buFont typeface="Wingdings" panose="05000000000000000000" pitchFamily="2" charset="2"/>
-              <a:buChar char="Ø"/>
-            </a:pPr>
-            <a:r>
-              <a:rPr lang="pt-BR" sz="2800" strike="sngStrike" dirty="0" smtClean="0">
-                <a:solidFill>
-                  <a:schemeClr val="bg1"/>
-                </a:solidFill>
-              </a:rPr>
-              <a:t>Pós-produção</a:t>
-            </a:r>
+          <a:p>
+            <a:endParaRPr lang="pt-BR" dirty="0"/>
           </a:p>
         </p:txBody>
       </p:sp>
     </p:spTree>
     <p:extLst>
       <p:ext uri="{BB962C8B-B14F-4D97-AF65-F5344CB8AC3E}">
-        <p14:creationId xmlns:p14="http://schemas.microsoft.com/office/powerpoint/2010/main" val="260927960"/>
+        <p14:creationId xmlns:p14="http://schemas.microsoft.com/office/powerpoint/2010/main" val="3367911418"/>
       </p:ext>
     </p:extLst>
   </p:cSld>
@@ -6950,7 +7585,7 @@
       </p:grpSpPr>
       <p:sp>
         <p:nvSpPr>
-          <p:cNvPr id="4" name="Título 3"/>
+          <p:cNvPr id="2" name="Título 1"/>
           <p:cNvSpPr>
             <a:spLocks noGrp="1"/>
           </p:cNvSpPr>
@@ -6969,23 +7604,7 @@
                   <a:schemeClr val="bg1"/>
                 </a:solidFill>
               </a:rPr>
-              <a:t>Fundamenta</a:t>
-            </a:r>
-            <a:r>
-              <a:rPr lang="pt-BR" dirty="0" smtClean="0">
-                <a:solidFill>
-                  <a:schemeClr val="bg1"/>
-                </a:solidFill>
-              </a:rPr>
-              <a:t>ção </a:t>
-            </a:r>
-            <a:r>
-              <a:rPr lang="pt-BR" dirty="0" smtClean="0">
-                <a:solidFill>
-                  <a:schemeClr val="bg1"/>
-                </a:solidFill>
-              </a:rPr>
-              <a:t>teórica</a:t>
+              <a:t>Metodologia</a:t>
             </a:r>
             <a:endParaRPr lang="pt-BR" dirty="0">
               <a:solidFill>
@@ -6997,24 +7616,125 @@
       </p:sp>
       <p:sp>
         <p:nvSpPr>
-          <p:cNvPr id="5" name="Espaço Reservado para Texto 4"/>
-          <p:cNvSpPr>
-            <a:spLocks noGrp="1"/>
-          </p:cNvSpPr>
-          <p:nvPr>
-            <p:ph type="body" idx="1"/>
+          <p:cNvPr id="3" name="Espaço Reservado para Conteúdo 2"/>
+          <p:cNvSpPr>
+            <a:spLocks noGrp="1"/>
+          </p:cNvSpPr>
+          <p:nvPr>
+            <p:ph idx="1"/>
           </p:nvPr>
         </p:nvSpPr>
         <p:spPr/>
         <p:txBody>
-          <a:bodyPr/>
+          <a:bodyPr anchor="ctr">
+            <a:normAutofit/>
+          </a:bodyPr>
           <a:lstStyle/>
           <a:p>
-            <a:endParaRPr lang="pt-BR"/>
+            <a:pPr lvl="1">
+              <a:buFont typeface="Wingdings" panose="05000000000000000000" pitchFamily="2" charset="2"/>
+              <a:buChar char="Ø"/>
+            </a:pPr>
+            <a:r>
+              <a:rPr lang="pt-BR" sz="3200" dirty="0" smtClean="0">
+                <a:solidFill>
+                  <a:schemeClr val="bg1"/>
+                </a:solidFill>
+              </a:rPr>
+              <a:t>Desenvolvimento do jogo</a:t>
+            </a:r>
+          </a:p>
+          <a:p>
+            <a:pPr lvl="2">
+              <a:buFont typeface="Wingdings" panose="05000000000000000000" pitchFamily="2" charset="2"/>
+              <a:buChar char="Ø"/>
+            </a:pPr>
+            <a:r>
+              <a:rPr lang="pt-BR" sz="2800" dirty="0" smtClean="0">
+                <a:solidFill>
+                  <a:schemeClr val="bg1"/>
+                </a:solidFill>
+              </a:rPr>
+              <a:t>Pré-produção</a:t>
+            </a:r>
+          </a:p>
+          <a:p>
+            <a:pPr lvl="3">
+              <a:buFont typeface="Wingdings" panose="05000000000000000000" pitchFamily="2" charset="2"/>
+              <a:buChar char="Ø"/>
+            </a:pPr>
+            <a:r>
+              <a:rPr lang="pt-BR" sz="2400" dirty="0" smtClean="0">
+                <a:solidFill>
+                  <a:schemeClr val="bg1"/>
+                </a:solidFill>
+              </a:rPr>
+              <a:t>Definição do jogo</a:t>
+            </a:r>
+          </a:p>
+          <a:p>
+            <a:pPr lvl="2">
+              <a:buFont typeface="Wingdings" panose="05000000000000000000" pitchFamily="2" charset="2"/>
+              <a:buChar char="Ø"/>
+            </a:pPr>
+            <a:r>
+              <a:rPr lang="pt-BR" sz="2800" dirty="0" smtClean="0">
+                <a:solidFill>
+                  <a:schemeClr val="bg1"/>
+                </a:solidFill>
+              </a:rPr>
+              <a:t>Produção</a:t>
+            </a:r>
+          </a:p>
+          <a:p>
+            <a:pPr lvl="3">
+              <a:buFont typeface="Wingdings" panose="05000000000000000000" pitchFamily="2" charset="2"/>
+              <a:buChar char="Ø"/>
+            </a:pPr>
+            <a:r>
+              <a:rPr lang="pt-BR" sz="2400" dirty="0" smtClean="0">
+                <a:solidFill>
+                  <a:schemeClr val="bg1"/>
+                </a:solidFill>
+              </a:rPr>
+              <a:t>Ciclos iterativos baseados no </a:t>
+            </a:r>
+            <a:r>
+              <a:rPr lang="pt-BR" sz="2400" dirty="0" err="1" smtClean="0">
+                <a:solidFill>
+                  <a:schemeClr val="bg1"/>
+                </a:solidFill>
+              </a:rPr>
+              <a:t>Scrum</a:t>
+            </a:r>
+            <a:endParaRPr lang="pt-BR" sz="2400" dirty="0" smtClean="0">
+              <a:solidFill>
+                <a:schemeClr val="bg1"/>
+              </a:solidFill>
+            </a:endParaRPr>
+          </a:p>
+          <a:p>
+            <a:pPr lvl="2">
+              <a:buFont typeface="Wingdings" panose="05000000000000000000" pitchFamily="2" charset="2"/>
+              <a:buChar char="Ø"/>
+            </a:pPr>
+            <a:r>
+              <a:rPr lang="pt-BR" sz="2800" strike="sngStrike" dirty="0" smtClean="0">
+                <a:solidFill>
+                  <a:schemeClr val="bg1"/>
+                </a:solidFill>
+              </a:rPr>
+              <a:t>Pós-produção</a:t>
+            </a:r>
           </a:p>
         </p:txBody>
       </p:sp>
     </p:spTree>
+    <p:extLst>
+      <p:ext uri="{BB962C8B-B14F-4D97-AF65-F5344CB8AC3E}">
+        <p14:creationId xmlns:p14="http://schemas.microsoft.com/office/powerpoint/2010/main" val="260927960"/>
+      </p:ext>
+    </p:extLst>
   </p:cSld>
   <p:clrMapOvr>
     <a:masterClrMapping/>

</xml_diff>

<commit_message>
Pr-Projeto : adicionado comentários sobre cronograma 	modified:   pre-projeto/apresentacao.pptx
</commit_message>
<xml_diff>
--- a/pre-projeto/apresentacao.pptx
+++ b/pre-projeto/apresentacao.pptx
@@ -210,7 +210,7 @@
           <a:p>
             <a:fld id="{3B3DC091-544D-4B42-9938-9A362E2AC839}" type="datetimeFigureOut">
               <a:rPr lang="en-US" smtClean="0"/>
-              <a:t>11/26/2013</a:t>
+              <a:t>27/11/13</a:t>
             </a:fld>
             <a:endParaRPr lang="en-US"/>
           </a:p>
@@ -369,7 +369,7 @@
           <a:p>
             <a:fld id="{76AF9A99-7F04-5641-8AF4-E3ACF999B5EC}" type="slidenum">
               <a:rPr lang="en-US" smtClean="0"/>
-              <a:t>‹nº›</a:t>
+              <a:t>‹#›</a:t>
             </a:fld>
             <a:endParaRPr lang="en-US"/>
           </a:p>
@@ -1356,6 +1356,362 @@
 </p:notes>
 </file>
 
+<file path=ppt/notesSlides/notesSlide5.xml><?xml version="1.0" encoding="utf-8"?>
+<p:notes xmlns:a="http://schemas.openxmlformats.org/drawingml/2006/main" xmlns:r="http://schemas.openxmlformats.org/officeDocument/2006/relationships" xmlns:p="http://schemas.openxmlformats.org/presentationml/2006/main">
+  <p:cSld>
+    <p:spTree>
+      <p:nvGrpSpPr>
+        <p:cNvPr id="1" name=""/>
+        <p:cNvGrpSpPr/>
+        <p:nvPr/>
+      </p:nvGrpSpPr>
+      <p:grpSpPr>
+        <a:xfrm>
+          <a:off x="0" y="0"/>
+          <a:ext cx="0" cy="0"/>
+          <a:chOff x="0" y="0"/>
+          <a:chExt cx="0" cy="0"/>
+        </a:xfrm>
+      </p:grpSpPr>
+      <p:sp>
+        <p:nvSpPr>
+          <p:cNvPr id="2" name="Slide Image Placeholder 1"/>
+          <p:cNvSpPr>
+            <a:spLocks noGrp="1" noRot="1" noChangeAspect="1"/>
+          </p:cNvSpPr>
+          <p:nvPr>
+            <p:ph type="sldImg"/>
+          </p:nvPr>
+        </p:nvSpPr>
+        <p:spPr/>
+      </p:sp>
+      <p:sp>
+        <p:nvSpPr>
+          <p:cNvPr id="3" name="Notes Placeholder 2"/>
+          <p:cNvSpPr>
+            <a:spLocks noGrp="1"/>
+          </p:cNvSpPr>
+          <p:nvPr>
+            <p:ph type="body" idx="1"/>
+          </p:nvPr>
+        </p:nvSpPr>
+        <p:spPr/>
+        <p:txBody>
+          <a:bodyPr/>
+          <a:lstStyle/>
+          <a:p>
+            <a:pPr marL="0" marR="0" indent="0" algn="l" defTabSz="457200" rtl="0" eaLnBrk="1" fontAlgn="auto" latinLnBrk="0" hangingPunct="1">
+              <a:lnSpc>
+                <a:spcPct val="100000"/>
+              </a:lnSpc>
+              <a:spcBef>
+                <a:spcPts val="0"/>
+              </a:spcBef>
+              <a:spcAft>
+                <a:spcPts val="0"/>
+              </a:spcAft>
+              <a:buClrTx/>
+              <a:buSzTx/>
+              <a:buFontTx/>
+              <a:buNone/>
+              <a:tabLst/>
+              <a:defRPr/>
+            </a:pPr>
+            <a:r>
+              <a:rPr lang="en-US" sz="1200" dirty="0" smtClean="0"/>
+              <a:t>28/11/2013 – 11/12/2013 : R1 </a:t>
+            </a:r>
+          </a:p>
+          <a:p>
+            <a:pPr marL="0" marR="0" indent="0" algn="l" defTabSz="457200" rtl="0" eaLnBrk="1" fontAlgn="auto" latinLnBrk="0" hangingPunct="1">
+              <a:lnSpc>
+                <a:spcPct val="100000"/>
+              </a:lnSpc>
+              <a:spcBef>
+                <a:spcPts val="0"/>
+              </a:spcBef>
+              <a:spcAft>
+                <a:spcPts val="0"/>
+              </a:spcAft>
+              <a:buClrTx/>
+              <a:buSzTx/>
+              <a:buFontTx/>
+              <a:buNone/>
+              <a:tabLst/>
+              <a:defRPr/>
+            </a:pPr>
+            <a:r>
+              <a:rPr lang="en-US" sz="1200" dirty="0" smtClean="0"/>
+              <a:t>12/12/2013 – 24/12/2013 : R2</a:t>
+            </a:r>
+          </a:p>
+          <a:p>
+            <a:pPr marL="0" marR="0" indent="0" algn="l" defTabSz="457200" rtl="0" eaLnBrk="1" fontAlgn="auto" latinLnBrk="0" hangingPunct="1">
+              <a:lnSpc>
+                <a:spcPct val="100000"/>
+              </a:lnSpc>
+              <a:spcBef>
+                <a:spcPts val="0"/>
+              </a:spcBef>
+              <a:spcAft>
+                <a:spcPts val="0"/>
+              </a:spcAft>
+              <a:buClrTx/>
+              <a:buSzTx/>
+              <a:buFontTx/>
+              <a:buNone/>
+              <a:tabLst/>
+              <a:defRPr/>
+            </a:pPr>
+            <a:r>
+              <a:rPr lang="en-US" sz="1200" dirty="0" smtClean="0"/>
+              <a:t>25/12/2013</a:t>
+            </a:r>
+            <a:r>
+              <a:rPr lang="en-US" sz="1200" baseline="0" dirty="0" smtClean="0"/>
+              <a:t> – </a:t>
+            </a:r>
+            <a:r>
+              <a:rPr lang="en-US" sz="1200" dirty="0" smtClean="0"/>
+              <a:t>07/01/2014 : R3</a:t>
+            </a:r>
+          </a:p>
+          <a:p>
+            <a:pPr marL="0" marR="0" indent="0" algn="l" defTabSz="457200" rtl="0" eaLnBrk="1" fontAlgn="auto" latinLnBrk="0" hangingPunct="1">
+              <a:lnSpc>
+                <a:spcPct val="100000"/>
+              </a:lnSpc>
+              <a:spcBef>
+                <a:spcPts val="0"/>
+              </a:spcBef>
+              <a:spcAft>
+                <a:spcPts val="0"/>
+              </a:spcAft>
+              <a:buClrTx/>
+              <a:buSzTx/>
+              <a:buFontTx/>
+              <a:buNone/>
+              <a:tabLst/>
+              <a:defRPr/>
+            </a:pPr>
+            <a:r>
+              <a:rPr lang="en-US" sz="1200" dirty="0" smtClean="0"/>
+              <a:t>08/01/2014</a:t>
+            </a:r>
+            <a:r>
+              <a:rPr lang="en-US" sz="1200" baseline="0" dirty="0" smtClean="0"/>
+              <a:t> – 21/01/2014 : R4</a:t>
+            </a:r>
+          </a:p>
+          <a:p>
+            <a:pPr marL="0" marR="0" indent="0" algn="l" defTabSz="457200" rtl="0" eaLnBrk="1" fontAlgn="auto" latinLnBrk="0" hangingPunct="1">
+              <a:lnSpc>
+                <a:spcPct val="100000"/>
+              </a:lnSpc>
+              <a:spcBef>
+                <a:spcPts val="0"/>
+              </a:spcBef>
+              <a:spcAft>
+                <a:spcPts val="0"/>
+              </a:spcAft>
+              <a:buClrTx/>
+              <a:buSzTx/>
+              <a:buFontTx/>
+              <a:buNone/>
+              <a:tabLst/>
+              <a:defRPr/>
+            </a:pPr>
+            <a:r>
+              <a:rPr lang="en-US" sz="1200" baseline="0" dirty="0" smtClean="0"/>
+              <a:t>22/01/2014 – 05/02/2014 : R5</a:t>
+            </a:r>
+          </a:p>
+          <a:p>
+            <a:pPr marL="0" marR="0" indent="0" algn="l" defTabSz="457200" rtl="0" eaLnBrk="1" fontAlgn="auto" latinLnBrk="0" hangingPunct="1">
+              <a:lnSpc>
+                <a:spcPct val="100000"/>
+              </a:lnSpc>
+              <a:spcBef>
+                <a:spcPts val="0"/>
+              </a:spcBef>
+              <a:spcAft>
+                <a:spcPts val="0"/>
+              </a:spcAft>
+              <a:buClrTx/>
+              <a:buSzTx/>
+              <a:buFontTx/>
+              <a:buNone/>
+              <a:tabLst/>
+              <a:defRPr/>
+            </a:pPr>
+            <a:endParaRPr lang="en-US" sz="1200" baseline="0" dirty="0" smtClean="0"/>
+          </a:p>
+          <a:p>
+            <a:pPr marL="0" marR="0" indent="0" algn="l" defTabSz="457200" rtl="0" eaLnBrk="1" fontAlgn="auto" latinLnBrk="0" hangingPunct="1">
+              <a:lnSpc>
+                <a:spcPct val="100000"/>
+              </a:lnSpc>
+              <a:spcBef>
+                <a:spcPts val="0"/>
+              </a:spcBef>
+              <a:spcAft>
+                <a:spcPts val="0"/>
+              </a:spcAft>
+              <a:buClrTx/>
+              <a:buSzTx/>
+              <a:buFontTx/>
+              <a:buNone/>
+              <a:tabLst/>
+              <a:defRPr/>
+            </a:pPr>
+            <a:r>
+              <a:rPr lang="en-US" sz="1200" dirty="0" smtClean="0"/>
+              <a:t>https://</a:t>
+            </a:r>
+            <a:r>
+              <a:rPr lang="en-US" sz="1200" dirty="0" err="1" smtClean="0"/>
+              <a:t>code.google.com</a:t>
+            </a:r>
+            <a:r>
+              <a:rPr lang="en-US" sz="1200" dirty="0" smtClean="0"/>
+              <a:t>/p/2013-m-jogo/wiki/</a:t>
+            </a:r>
+            <a:r>
+              <a:rPr lang="en-US" sz="1200" dirty="0" err="1" smtClean="0"/>
+              <a:t>UserStories</a:t>
+            </a:r>
+            <a:endParaRPr lang="en-US" sz="1200" dirty="0" smtClean="0"/>
+          </a:p>
+          <a:p>
+            <a:pPr marL="0" marR="0" indent="0" algn="l" defTabSz="457200" rtl="0" eaLnBrk="1" fontAlgn="auto" latinLnBrk="0" hangingPunct="1">
+              <a:lnSpc>
+                <a:spcPct val="100000"/>
+              </a:lnSpc>
+              <a:spcBef>
+                <a:spcPts val="0"/>
+              </a:spcBef>
+              <a:spcAft>
+                <a:spcPts val="0"/>
+              </a:spcAft>
+              <a:buClrTx/>
+              <a:buSzTx/>
+              <a:buFontTx/>
+              <a:buNone/>
+              <a:tabLst/>
+              <a:defRPr/>
+            </a:pPr>
+            <a:r>
+              <a:rPr lang="en-US" sz="1200" dirty="0" smtClean="0"/>
+              <a:t>https://</a:t>
+            </a:r>
+            <a:r>
+              <a:rPr lang="en-US" sz="1200" dirty="0" err="1" smtClean="0"/>
+              <a:t>code.google.com</a:t>
+            </a:r>
+            <a:r>
+              <a:rPr lang="en-US" sz="1200" dirty="0" smtClean="0"/>
+              <a:t>/p/2013-m-jogo/wiki/</a:t>
+            </a:r>
+            <a:r>
+              <a:rPr lang="en-US" sz="1200" dirty="0" err="1" smtClean="0"/>
+              <a:t>ReleasePlan</a:t>
+            </a:r>
+            <a:endParaRPr lang="en-US" sz="1200" dirty="0" smtClean="0"/>
+          </a:p>
+          <a:p>
+            <a:pPr marL="0" marR="0" indent="0" algn="l" defTabSz="457200" rtl="0" eaLnBrk="1" fontAlgn="auto" latinLnBrk="0" hangingPunct="1">
+              <a:lnSpc>
+                <a:spcPct val="100000"/>
+              </a:lnSpc>
+              <a:spcBef>
+                <a:spcPts val="0"/>
+              </a:spcBef>
+              <a:spcAft>
+                <a:spcPts val="0"/>
+              </a:spcAft>
+              <a:buClrTx/>
+              <a:buSzTx/>
+              <a:buFontTx/>
+              <a:buNone/>
+              <a:tabLst/>
+              <a:defRPr/>
+            </a:pPr>
+            <a:endParaRPr lang="en-US" sz="1200" dirty="0" smtClean="0"/>
+          </a:p>
+          <a:p>
+            <a:pPr marL="0" marR="0" indent="0" algn="l" defTabSz="457200" rtl="0" eaLnBrk="1" fontAlgn="auto" latinLnBrk="0" hangingPunct="1">
+              <a:lnSpc>
+                <a:spcPct val="100000"/>
+              </a:lnSpc>
+              <a:spcBef>
+                <a:spcPts val="0"/>
+              </a:spcBef>
+              <a:spcAft>
+                <a:spcPts val="0"/>
+              </a:spcAft>
+              <a:buClrTx/>
+              <a:buSzTx/>
+              <a:buFontTx/>
+              <a:buNone/>
+              <a:tabLst/>
+              <a:defRPr/>
+            </a:pPr>
+            <a:r>
+              <a:rPr lang="en-US" sz="1200" dirty="0" smtClean="0"/>
+              <a:t>http://</a:t>
+            </a:r>
+            <a:r>
+              <a:rPr lang="en-US" sz="1200" dirty="0" err="1" smtClean="0"/>
+              <a:t>www.codinghorror.com</a:t>
+            </a:r>
+            <a:r>
+              <a:rPr lang="en-US" sz="1200" dirty="0" smtClean="0"/>
+              <a:t>/blog/2007/10/lets-play-planning-</a:t>
+            </a:r>
+            <a:r>
+              <a:rPr lang="en-US" sz="1200" smtClean="0"/>
+              <a:t>poker.html</a:t>
+            </a:r>
+            <a:endParaRPr lang="en-US" sz="1200" dirty="0" smtClean="0"/>
+          </a:p>
+        </p:txBody>
+      </p:sp>
+      <p:sp>
+        <p:nvSpPr>
+          <p:cNvPr id="4" name="Slide Number Placeholder 3"/>
+          <p:cNvSpPr>
+            <a:spLocks noGrp="1"/>
+          </p:cNvSpPr>
+          <p:nvPr>
+            <p:ph type="sldNum" sz="quarter" idx="10"/>
+          </p:nvPr>
+        </p:nvSpPr>
+        <p:spPr/>
+        <p:txBody>
+          <a:bodyPr/>
+          <a:lstStyle/>
+          <a:p>
+            <a:fld id="{76AF9A99-7F04-5641-8AF4-E3ACF999B5EC}" type="slidenum">
+              <a:rPr lang="en-US" smtClean="0"/>
+              <a:t>17</a:t>
+            </a:fld>
+            <a:endParaRPr lang="en-US"/>
+          </a:p>
+        </p:txBody>
+      </p:sp>
+    </p:spTree>
+    <p:extLst>
+      <p:ext uri="{BB962C8B-B14F-4D97-AF65-F5344CB8AC3E}">
+        <p14:creationId xmlns:p14="http://schemas.microsoft.com/office/powerpoint/2010/main" val="1569837341"/>
+      </p:ext>
+    </p:extLst>
+  </p:cSld>
+  <p:clrMapOvr>
+    <a:masterClrMapping/>
+  </p:clrMapOvr>
+</p:notes>
+</file>
+
 <file path=ppt/slideLayouts/slideLayout1.xml><?xml version="1.0" encoding="utf-8"?>
 <p:sldLayout xmlns:a="http://schemas.openxmlformats.org/drawingml/2006/main" xmlns:r="http://schemas.openxmlformats.org/officeDocument/2006/relationships" xmlns:p="http://schemas.openxmlformats.org/presentationml/2006/main" type="title" preserve="1">
   <p:cSld name="Slide de título">
@@ -1538,7 +1894,7 @@
             <a:fld id="{69FAF774-2C22-4986-A8EB-521CC8256BA2}" type="datetimeFigureOut">
               <a:rPr lang="pt-BR" smtClean="0"/>
               <a:pPr/>
-              <a:t>26/11/2013</a:t>
+              <a:t>27/11/13</a:t>
             </a:fld>
             <a:endParaRPr lang="pt-BR"/>
           </a:p>
@@ -1581,7 +1937,7 @@
             <a:fld id="{AEBE9E91-1164-48B5-9DD9-0906DC7D818B}" type="slidenum">
               <a:rPr lang="pt-BR" smtClean="0"/>
               <a:pPr/>
-              <a:t>‹nº›</a:t>
+              <a:t>‹#›</a:t>
             </a:fld>
             <a:endParaRPr lang="pt-BR"/>
           </a:p>
@@ -1705,7 +2061,7 @@
             <a:fld id="{69FAF774-2C22-4986-A8EB-521CC8256BA2}" type="datetimeFigureOut">
               <a:rPr lang="pt-BR" smtClean="0"/>
               <a:pPr/>
-              <a:t>26/11/2013</a:t>
+              <a:t>27/11/13</a:t>
             </a:fld>
             <a:endParaRPr lang="pt-BR"/>
           </a:p>
@@ -1748,7 +2104,7 @@
             <a:fld id="{AEBE9E91-1164-48B5-9DD9-0906DC7D818B}" type="slidenum">
               <a:rPr lang="pt-BR" smtClean="0"/>
               <a:pPr/>
-              <a:t>‹nº›</a:t>
+              <a:t>‹#›</a:t>
             </a:fld>
             <a:endParaRPr lang="pt-BR"/>
           </a:p>
@@ -1882,7 +2238,7 @@
             <a:fld id="{69FAF774-2C22-4986-A8EB-521CC8256BA2}" type="datetimeFigureOut">
               <a:rPr lang="pt-BR" smtClean="0"/>
               <a:pPr/>
-              <a:t>26/11/2013</a:t>
+              <a:t>27/11/13</a:t>
             </a:fld>
             <a:endParaRPr lang="pt-BR"/>
           </a:p>
@@ -1925,7 +2281,7 @@
             <a:fld id="{AEBE9E91-1164-48B5-9DD9-0906DC7D818B}" type="slidenum">
               <a:rPr lang="pt-BR" smtClean="0"/>
               <a:pPr/>
-              <a:t>‹nº›</a:t>
+              <a:t>‹#›</a:t>
             </a:fld>
             <a:endParaRPr lang="pt-BR"/>
           </a:p>
@@ -2049,7 +2405,7 @@
             <a:fld id="{69FAF774-2C22-4986-A8EB-521CC8256BA2}" type="datetimeFigureOut">
               <a:rPr lang="pt-BR" smtClean="0"/>
               <a:pPr/>
-              <a:t>26/11/2013</a:t>
+              <a:t>27/11/13</a:t>
             </a:fld>
             <a:endParaRPr lang="pt-BR"/>
           </a:p>
@@ -2092,7 +2448,7 @@
             <a:fld id="{AEBE9E91-1164-48B5-9DD9-0906DC7D818B}" type="slidenum">
               <a:rPr lang="pt-BR" smtClean="0"/>
               <a:pPr/>
-              <a:t>‹nº›</a:t>
+              <a:t>‹#›</a:t>
             </a:fld>
             <a:endParaRPr lang="pt-BR"/>
           </a:p>
@@ -2292,7 +2648,7 @@
             <a:fld id="{69FAF774-2C22-4986-A8EB-521CC8256BA2}" type="datetimeFigureOut">
               <a:rPr lang="pt-BR" smtClean="0"/>
               <a:pPr/>
-              <a:t>26/11/2013</a:t>
+              <a:t>27/11/13</a:t>
             </a:fld>
             <a:endParaRPr lang="pt-BR"/>
           </a:p>
@@ -2335,7 +2691,7 @@
             <a:fld id="{AEBE9E91-1164-48B5-9DD9-0906DC7D818B}" type="slidenum">
               <a:rPr lang="pt-BR" smtClean="0"/>
               <a:pPr/>
-              <a:t>‹nº›</a:t>
+              <a:t>‹#›</a:t>
             </a:fld>
             <a:endParaRPr lang="pt-BR"/>
           </a:p>
@@ -2577,7 +2933,7 @@
             <a:fld id="{69FAF774-2C22-4986-A8EB-521CC8256BA2}" type="datetimeFigureOut">
               <a:rPr lang="pt-BR" smtClean="0"/>
               <a:pPr/>
-              <a:t>26/11/2013</a:t>
+              <a:t>27/11/13</a:t>
             </a:fld>
             <a:endParaRPr lang="pt-BR"/>
           </a:p>
@@ -2620,7 +2976,7 @@
             <a:fld id="{AEBE9E91-1164-48B5-9DD9-0906DC7D818B}" type="slidenum">
               <a:rPr lang="pt-BR" smtClean="0"/>
               <a:pPr/>
-              <a:t>‹nº›</a:t>
+              <a:t>‹#›</a:t>
             </a:fld>
             <a:endParaRPr lang="pt-BR"/>
           </a:p>
@@ -2996,7 +3352,7 @@
             <a:fld id="{69FAF774-2C22-4986-A8EB-521CC8256BA2}" type="datetimeFigureOut">
               <a:rPr lang="pt-BR" smtClean="0"/>
               <a:pPr/>
-              <a:t>26/11/2013</a:t>
+              <a:t>27/11/13</a:t>
             </a:fld>
             <a:endParaRPr lang="pt-BR"/>
           </a:p>
@@ -3039,7 +3395,7 @@
             <a:fld id="{AEBE9E91-1164-48B5-9DD9-0906DC7D818B}" type="slidenum">
               <a:rPr lang="pt-BR" smtClean="0"/>
               <a:pPr/>
-              <a:t>‹nº›</a:t>
+              <a:t>‹#›</a:t>
             </a:fld>
             <a:endParaRPr lang="pt-BR"/>
           </a:p>
@@ -3111,7 +3467,7 @@
             <a:fld id="{69FAF774-2C22-4986-A8EB-521CC8256BA2}" type="datetimeFigureOut">
               <a:rPr lang="pt-BR" smtClean="0"/>
               <a:pPr/>
-              <a:t>26/11/2013</a:t>
+              <a:t>27/11/13</a:t>
             </a:fld>
             <a:endParaRPr lang="pt-BR"/>
           </a:p>
@@ -3154,7 +3510,7 @@
             <a:fld id="{AEBE9E91-1164-48B5-9DD9-0906DC7D818B}" type="slidenum">
               <a:rPr lang="pt-BR" smtClean="0"/>
               <a:pPr/>
-              <a:t>‹nº›</a:t>
+              <a:t>‹#›</a:t>
             </a:fld>
             <a:endParaRPr lang="pt-BR"/>
           </a:p>
@@ -3203,7 +3559,7 @@
             <a:fld id="{69FAF774-2C22-4986-A8EB-521CC8256BA2}" type="datetimeFigureOut">
               <a:rPr lang="pt-BR" smtClean="0"/>
               <a:pPr/>
-              <a:t>26/11/2013</a:t>
+              <a:t>27/11/13</a:t>
             </a:fld>
             <a:endParaRPr lang="pt-BR"/>
           </a:p>
@@ -3246,7 +3602,7 @@
             <a:fld id="{AEBE9E91-1164-48B5-9DD9-0906DC7D818B}" type="slidenum">
               <a:rPr lang="pt-BR" smtClean="0"/>
               <a:pPr/>
-              <a:t>‹nº›</a:t>
+              <a:t>‹#›</a:t>
             </a:fld>
             <a:endParaRPr lang="pt-BR"/>
           </a:p>
@@ -3477,7 +3833,7 @@
             <a:fld id="{69FAF774-2C22-4986-A8EB-521CC8256BA2}" type="datetimeFigureOut">
               <a:rPr lang="pt-BR" smtClean="0"/>
               <a:pPr/>
-              <a:t>26/11/2013</a:t>
+              <a:t>27/11/13</a:t>
             </a:fld>
             <a:endParaRPr lang="pt-BR"/>
           </a:p>
@@ -3520,7 +3876,7 @@
             <a:fld id="{AEBE9E91-1164-48B5-9DD9-0906DC7D818B}" type="slidenum">
               <a:rPr lang="pt-BR" smtClean="0"/>
               <a:pPr/>
-              <a:t>‹nº›</a:t>
+              <a:t>‹#›</a:t>
             </a:fld>
             <a:endParaRPr lang="pt-BR"/>
           </a:p>
@@ -3727,7 +4083,7 @@
             <a:fld id="{69FAF774-2C22-4986-A8EB-521CC8256BA2}" type="datetimeFigureOut">
               <a:rPr lang="pt-BR" smtClean="0"/>
               <a:pPr/>
-              <a:t>26/11/2013</a:t>
+              <a:t>27/11/13</a:t>
             </a:fld>
             <a:endParaRPr lang="pt-BR"/>
           </a:p>
@@ -3770,7 +4126,7 @@
             <a:fld id="{AEBE9E91-1164-48B5-9DD9-0906DC7D818B}" type="slidenum">
               <a:rPr lang="pt-BR" smtClean="0"/>
               <a:pPr/>
-              <a:t>‹nº›</a:t>
+              <a:t>‹#›</a:t>
             </a:fld>
             <a:endParaRPr lang="pt-BR"/>
           </a:p>
@@ -3940,7 +4296,7 @@
             <a:fld id="{69FAF774-2C22-4986-A8EB-521CC8256BA2}" type="datetimeFigureOut">
               <a:rPr lang="pt-BR" smtClean="0"/>
               <a:pPr/>
-              <a:t>26/11/2013</a:t>
+              <a:t>27/11/13</a:t>
             </a:fld>
             <a:endParaRPr lang="pt-BR"/>
           </a:p>
@@ -4019,7 +4375,7 @@
             <a:fld id="{AEBE9E91-1164-48B5-9DD9-0906DC7D818B}" type="slidenum">
               <a:rPr lang="pt-BR" smtClean="0"/>
               <a:pPr/>
-              <a:t>‹nº›</a:t>
+              <a:t>‹#›</a:t>
             </a:fld>
             <a:endParaRPr lang="pt-BR"/>
           </a:p>
@@ -4685,15 +5041,7 @@
                   <a:schemeClr val="bg1"/>
                 </a:solidFill>
               </a:rPr>
-              <a:t>Jogos </a:t>
-            </a:r>
-            <a:r>
-              <a:rPr lang="pt-BR" dirty="0" smtClean="0">
-                <a:solidFill>
-                  <a:schemeClr val="bg1"/>
-                </a:solidFill>
-              </a:rPr>
-              <a:t>computacionais</a:t>
+              <a:t>Jogos computacionais</a:t>
             </a:r>
           </a:p>
           <a:p>
@@ -4817,21 +5165,8 @@
                   <a:schemeClr val="bg1"/>
                 </a:solidFill>
               </a:rPr>
-              <a:t>, RPG, MMORPG, MMOG, TBS e </a:t>
-            </a:r>
-            <a:r>
-              <a:rPr lang="pt-BR" sz="2400" dirty="0" smtClean="0">
-                <a:solidFill>
-                  <a:schemeClr val="bg1"/>
-                </a:solidFill>
-              </a:rPr>
-              <a:t>etc.</a:t>
-            </a:r>
-            <a:endParaRPr lang="pt-BR" sz="2400" dirty="0" smtClean="0">
-              <a:solidFill>
-                <a:schemeClr val="bg1"/>
-              </a:solidFill>
-            </a:endParaRPr>
+              <a:t>, RPG, MMORPG, MMOG, TBS e etc.</a:t>
+            </a:r>
           </a:p>
           <a:p>
             <a:pPr>
@@ -4844,23 +5179,7 @@
                   <a:schemeClr val="bg1"/>
                 </a:solidFill>
               </a:rPr>
-              <a:t>Processo </a:t>
-            </a:r>
-            <a:r>
-              <a:rPr lang="pt-BR" dirty="0" smtClean="0">
-                <a:solidFill>
-                  <a:schemeClr val="bg1"/>
-                </a:solidFill>
-              </a:rPr>
-              <a:t>de desenvolvimento de </a:t>
-            </a:r>
-            <a:r>
-              <a:rPr lang="pt-BR" dirty="0" smtClean="0">
-                <a:solidFill>
-                  <a:schemeClr val="bg1"/>
-                </a:solidFill>
-              </a:rPr>
-              <a:t>jogos</a:t>
+              <a:t>Processo de desenvolvimento de jogos</a:t>
             </a:r>
           </a:p>
           <a:p>
@@ -4936,7 +5255,7 @@
   <p:timing>
     <p:tnLst>
       <p:par>
-        <p:cTn id="1" dur="indefinite" restart="never" nodeType="tmRoot"/>
+        <p:cTn xmlns:p14="http://schemas.microsoft.com/office/powerpoint/2010/main" id="1" dur="indefinite" restart="never" nodeType="tmRoot"/>
       </p:par>
     </p:tnLst>
   </p:timing>
@@ -5033,7 +5352,7 @@
   <p:timing>
     <p:tnLst>
       <p:par>
-        <p:cTn id="1" dur="indefinite" restart="never" nodeType="tmRoot"/>
+        <p:cTn xmlns:p14="http://schemas.microsoft.com/office/powerpoint/2010/main" id="1" dur="indefinite" restart="never" nodeType="tmRoot"/>
       </p:par>
     </p:tnLst>
   </p:timing>
@@ -5142,7 +5461,7 @@
   <p:timing>
     <p:tnLst>
       <p:par>
-        <p:cTn id="1" dur="indefinite" restart="never" nodeType="tmRoot"/>
+        <p:cTn xmlns:p14="http://schemas.microsoft.com/office/powerpoint/2010/main" id="1" dur="indefinite" restart="never" nodeType="tmRoot"/>
       </p:par>
     </p:tnLst>
   </p:timing>
@@ -5239,7 +5558,7 @@
   <p:timing>
     <p:tnLst>
       <p:par>
-        <p:cTn id="1" dur="indefinite" restart="never" nodeType="tmRoot"/>
+        <p:cTn xmlns:p14="http://schemas.microsoft.com/office/powerpoint/2010/main" id="1" dur="indefinite" restart="never" nodeType="tmRoot"/>
       </p:par>
     </p:tnLst>
   </p:timing>
@@ -5641,7 +5960,7 @@
   <p:timing>
     <p:tnLst>
       <p:par>
-        <p:cTn id="1" dur="indefinite" restart="never" nodeType="tmRoot"/>
+        <p:cTn xmlns:p14="http://schemas.microsoft.com/office/powerpoint/2010/main" id="1" dur="indefinite" restart="never" nodeType="tmRoot"/>
       </p:par>
     </p:tnLst>
   </p:timing>
@@ -5714,7 +6033,7 @@
             <p:ph idx="1"/>
             <p:extLst>
               <p:ext uri="{D42A27DB-BD31-4B8C-83A1-F6EECF244321}">
-                <p14:modId xmlns:p14="http://schemas.microsoft.com/office/powerpoint/2010/main" val="871053414"/>
+                <p14:modId xmlns:p14="http://schemas.microsoft.com/office/powerpoint/2010/main" val="3451786725"/>
               </p:ext>
             </p:extLst>
           </p:nvPr>
@@ -5769,6 +6088,10 @@
                     <a:bodyPr/>
                     <a:lstStyle/>
                     <a:p>
+                      <a:r>
+                        <a:rPr lang="pt-BR" sz="3600" noProof="0" dirty="0" smtClean="0"/>
+                        <a:t>OK</a:t>
+                      </a:r>
                       <a:endParaRPr lang="pt-BR" sz="3600" noProof="0" dirty="0"/>
                     </a:p>
                   </a:txBody>
@@ -5837,7 +6160,11 @@
                     <a:p>
                       <a:r>
                         <a:rPr lang="en-US" sz="3600" dirty="0" smtClean="0"/>
-                        <a:t>Release 1</a:t>
+                        <a:t>Release </a:t>
+                      </a:r>
+                      <a:r>
+                        <a:rPr lang="en-US" sz="3600" dirty="0" smtClean="0"/>
+                        <a:t>1</a:t>
                       </a:r>
                       <a:endParaRPr lang="en-US" sz="3600" dirty="0"/>
                     </a:p>
@@ -5940,7 +6267,7 @@
   <p:timing>
     <p:tnLst>
       <p:par>
-        <p:cTn id="1" dur="indefinite" restart="never" nodeType="tmRoot"/>
+        <p:cTn xmlns:p14="http://schemas.microsoft.com/office/powerpoint/2010/main" id="1" dur="indefinite" restart="never" nodeType="tmRoot"/>
       </p:par>
     </p:tnLst>
   </p:timing>
@@ -6439,7 +6766,7 @@
   <p:timing>
     <p:tnLst>
       <p:par>
-        <p:cTn id="1" dur="indefinite" restart="never" nodeType="tmRoot"/>
+        <p:cTn xmlns:p14="http://schemas.microsoft.com/office/powerpoint/2010/main" id="1" dur="indefinite" restart="never" nodeType="tmRoot"/>
       </p:par>
     </p:tnLst>
   </p:timing>
@@ -7011,7 +7338,15 @@
                   <a:srgbClr val="FFFFFF"/>
                 </a:solidFill>
               </a:rPr>
-              <a:t>Mobile </a:t>
+              <a:t>Mobile (</a:t>
+            </a:r>
+            <a:r>
+              <a:rPr lang="pt-BR" dirty="0" err="1" smtClean="0">
+                <a:solidFill>
+                  <a:srgbClr val="FFFFFF"/>
+                </a:solidFill>
+              </a:rPr>
+              <a:t>Android</a:t>
             </a:r>
             <a:r>
               <a:rPr lang="pt-BR" dirty="0" smtClean="0">
@@ -7019,15 +7354,21 @@
                   <a:srgbClr val="FFFFFF"/>
                 </a:solidFill>
               </a:rPr>
-              <a:t>(</a:t>
-            </a:r>
-            <a:r>
-              <a:rPr lang="pt-BR" dirty="0" err="1" smtClean="0">
+              <a:t>)</a:t>
+            </a:r>
+          </a:p>
+          <a:p>
+            <a:pPr lvl="1">
+              <a:buFont typeface="Wingdings" panose="05000000000000000000" pitchFamily="2" charset="2"/>
+              <a:buChar char="Ø"/>
+            </a:pPr>
+            <a:r>
+              <a:rPr lang="pt-BR" dirty="0" smtClean="0">
                 <a:solidFill>
                   <a:srgbClr val="FFFFFF"/>
                 </a:solidFill>
               </a:rPr>
-              <a:t>Android</a:t>
+              <a:t>Adventure/</a:t>
             </a:r>
             <a:r>
               <a:rPr lang="pt-BR" dirty="0" smtClean="0">
@@ -7035,46 +7376,13 @@
                   <a:srgbClr val="FFFFFF"/>
                 </a:solidFill>
               </a:rPr>
-              <a:t>)</a:t>
+              <a:t>Puzzle</a:t>
             </a:r>
             <a:endParaRPr lang="pt-BR" dirty="0" smtClean="0">
               <a:solidFill>
                 <a:srgbClr val="FFFFFF"/>
               </a:solidFill>
             </a:endParaRPr>
-          </a:p>
-          <a:p>
-            <a:pPr lvl="1">
-              <a:buFont typeface="Wingdings" panose="05000000000000000000" pitchFamily="2" charset="2"/>
-              <a:buChar char="Ø"/>
-            </a:pPr>
-            <a:r>
-              <a:rPr lang="pt-BR" dirty="0" smtClean="0">
-                <a:solidFill>
-                  <a:srgbClr val="FFFFFF"/>
-                </a:solidFill>
-              </a:rPr>
-              <a:t>Adventure/Puzzle</a:t>
-            </a:r>
-            <a:endParaRPr lang="pt-BR" dirty="0" smtClean="0">
-              <a:solidFill>
-                <a:srgbClr val="FFFFFF"/>
-              </a:solidFill>
-            </a:endParaRPr>
-          </a:p>
-          <a:p>
-            <a:pPr lvl="1">
-              <a:buFont typeface="Wingdings" panose="05000000000000000000" pitchFamily="2" charset="2"/>
-              <a:buChar char="Ø"/>
-            </a:pPr>
-            <a:r>
-              <a:rPr lang="pt-BR" dirty="0" smtClean="0">
-                <a:solidFill>
-                  <a:srgbClr val="FFFFFF"/>
-                </a:solidFill>
-              </a:rPr>
-              <a:t>Mais algo sobre qual o tipo de jogo?</a:t>
-            </a:r>
           </a:p>
         </p:txBody>
       </p:sp>
@@ -7124,7 +7432,15 @@
                   <a:schemeClr val="bg1"/>
                 </a:solidFill>
               </a:rPr>
-              <a:t>Justificativa [ou motivação]</a:t>
+              <a:t>Justificativa [ou motivação</a:t>
+            </a:r>
+            <a:r>
+              <a:rPr lang="pt-BR" dirty="0" smtClean="0">
+                <a:solidFill>
+                  <a:schemeClr val="bg1"/>
+                </a:solidFill>
+              </a:rPr>
+              <a:t>] 1/2</a:t>
             </a:r>
             <a:endParaRPr lang="pt-BR" dirty="0">
               <a:solidFill>
@@ -7318,15 +7634,7 @@
                   <a:schemeClr val="bg1"/>
                 </a:solidFill>
               </a:rPr>
-              <a:t>M</a:t>
-            </a:r>
-            <a:r>
-              <a:rPr lang="pt-BR" dirty="0" smtClean="0">
-                <a:solidFill>
-                  <a:schemeClr val="bg1"/>
-                </a:solidFill>
-              </a:rPr>
-              <a:t>onousuário</a:t>
+              <a:t>Monousuário</a:t>
             </a:r>
           </a:p>
           <a:p>
@@ -7356,11 +7664,6 @@
               </a:rPr>
               <a:t>Tempo ócio</a:t>
             </a:r>
-            <a:endParaRPr lang="pt-BR" dirty="0" smtClean="0">
-              <a:solidFill>
-                <a:schemeClr val="bg1"/>
-              </a:solidFill>
-            </a:endParaRPr>
           </a:p>
           <a:p>
             <a:pPr>
@@ -7424,24 +7727,52 @@
       </p:grpSpPr>
       <p:sp>
         <p:nvSpPr>
-          <p:cNvPr id="2" name="CaixaDeTexto 1"/>
-          <p:cNvSpPr txBox="1"/>
-          <p:nvPr/>
-        </p:nvSpPr>
-        <p:spPr>
-          <a:xfrm>
-            <a:off x="395536" y="815291"/>
-            <a:ext cx="8064896" cy="3139321"/>
-          </a:xfrm>
-          <a:prstGeom prst="rect">
-            <a:avLst/>
-          </a:prstGeom>
-          <a:noFill/>
-        </p:spPr>
-        <p:txBody>
-          <a:bodyPr wrap="square" rtlCol="0">
-            <a:spAutoFit/>
-          </a:bodyPr>
+          <p:cNvPr id="3" name="Title 2"/>
+          <p:cNvSpPr>
+            <a:spLocks noGrp="1"/>
+          </p:cNvSpPr>
+          <p:nvPr>
+            <p:ph type="title"/>
+          </p:nvPr>
+        </p:nvSpPr>
+        <p:spPr/>
+        <p:txBody>
+          <a:bodyPr/>
+          <a:lstStyle/>
+          <a:p>
+            <a:r>
+              <a:rPr lang="pt-BR" dirty="0">
+                <a:solidFill>
+                  <a:schemeClr val="bg1"/>
+                </a:solidFill>
+              </a:rPr>
+              <a:t>Justificativa [ou motivação</a:t>
+            </a:r>
+            <a:r>
+              <a:rPr lang="pt-BR" dirty="0" smtClean="0">
+                <a:solidFill>
+                  <a:schemeClr val="bg1"/>
+                </a:solidFill>
+              </a:rPr>
+              <a:t>] 2/2</a:t>
+            </a:r>
+            <a:endParaRPr lang="en-US" dirty="0"/>
+          </a:p>
+        </p:txBody>
+      </p:sp>
+      <p:sp>
+        <p:nvSpPr>
+          <p:cNvPr id="4" name="Content Placeholder 3"/>
+          <p:cNvSpPr>
+            <a:spLocks noGrp="1"/>
+          </p:cNvSpPr>
+          <p:nvPr>
+            <p:ph idx="1"/>
+          </p:nvPr>
+        </p:nvSpPr>
+        <p:spPr/>
+        <p:txBody>
+          <a:bodyPr/>
           <a:lstStyle/>
           <a:p>
             <a:pPr>
@@ -7449,7 +7780,7 @@
               <a:buChar char="Ø"/>
             </a:pPr>
             <a:r>
-              <a:rPr lang="pt-BR" sz="3200" dirty="0" smtClean="0">
+              <a:rPr lang="pt-BR" dirty="0">
                 <a:solidFill>
                   <a:schemeClr val="bg1"/>
                 </a:solidFill>
@@ -7457,7 +7788,7 @@
               <a:t>Mobile (</a:t>
             </a:r>
             <a:r>
-              <a:rPr lang="pt-BR" sz="3200" dirty="0" err="1" smtClean="0">
+              <a:rPr lang="pt-BR" dirty="0" err="1">
                 <a:solidFill>
                   <a:schemeClr val="bg1"/>
                 </a:solidFill>
@@ -7465,7 +7796,7 @@
               <a:t>Android</a:t>
             </a:r>
             <a:r>
-              <a:rPr lang="pt-BR" sz="3200" dirty="0" smtClean="0">
+              <a:rPr lang="pt-BR" dirty="0">
                 <a:solidFill>
                   <a:schemeClr val="bg1"/>
                 </a:solidFill>
@@ -7479,7 +7810,7 @@
               <a:buChar char="Ø"/>
             </a:pPr>
             <a:r>
-              <a:rPr lang="pt-BR" sz="2800" dirty="0" smtClean="0">
+              <a:rPr lang="pt-BR" dirty="0">
                 <a:solidFill>
                   <a:schemeClr val="bg1"/>
                 </a:solidFill>
@@ -7493,13 +7824,34 @@
               <a:buChar char="Ø"/>
             </a:pPr>
             <a:r>
-              <a:rPr lang="pt-BR" sz="2800" dirty="0" smtClean="0">
-                <a:solidFill>
-                  <a:schemeClr val="bg1"/>
-                </a:solidFill>
-              </a:rPr>
-              <a:t>Aparelhos sofisticados</a:t>
-            </a:r>
+              <a:rPr lang="pt-BR" dirty="0" smtClean="0">
+                <a:solidFill>
+                  <a:schemeClr val="bg1"/>
+                </a:solidFill>
+              </a:rPr>
+              <a:t>Evoluç</a:t>
+            </a:r>
+            <a:r>
+              <a:rPr lang="pt-BR" dirty="0" smtClean="0">
+                <a:solidFill>
+                  <a:schemeClr val="bg1"/>
+                </a:solidFill>
+              </a:rPr>
+              <a:t>ão do hardware dos </a:t>
+            </a:r>
+            <a:r>
+              <a:rPr lang="pt-BR" dirty="0" smtClean="0">
+                <a:solidFill>
+                  <a:schemeClr val="bg1"/>
+                </a:solidFill>
+              </a:rPr>
+              <a:t>aparelhos</a:t>
+            </a:r>
+            <a:endParaRPr lang="pt-BR" dirty="0">
+              <a:solidFill>
+                <a:schemeClr val="bg1"/>
+              </a:solidFill>
+            </a:endParaRPr>
           </a:p>
           <a:p>
             <a:pPr lvl="1">
@@ -7507,7 +7859,7 @@
               <a:buChar char="Ø"/>
             </a:pPr>
             <a:r>
-              <a:rPr lang="pt-BR" sz="2800" dirty="0" smtClean="0">
+              <a:rPr lang="pt-BR" dirty="0">
                 <a:solidFill>
                   <a:schemeClr val="bg1"/>
                 </a:solidFill>
@@ -7521,7 +7873,7 @@
               <a:buChar char="Ø"/>
             </a:pPr>
             <a:r>
-              <a:rPr lang="pt-BR" sz="3200" dirty="0" smtClean="0">
+              <a:rPr lang="pt-BR" dirty="0">
                 <a:solidFill>
                   <a:schemeClr val="bg1"/>
                 </a:solidFill>
@@ -7535,21 +7887,13 @@
               <a:buChar char="Ø"/>
             </a:pPr>
             <a:r>
-              <a:rPr lang="pt-BR" sz="2800" dirty="0" smtClean="0">
+              <a:rPr lang="pt-BR" dirty="0">
                 <a:solidFill>
                   <a:schemeClr val="bg1"/>
                 </a:solidFill>
               </a:rPr>
               <a:t>Bom enredo, diversão e desafiador </a:t>
             </a:r>
-            <a:endParaRPr lang="pt-BR" sz="2800" dirty="0">
-              <a:solidFill>
-                <a:schemeClr val="bg1"/>
-              </a:solidFill>
-            </a:endParaRPr>
-          </a:p>
-          <a:p>
-            <a:endParaRPr lang="pt-BR" dirty="0"/>
           </a:p>
         </p:txBody>
       </p:sp>

</xml_diff>